<commit_message>
Change author in slides to "Patrick Möbius", change name in pom.xml to match the exercise number, update wicket version from 9.0.0 to 9.3.0
</commit_message>
<xml_diff>
--- a/slides/Tag-1_1-Begruessung.pptx
+++ b/slides/Tag-1_1-Begruessung.pptx
@@ -6,23 +6,24 @@
     <p:sldMasterId id="2147483649" r:id="rId2"/>
   </p:sldMasterIdLst>
   <p:notesMasterIdLst>
-    <p:notesMasterId r:id="rId14"/>
+    <p:notesMasterId r:id="rId15"/>
   </p:notesMasterIdLst>
   <p:handoutMasterIdLst>
-    <p:handoutMasterId r:id="rId15"/>
+    <p:handoutMasterId r:id="rId16"/>
   </p:handoutMasterIdLst>
   <p:sldIdLst>
     <p:sldId id="288" r:id="rId3"/>
     <p:sldId id="290" r:id="rId4"/>
     <p:sldId id="324" r:id="rId5"/>
-    <p:sldId id="323" r:id="rId6"/>
-    <p:sldId id="462" r:id="rId7"/>
-    <p:sldId id="449" r:id="rId8"/>
-    <p:sldId id="458" r:id="rId9"/>
-    <p:sldId id="459" r:id="rId10"/>
-    <p:sldId id="461" r:id="rId11"/>
-    <p:sldId id="464" r:id="rId12"/>
-    <p:sldId id="463" r:id="rId13"/>
+    <p:sldId id="465" r:id="rId6"/>
+    <p:sldId id="323" r:id="rId7"/>
+    <p:sldId id="462" r:id="rId8"/>
+    <p:sldId id="449" r:id="rId9"/>
+    <p:sldId id="458" r:id="rId10"/>
+    <p:sldId id="459" r:id="rId11"/>
+    <p:sldId id="461" r:id="rId12"/>
+    <p:sldId id="464" r:id="rId13"/>
+    <p:sldId id="463" r:id="rId14"/>
   </p:sldIdLst>
   <p:sldSz cx="9144000" cy="6858000" type="screen4x3"/>
   <p:notesSz cx="6784975" cy="9921875"/>
@@ -1673,7 +1674,13 @@
               <a:rPr lang="de-DE" sz="600" dirty="0">
                 <a:latin typeface="+mj-lt"/>
               </a:rPr>
-              <a:t>© Copyright 2020 </a:t>
+              <a:t>© Copyright </a:t>
+            </a:r>
+            <a:r>
+              <a:rPr lang="de-DE" sz="600" dirty="0" smtClean="0">
+                <a:latin typeface="+mj-lt"/>
+              </a:rPr>
+              <a:t>2021 </a:t>
             </a:r>
             <a:r>
               <a:rPr lang="de-DE" sz="600" dirty="0" err="1">
@@ -6517,7 +6524,7 @@
               <a:pPr algn="ctr">
                 <a:defRPr/>
               </a:pPr>
-              <a:t>27.02.2020</a:t>
+              <a:t>14.05.2021</a:t>
             </a:fld>
             <a:endParaRPr lang="de-DE" sz="1000" dirty="0">
               <a:solidFill>
@@ -7093,14 +7100,20 @@
               <a:defRPr/>
             </a:pPr>
             <a:r>
-              <a:rPr lang="de-DE" sz="1000" dirty="0">
+              <a:rPr lang="de-DE" sz="1000" dirty="0" smtClean="0">
                 <a:solidFill>
                   <a:schemeClr val="bg1"/>
                 </a:solidFill>
                 <a:latin typeface="Arial" charset="0"/>
               </a:rPr>
-              <a:t>Daniel Krämer</a:t>
-            </a:r>
+              <a:t>Patrick Möbius</a:t>
+            </a:r>
+            <a:endParaRPr lang="de-DE" sz="1000" dirty="0">
+              <a:solidFill>
+                <a:schemeClr val="bg1"/>
+              </a:solidFill>
+              <a:latin typeface="Arial" charset="0"/>
+            </a:endParaRPr>
           </a:p>
         </p:txBody>
       </p:sp>
@@ -8403,16 +8416,26 @@
           <a:p>
             <a:pPr algn="l" eaLnBrk="1" hangingPunct="1"/>
             <a:r>
+              <a:rPr lang="de-DE" sz="1600" dirty="0" smtClean="0"/>
+              <a:t>26.05. </a:t>
+            </a:r>
+            <a:r>
               <a:rPr lang="de-DE" sz="1600" dirty="0"/>
-              <a:t>27.02. – 28.02.2020, </a:t>
-            </a:r>
+              <a:t>– </a:t>
+            </a:r>
+            <a:r>
+              <a:rPr lang="de-DE" sz="1600" dirty="0" smtClean="0"/>
+              <a:t>28.05.2021, </a:t>
+            </a:r>
+            <a:endParaRPr lang="de-DE" sz="1600" dirty="0"/>
           </a:p>
           <a:p>
             <a:pPr algn="l" eaLnBrk="1" hangingPunct="1"/>
             <a:r>
-              <a:rPr lang="de-DE" sz="1600" dirty="0"/>
-              <a:t>Daniel Krämer</a:t>
-            </a:r>
+              <a:rPr lang="de-DE" sz="1600" dirty="0" smtClean="0"/>
+              <a:t>Patrick Möbius</a:t>
+            </a:r>
+            <a:endParaRPr lang="de-DE" sz="1600" dirty="0"/>
           </a:p>
         </p:txBody>
       </p:sp>
@@ -8449,6 +8472,317 @@
 </file>
 
 <file path=ppt/slides/slide10.xml><?xml version="1.0" encoding="utf-8"?>
+<p:sld xmlns:a="http://schemas.openxmlformats.org/drawingml/2006/main" xmlns:r="http://schemas.openxmlformats.org/officeDocument/2006/relationships" xmlns:p="http://schemas.openxmlformats.org/presentationml/2006/main">
+  <p:cSld>
+    <p:spTree>
+      <p:nvGrpSpPr>
+        <p:cNvPr id="1" name=""/>
+        <p:cNvGrpSpPr/>
+        <p:nvPr/>
+      </p:nvGrpSpPr>
+      <p:grpSpPr>
+        <a:xfrm>
+          <a:off x="0" y="0"/>
+          <a:ext cx="0" cy="0"/>
+          <a:chOff x="0" y="0"/>
+          <a:chExt cx="0" cy="0"/>
+        </a:xfrm>
+      </p:grpSpPr>
+      <p:sp>
+        <p:nvSpPr>
+          <p:cNvPr id="2" name="Titel 1"/>
+          <p:cNvSpPr>
+            <a:spLocks noGrp="1"/>
+          </p:cNvSpPr>
+          <p:nvPr>
+            <p:ph type="title"/>
+          </p:nvPr>
+        </p:nvSpPr>
+        <p:spPr/>
+        <p:txBody>
+          <a:bodyPr/>
+          <a:lstStyle/>
+          <a:p>
+            <a:r>
+              <a:rPr lang="de-DE" dirty="0"/>
+              <a:t>Literatur</a:t>
+            </a:r>
+          </a:p>
+        </p:txBody>
+      </p:sp>
+      <p:sp>
+        <p:nvSpPr>
+          <p:cNvPr id="3" name="Inhaltsplatzhalter 2"/>
+          <p:cNvSpPr>
+            <a:spLocks noGrp="1"/>
+          </p:cNvSpPr>
+          <p:nvPr>
+            <p:ph idx="1"/>
+          </p:nvPr>
+        </p:nvSpPr>
+        <p:spPr/>
+        <p:txBody>
+          <a:bodyPr/>
+          <a:lstStyle/>
+          <a:p>
+            <a:endParaRPr lang="de-DE" sz="3600" dirty="0"/>
+          </a:p>
+          <a:p>
+            <a:pPr>
+              <a:buFont typeface="Arial" panose="020B0604020202020204" pitchFamily="34" charset="0"/>
+              <a:buChar char="•"/>
+            </a:pPr>
+            <a:r>
+              <a:rPr lang="de-DE" sz="2600" i="1" dirty="0"/>
+              <a:t>Apache </a:t>
+            </a:r>
+            <a:r>
+              <a:rPr lang="de-DE" sz="2600" i="1" dirty="0" err="1"/>
+              <a:t>Wicket</a:t>
+            </a:r>
+            <a:r>
+              <a:rPr lang="de-DE" sz="2600" i="1" dirty="0"/>
+              <a:t> User Guide - Reference </a:t>
+            </a:r>
+            <a:r>
+              <a:rPr lang="de-DE" sz="2600" i="1" dirty="0" err="1"/>
+              <a:t>Documentation</a:t>
+            </a:r>
+            <a:r>
+              <a:rPr lang="de-DE" sz="2600" i="1" dirty="0"/>
+              <a:t>, Version 8</a:t>
+            </a:r>
+            <a:r>
+              <a:rPr lang="de-DE" i="1" dirty="0"/>
+              <a:t/>
+            </a:r>
+            <a:br>
+              <a:rPr lang="de-DE" i="1" dirty="0"/>
+            </a:br>
+            <a:r>
+              <a:rPr lang="de-DE" sz="2000" dirty="0" err="1"/>
+              <a:t>A.Del</a:t>
+            </a:r>
+            <a:r>
+              <a:rPr lang="de-DE" sz="2000" dirty="0"/>
+              <a:t> </a:t>
+            </a:r>
+            <a:r>
+              <a:rPr lang="de-DE" sz="2000" dirty="0" err="1"/>
+              <a:t>Bene</a:t>
+            </a:r>
+            <a:r>
+              <a:rPr lang="de-DE" sz="2000" dirty="0"/>
+              <a:t>, </a:t>
+            </a:r>
+            <a:r>
+              <a:rPr lang="de-DE" sz="2000" dirty="0" err="1"/>
+              <a:t>M.Grigorov</a:t>
+            </a:r>
+            <a:r>
+              <a:rPr lang="de-DE" sz="2000" dirty="0"/>
+              <a:t>, </a:t>
+            </a:r>
+            <a:r>
+              <a:rPr lang="de-DE" sz="2000" dirty="0" err="1"/>
+              <a:t>C.Hufe</a:t>
+            </a:r>
+            <a:r>
+              <a:rPr lang="de-DE" sz="2000" dirty="0"/>
+              <a:t>, </a:t>
+            </a:r>
+            <a:r>
+              <a:rPr lang="de-DE" sz="2000" dirty="0" err="1"/>
+              <a:t>C.Kroemer</a:t>
+            </a:r>
+            <a:r>
+              <a:rPr lang="de-DE" sz="2000" dirty="0"/>
+              <a:t>, </a:t>
+            </a:r>
+            <a:r>
+              <a:rPr lang="de-DE" sz="2000" dirty="0" err="1"/>
+              <a:t>D.Bartl</a:t>
+            </a:r>
+            <a:r>
+              <a:rPr lang="de-DE" sz="2000" dirty="0"/>
+              <a:t>, </a:t>
+            </a:r>
+            <a:r>
+              <a:rPr lang="de-DE" sz="2000" dirty="0" err="1"/>
+              <a:t>P.Borș</a:t>
+            </a:r>
+            <a:r>
+              <a:rPr lang="de-DE" sz="2000" dirty="0"/>
+              <a:t>, </a:t>
+            </a:r>
+            <a:r>
+              <a:rPr lang="de-DE" sz="2000" dirty="0" err="1"/>
+              <a:t>T.Soloschenko</a:t>
+            </a:r>
+            <a:r>
+              <a:rPr lang="de-DE" sz="2000" dirty="0"/>
+              <a:t>, </a:t>
+            </a:r>
+            <a:r>
+              <a:rPr lang="de-DE" sz="2000" dirty="0" err="1"/>
+              <a:t>I.Vaynberg</a:t>
+            </a:r>
+            <a:r>
+              <a:rPr lang="de-DE" sz="2000" dirty="0"/>
+              <a:t>, </a:t>
+            </a:r>
+            <a:r>
+              <a:rPr lang="de-DE" sz="2000" dirty="0" err="1"/>
+              <a:t>J.Rohde</a:t>
+            </a:r>
+            <a:r>
+              <a:rPr lang="de-DE" sz="2000" dirty="0"/>
+              <a:t>:</a:t>
+            </a:r>
+            <a:br>
+              <a:rPr lang="de-DE" sz="2000" dirty="0"/>
+            </a:br>
+            <a:r>
+              <a:rPr lang="de-DE" sz="2000" dirty="0">
+                <a:hlinkClick r:id="rId2"/>
+              </a:rPr>
+              <a:t>https://ci.apache.org/projects/wicket/guide/8.x/single.html</a:t>
+            </a:r>
+            <a:endParaRPr lang="de-DE" sz="2000" dirty="0"/>
+          </a:p>
+          <a:p>
+            <a:endParaRPr lang="de-DE" sz="3600" i="1" dirty="0"/>
+          </a:p>
+          <a:p>
+            <a:pPr>
+              <a:buFont typeface="Arial" panose="020B0604020202020204" pitchFamily="34" charset="0"/>
+              <a:buChar char="•"/>
+            </a:pPr>
+            <a:r>
+              <a:rPr lang="en-US" sz="2600" i="1" dirty="0"/>
+              <a:t>Wicket in Action</a:t>
+            </a:r>
+            <a:r>
+              <a:rPr lang="en-US" i="1" dirty="0"/>
+              <a:t/>
+            </a:r>
+            <a:br>
+              <a:rPr lang="en-US" i="1" dirty="0"/>
+            </a:br>
+            <a:r>
+              <a:rPr lang="en-US" sz="2000" dirty="0" err="1"/>
+              <a:t>M.Dashorst</a:t>
+            </a:r>
+            <a:r>
+              <a:rPr lang="en-US" sz="2000" dirty="0"/>
+              <a:t>, E. </a:t>
+            </a:r>
+            <a:r>
+              <a:rPr lang="en-US" sz="2000" dirty="0" err="1"/>
+              <a:t>Hillenius</a:t>
+            </a:r>
+            <a:r>
+              <a:rPr lang="en-US" sz="2000" i="1" dirty="0"/>
+              <a:t/>
+            </a:r>
+            <a:br>
+              <a:rPr lang="en-US" sz="2000" i="1" dirty="0"/>
+            </a:br>
+            <a:r>
+              <a:rPr lang="en-US" sz="2000" dirty="0"/>
+              <a:t>Manning, 2008.</a:t>
+            </a:r>
+          </a:p>
+          <a:p>
+            <a:endParaRPr lang="en-US" sz="2000" i="1" dirty="0"/>
+          </a:p>
+          <a:p>
+            <a:pPr marL="0" indent="0">
+              <a:buNone/>
+            </a:pPr>
+            <a:r>
+              <a:rPr lang="en-US" sz="2000" i="1" dirty="0" err="1"/>
+              <a:t>Hinweis</a:t>
+            </a:r>
+            <a:r>
+              <a:rPr lang="en-US" sz="2000" i="1" dirty="0"/>
+              <a:t>: </a:t>
+            </a:r>
+            <a:r>
+              <a:rPr lang="en-US" sz="2000" i="1" dirty="0" err="1"/>
+              <a:t>Viele</a:t>
+            </a:r>
+            <a:r>
+              <a:rPr lang="en-US" sz="2000" i="1" dirty="0"/>
+              <a:t> Code-</a:t>
+            </a:r>
+            <a:r>
+              <a:rPr lang="en-US" sz="2000" i="1" dirty="0" err="1"/>
+              <a:t>Beispiele</a:t>
+            </a:r>
+            <a:r>
+              <a:rPr lang="en-US" sz="2000" i="1" dirty="0"/>
+              <a:t> </a:t>
+            </a:r>
+            <a:r>
+              <a:rPr lang="en-US" sz="2000" i="1" dirty="0" err="1"/>
+              <a:t>basieren</a:t>
+            </a:r>
+            <a:r>
+              <a:rPr lang="en-US" sz="2000" i="1" dirty="0"/>
+              <a:t> auf </a:t>
+            </a:r>
+            <a:r>
+              <a:rPr lang="en-US" sz="2000" i="1" dirty="0" err="1"/>
+              <a:t>dem</a:t>
+            </a:r>
+            <a:r>
+              <a:rPr lang="en-US" sz="2000" i="1" dirty="0"/>
+              <a:t> </a:t>
+            </a:r>
+            <a:r>
+              <a:rPr lang="en-US" sz="2000" i="1" dirty="0" err="1"/>
+              <a:t>Buch</a:t>
+            </a:r>
+            <a:r>
+              <a:rPr lang="en-US" sz="2000" i="1" dirty="0"/>
+              <a:t> “Wicket in Action”. </a:t>
+            </a:r>
+            <a:r>
+              <a:rPr lang="en-US" sz="2000" i="1" dirty="0">
+                <a:hlinkClick r:id="rId3"/>
+              </a:rPr>
+              <a:t>http://wicketinaction.com/downloads/</a:t>
+            </a:r>
+            <a:r>
+              <a:rPr lang="en-US" sz="2000" i="1" dirty="0"/>
+              <a:t> </a:t>
+            </a:r>
+            <a:r>
+              <a:rPr lang="de-DE" sz="2000" i="1" dirty="0"/>
+              <a:t/>
+            </a:r>
+            <a:br>
+              <a:rPr lang="de-DE" sz="2000" i="1" dirty="0"/>
+            </a:br>
+            <a:endParaRPr lang="de-DE" sz="2000" i="1" dirty="0"/>
+          </a:p>
+        </p:txBody>
+      </p:sp>
+    </p:spTree>
+    <p:extLst>
+      <p:ext uri="{BB962C8B-B14F-4D97-AF65-F5344CB8AC3E}">
+        <p14:creationId xmlns:p14="http://schemas.microsoft.com/office/powerpoint/2010/main" val="3772347927"/>
+      </p:ext>
+    </p:extLst>
+  </p:cSld>
+  <p:clrMapOvr>
+    <a:masterClrMapping/>
+  </p:clrMapOvr>
+</p:sld>
+</file>
+
+<file path=ppt/slides/slide11.xml><?xml version="1.0" encoding="utf-8"?>
 <p:sld xmlns:a="http://schemas.openxmlformats.org/drawingml/2006/main" xmlns:r="http://schemas.openxmlformats.org/officeDocument/2006/relationships" xmlns:p="http://schemas.openxmlformats.org/presentationml/2006/main">
   <p:cSld>
     <p:spTree>
@@ -8647,7 +8981,7 @@
 </p:sld>
 </file>
 
-<file path=ppt/slides/slide11.xml><?xml version="1.0" encoding="utf-8"?>
+<file path=ppt/slides/slide12.xml><?xml version="1.0" encoding="utf-8"?>
 <p:sld xmlns:a="http://schemas.openxmlformats.org/drawingml/2006/main" xmlns:r="http://schemas.openxmlformats.org/officeDocument/2006/relationships" xmlns:p="http://schemas.openxmlformats.org/presentationml/2006/main" show="0">
   <p:cSld>
     <p:spTree>
@@ -8752,6 +9086,14 @@
   <p:clrMapOvr>
     <a:masterClrMapping/>
   </p:clrMapOvr>
+  <mc:AlternateContent xmlns:mc="http://schemas.openxmlformats.org/markup-compatibility/2006" xmlns:p14="http://schemas.microsoft.com/office/powerpoint/2010/main">
+    <mc:Choice Requires="p14">
+      <p:transition spd="slow" p14:dur="2000"/>
+    </mc:Choice>
+    <mc:Fallback xmlns="">
+      <p:transition spd="slow"/>
+    </mc:Fallback>
+  </mc:AlternateContent>
 </p:sld>
 </file>
 
@@ -9000,11 +9342,19 @@
   <p:clrMapOvr>
     <a:masterClrMapping/>
   </p:clrMapOvr>
+  <mc:AlternateContent xmlns:mc="http://schemas.openxmlformats.org/markup-compatibility/2006" xmlns:p14="http://schemas.microsoft.com/office/powerpoint/2010/main">
+    <mc:Choice Requires="p14">
+      <p:transition spd="slow" p14:dur="2000"/>
+    </mc:Choice>
+    <mc:Fallback xmlns="">
+      <p:transition spd="slow"/>
+    </mc:Fallback>
+  </mc:AlternateContent>
 </p:sld>
 </file>
 
 <file path=ppt/slides/slide3.xml><?xml version="1.0" encoding="utf-8"?>
-<p:sld xmlns:a="http://schemas.openxmlformats.org/drawingml/2006/main" xmlns:r="http://schemas.openxmlformats.org/officeDocument/2006/relationships" xmlns:p="http://schemas.openxmlformats.org/presentationml/2006/main">
+<p:sld xmlns:a="http://schemas.openxmlformats.org/drawingml/2006/main" xmlns:r="http://schemas.openxmlformats.org/officeDocument/2006/relationships" xmlns:p="http://schemas.openxmlformats.org/presentationml/2006/main" show="0">
   <p:cSld>
     <p:spTree>
       <p:nvGrpSpPr>
@@ -9230,10 +9580,694 @@
   <p:clrMapOvr>
     <a:masterClrMapping/>
   </p:clrMapOvr>
+  <mc:AlternateContent xmlns:mc="http://schemas.openxmlformats.org/markup-compatibility/2006" xmlns:p14="http://schemas.microsoft.com/office/powerpoint/2010/main">
+    <mc:Choice Requires="p14">
+      <p:transition spd="slow" p14:dur="2000"/>
+    </mc:Choice>
+    <mc:Fallback xmlns="">
+      <p:transition spd="slow"/>
+    </mc:Fallback>
+  </mc:AlternateContent>
 </p:sld>
 </file>
 
 <file path=ppt/slides/slide4.xml><?xml version="1.0" encoding="utf-8"?>
+<p:sld xmlns:a="http://schemas.openxmlformats.org/drawingml/2006/main" xmlns:r="http://schemas.openxmlformats.org/officeDocument/2006/relationships" xmlns:p="http://schemas.openxmlformats.org/presentationml/2006/main">
+  <p:cSld>
+    <p:spTree>
+      <p:nvGrpSpPr>
+        <p:cNvPr id="1" name=""/>
+        <p:cNvGrpSpPr/>
+        <p:nvPr/>
+      </p:nvGrpSpPr>
+      <p:grpSpPr>
+        <a:xfrm>
+          <a:off x="0" y="0"/>
+          <a:ext cx="0" cy="0"/>
+          <a:chOff x="0" y="0"/>
+          <a:chExt cx="0" cy="0"/>
+        </a:xfrm>
+      </p:grpSpPr>
+      <p:sp>
+        <p:nvSpPr>
+          <p:cNvPr id="17410" name="Inhaltsplatzhalter 2"/>
+          <p:cNvSpPr>
+            <a:spLocks noGrp="1"/>
+          </p:cNvSpPr>
+          <p:nvPr>
+            <p:ph idx="1"/>
+          </p:nvPr>
+        </p:nvSpPr>
+        <p:spPr>
+          <a:xfrm>
+            <a:off x="303213" y="1462108"/>
+            <a:ext cx="8589962" cy="4991228"/>
+          </a:xfrm>
+        </p:spPr>
+        <p:txBody>
+          <a:bodyPr/>
+          <a:lstStyle/>
+          <a:p>
+            <a:pPr>
+              <a:buNone/>
+            </a:pPr>
+            <a:r>
+              <a:rPr lang="de-DE" b="1" dirty="0"/>
+              <a:t>Patrick Möbius (M. Eng. I.S.E.)</a:t>
+            </a:r>
+          </a:p>
+          <a:p>
+            <a:pPr marL="342900" lvl="1" indent="-342900">
+              <a:buFont typeface="Arial" charset="0"/>
+              <a:buChar char="●"/>
+            </a:pPr>
+            <a:r>
+              <a:rPr lang="de-DE" altLang="de-DE" dirty="0">
+                <a:ea typeface="+mn-ea"/>
+                <a:cs typeface="+mn-cs"/>
+              </a:rPr>
+              <a:t>Software Engineer</a:t>
+            </a:r>
+          </a:p>
+          <a:p>
+            <a:pPr marL="342900" lvl="1" indent="-342900">
+              <a:buFont typeface="Arial" charset="0"/>
+              <a:buChar char="●"/>
+            </a:pPr>
+            <a:r>
+              <a:rPr lang="de-DE" altLang="de-DE" dirty="0">
+                <a:ea typeface="+mn-ea"/>
+                <a:cs typeface="+mn-cs"/>
+              </a:rPr>
+              <a:t>Seit 2011 bei </a:t>
+            </a:r>
+            <a:r>
+              <a:rPr lang="de-DE" altLang="de-DE" dirty="0" err="1">
+                <a:ea typeface="+mn-ea"/>
+                <a:cs typeface="+mn-cs"/>
+              </a:rPr>
+              <a:t>anderScore</a:t>
+            </a:r>
+            <a:endParaRPr lang="de-DE" altLang="de-DE" dirty="0">
+              <a:ea typeface="+mn-ea"/>
+              <a:cs typeface="+mn-cs"/>
+            </a:endParaRPr>
+          </a:p>
+          <a:p>
+            <a:pPr marL="342900" lvl="1" indent="-342900">
+              <a:buFont typeface="Arial" charset="0"/>
+              <a:buChar char="●"/>
+            </a:pPr>
+            <a:r>
+              <a:rPr lang="de-DE" altLang="de-DE" dirty="0">
+                <a:ea typeface="+mn-ea"/>
+                <a:cs typeface="+mn-cs"/>
+              </a:rPr>
+              <a:t>Schwerpunkte</a:t>
+            </a:r>
+          </a:p>
+          <a:p>
+            <a:pPr marL="742950" lvl="2" indent="-342900">
+              <a:buFont typeface="Arial" charset="0"/>
+              <a:buChar char="●"/>
+            </a:pPr>
+            <a:r>
+              <a:rPr lang="de-DE" altLang="de-DE" sz="2000" dirty="0">
+                <a:ea typeface="+mn-ea"/>
+                <a:cs typeface="+mn-cs"/>
+              </a:rPr>
+              <a:t>Android mobile-Apps</a:t>
+            </a:r>
+          </a:p>
+          <a:p>
+            <a:pPr marL="742950" lvl="2" indent="-342900">
+              <a:buFont typeface="Arial" charset="0"/>
+              <a:buChar char="●"/>
+            </a:pPr>
+            <a:r>
+              <a:rPr lang="de-DE" altLang="de-DE" sz="2000" dirty="0" err="1">
+                <a:ea typeface="+mn-ea"/>
+                <a:cs typeface="+mn-cs"/>
+              </a:rPr>
+              <a:t>Frontends</a:t>
+            </a:r>
+            <a:r>
+              <a:rPr lang="de-DE" altLang="de-DE" sz="2000" dirty="0">
+                <a:ea typeface="+mn-ea"/>
+                <a:cs typeface="+mn-cs"/>
+              </a:rPr>
+              <a:t> für dynamische Webapplikationen</a:t>
+            </a:r>
+          </a:p>
+          <a:p>
+            <a:pPr marL="742950" lvl="2" indent="-342900">
+              <a:buFont typeface="Arial" charset="0"/>
+              <a:buChar char="●"/>
+            </a:pPr>
+            <a:r>
+              <a:rPr lang="de-DE" altLang="de-DE" sz="2000" dirty="0">
+                <a:ea typeface="+mn-ea"/>
+                <a:cs typeface="+mn-cs"/>
+              </a:rPr>
+              <a:t>WS-Anbindung für </a:t>
+            </a:r>
+            <a:r>
+              <a:rPr lang="de-DE" altLang="de-DE" sz="2000" dirty="0" err="1">
+                <a:ea typeface="+mn-ea"/>
+                <a:cs typeface="+mn-cs"/>
+              </a:rPr>
+              <a:t>Persistence</a:t>
+            </a:r>
+            <a:r>
+              <a:rPr lang="de-DE" altLang="de-DE" sz="2000" dirty="0">
+                <a:ea typeface="+mn-ea"/>
+                <a:cs typeface="+mn-cs"/>
+              </a:rPr>
+              <a:t> Layer, </a:t>
+            </a:r>
+            <a:br>
+              <a:rPr lang="de-DE" altLang="de-DE" sz="2000" dirty="0">
+                <a:ea typeface="+mn-ea"/>
+                <a:cs typeface="+mn-cs"/>
+              </a:rPr>
+            </a:br>
+            <a:r>
+              <a:rPr lang="de-DE" altLang="de-DE" sz="2000" dirty="0">
+                <a:ea typeface="+mn-ea"/>
+                <a:cs typeface="+mn-cs"/>
+              </a:rPr>
+              <a:t>Einsatz von speziellen Caching-Arten</a:t>
+            </a:r>
+          </a:p>
+          <a:p>
+            <a:pPr marL="742950" lvl="2" indent="-342900">
+              <a:buFont typeface="Arial" charset="0"/>
+              <a:buChar char="●"/>
+            </a:pPr>
+            <a:r>
+              <a:rPr lang="de-DE" altLang="de-DE" sz="2000" dirty="0">
+                <a:ea typeface="+mn-ea"/>
+                <a:cs typeface="+mn-cs"/>
+              </a:rPr>
+              <a:t>BPM-Umgebungen; Prozessdarstellungen</a:t>
+            </a:r>
+          </a:p>
+          <a:p>
+            <a:pPr marL="342900" lvl="1" indent="-342900">
+              <a:buFont typeface="Arial" charset="0"/>
+              <a:buChar char="●"/>
+            </a:pPr>
+            <a:r>
+              <a:rPr lang="de-DE" altLang="de-DE" dirty="0"/>
+              <a:t>Java, </a:t>
+            </a:r>
+            <a:r>
+              <a:rPr lang="de-DE" altLang="de-DE" dirty="0" err="1"/>
+              <a:t>Vaadin</a:t>
+            </a:r>
+            <a:r>
+              <a:rPr lang="de-DE" altLang="de-DE" dirty="0"/>
+              <a:t>, </a:t>
+            </a:r>
+            <a:r>
+              <a:rPr lang="de-DE" altLang="de-DE" dirty="0" err="1"/>
+              <a:t>Wicket</a:t>
+            </a:r>
+            <a:r>
+              <a:rPr lang="de-DE" altLang="de-DE" dirty="0"/>
+              <a:t>, Angular, GWT/ GXT, JavaScript, </a:t>
+            </a:r>
+            <a:r>
+              <a:rPr lang="de-DE" altLang="de-DE" dirty="0" smtClean="0"/>
+              <a:t>…</a:t>
+            </a:r>
+            <a:endParaRPr lang="de-DE" altLang="de-DE" dirty="0"/>
+          </a:p>
+        </p:txBody>
+      </p:sp>
+      <p:sp>
+        <p:nvSpPr>
+          <p:cNvPr id="17411" name="Rectangle 1062"/>
+          <p:cNvSpPr>
+            <a:spLocks noGrp="1" noChangeArrowheads="1"/>
+          </p:cNvSpPr>
+          <p:nvPr>
+            <p:ph type="title"/>
+          </p:nvPr>
+        </p:nvSpPr>
+        <p:spPr>
+          <a:xfrm>
+            <a:off x="285750" y="142875"/>
+            <a:ext cx="5654675" cy="706438"/>
+          </a:xfrm>
+        </p:spPr>
+        <p:txBody>
+          <a:bodyPr/>
+          <a:lstStyle/>
+          <a:p>
+            <a:r>
+              <a:rPr lang="de-DE" dirty="0"/>
+              <a:t>1. Dozenten: P. Möbius</a:t>
+            </a:r>
+          </a:p>
+        </p:txBody>
+      </p:sp>
+      <p:pic>
+        <p:nvPicPr>
+          <p:cNvPr id="1026" name="Picture 2"/>
+          <p:cNvPicPr>
+            <a:picLocks noChangeAspect="1" noChangeArrowheads="1"/>
+          </p:cNvPicPr>
+          <p:nvPr/>
+        </p:nvPicPr>
+        <p:blipFill>
+          <a:blip r:embed="rId2">
+            <a:extLst>
+              <a:ext uri="{28A0092B-C50C-407E-A947-70E740481C1C}">
+                <a14:useLocalDpi xmlns:a14="http://schemas.microsoft.com/office/drawing/2010/main" val="0"/>
+              </a:ext>
+            </a:extLst>
+          </a:blip>
+          <a:srcRect/>
+          <a:stretch>
+            <a:fillRect/>
+          </a:stretch>
+        </p:blipFill>
+        <p:spPr bwMode="auto">
+          <a:xfrm>
+            <a:off x="6370178" y="1462108"/>
+            <a:ext cx="2522997" cy="3274963"/>
+          </a:xfrm>
+          <a:prstGeom prst="rect">
+            <a:avLst/>
+          </a:prstGeom>
+          <a:noFill/>
+          <a:ln>
+            <a:noFill/>
+          </a:ln>
+          <a:extLst>
+            <a:ext uri="{909E8E84-426E-40DD-AFC4-6F175D3DCCD1}">
+              <a14:hiddenFill xmlns:a14="http://schemas.microsoft.com/office/drawing/2010/main">
+                <a:solidFill>
+                  <a:srgbClr val="FFFFFF"/>
+                </a:solidFill>
+              </a14:hiddenFill>
+            </a:ext>
+            <a:ext uri="{91240B29-F687-4F45-9708-019B960494DF}">
+              <a14:hiddenLine xmlns:a14="http://schemas.microsoft.com/office/drawing/2010/main" w="9525">
+                <a:solidFill>
+                  <a:srgbClr val="000000"/>
+                </a:solidFill>
+                <a:miter lim="800000"/>
+                <a:headEnd/>
+                <a:tailEnd/>
+              </a14:hiddenLine>
+            </a:ext>
+          </a:extLst>
+        </p:spPr>
+      </p:pic>
+    </p:spTree>
+    <p:extLst>
+      <p:ext uri="{BB962C8B-B14F-4D97-AF65-F5344CB8AC3E}">
+        <p14:creationId xmlns:p14="http://schemas.microsoft.com/office/powerpoint/2010/main" val="2904040620"/>
+      </p:ext>
+    </p:extLst>
+  </p:cSld>
+  <p:clrMapOvr>
+    <a:masterClrMapping/>
+  </p:clrMapOvr>
+  <p:timing>
+    <p:tnLst>
+      <p:par>
+        <p:cTn id="1" dur="indefinite" restart="never" nodeType="tmRoot">
+          <p:childTnLst>
+            <p:seq concurrent="1" nextAc="seek">
+              <p:cTn id="2" dur="indefinite" nodeType="mainSeq">
+                <p:childTnLst>
+                  <p:par>
+                    <p:cTn id="3" fill="hold">
+                      <p:stCondLst>
+                        <p:cond delay="indefinite"/>
+                      </p:stCondLst>
+                      <p:childTnLst>
+                        <p:par>
+                          <p:cTn id="4" fill="hold">
+                            <p:stCondLst>
+                              <p:cond delay="0"/>
+                            </p:stCondLst>
+                            <p:childTnLst>
+                              <p:par>
+                                <p:cTn id="5" presetID="1" presetClass="entr" presetSubtype="0" fill="hold" nodeType="clickEffect">
+                                  <p:stCondLst>
+                                    <p:cond delay="0"/>
+                                  </p:stCondLst>
+                                  <p:childTnLst>
+                                    <p:set>
+                                      <p:cBhvr>
+                                        <p:cTn id="6" dur="1" fill="hold">
+                                          <p:stCondLst>
+                                            <p:cond delay="0"/>
+                                          </p:stCondLst>
+                                        </p:cTn>
+                                        <p:tgtEl>
+                                          <p:spTgt spid="17410">
+                                            <p:txEl>
+                                              <p:pRg st="1" end="1"/>
+                                            </p:txEl>
+                                          </p:spTgt>
+                                        </p:tgtEl>
+                                        <p:attrNameLst>
+                                          <p:attrName>style.visibility</p:attrName>
+                                        </p:attrNameLst>
+                                      </p:cBhvr>
+                                      <p:to>
+                                        <p:strVal val="visible"/>
+                                      </p:to>
+                                    </p:set>
+                                  </p:childTnLst>
+                                </p:cTn>
+                              </p:par>
+                            </p:childTnLst>
+                          </p:cTn>
+                        </p:par>
+                      </p:childTnLst>
+                    </p:cTn>
+                  </p:par>
+                  <p:par>
+                    <p:cTn id="7" fill="hold">
+                      <p:stCondLst>
+                        <p:cond delay="indefinite"/>
+                      </p:stCondLst>
+                      <p:childTnLst>
+                        <p:par>
+                          <p:cTn id="8" fill="hold">
+                            <p:stCondLst>
+                              <p:cond delay="0"/>
+                            </p:stCondLst>
+                            <p:childTnLst>
+                              <p:par>
+                                <p:cTn id="9" presetID="1" presetClass="entr" presetSubtype="0" fill="hold" nodeType="clickEffect">
+                                  <p:stCondLst>
+                                    <p:cond delay="0"/>
+                                  </p:stCondLst>
+                                  <p:childTnLst>
+                                    <p:set>
+                                      <p:cBhvr>
+                                        <p:cTn id="10" dur="1" fill="hold">
+                                          <p:stCondLst>
+                                            <p:cond delay="0"/>
+                                          </p:stCondLst>
+                                        </p:cTn>
+                                        <p:tgtEl>
+                                          <p:spTgt spid="17410">
+                                            <p:txEl>
+                                              <p:pRg st="2" end="2"/>
+                                            </p:txEl>
+                                          </p:spTgt>
+                                        </p:tgtEl>
+                                        <p:attrNameLst>
+                                          <p:attrName>style.visibility</p:attrName>
+                                        </p:attrNameLst>
+                                      </p:cBhvr>
+                                      <p:to>
+                                        <p:strVal val="visible"/>
+                                      </p:to>
+                                    </p:set>
+                                  </p:childTnLst>
+                                </p:cTn>
+                              </p:par>
+                            </p:childTnLst>
+                          </p:cTn>
+                        </p:par>
+                      </p:childTnLst>
+                    </p:cTn>
+                  </p:par>
+                  <p:par>
+                    <p:cTn id="11" fill="hold">
+                      <p:stCondLst>
+                        <p:cond delay="indefinite"/>
+                      </p:stCondLst>
+                      <p:childTnLst>
+                        <p:par>
+                          <p:cTn id="12" fill="hold">
+                            <p:stCondLst>
+                              <p:cond delay="0"/>
+                            </p:stCondLst>
+                            <p:childTnLst>
+                              <p:par>
+                                <p:cTn id="13" presetID="1" presetClass="entr" presetSubtype="0" fill="hold" nodeType="clickEffect">
+                                  <p:stCondLst>
+                                    <p:cond delay="0"/>
+                                  </p:stCondLst>
+                                  <p:childTnLst>
+                                    <p:set>
+                                      <p:cBhvr>
+                                        <p:cTn id="14" dur="1" fill="hold">
+                                          <p:stCondLst>
+                                            <p:cond delay="0"/>
+                                          </p:stCondLst>
+                                        </p:cTn>
+                                        <p:tgtEl>
+                                          <p:spTgt spid="17410">
+                                            <p:txEl>
+                                              <p:pRg st="3" end="3"/>
+                                            </p:txEl>
+                                          </p:spTgt>
+                                        </p:tgtEl>
+                                        <p:attrNameLst>
+                                          <p:attrName>style.visibility</p:attrName>
+                                        </p:attrNameLst>
+                                      </p:cBhvr>
+                                      <p:to>
+                                        <p:strVal val="visible"/>
+                                      </p:to>
+                                    </p:set>
+                                  </p:childTnLst>
+                                </p:cTn>
+                              </p:par>
+                            </p:childTnLst>
+                          </p:cTn>
+                        </p:par>
+                      </p:childTnLst>
+                    </p:cTn>
+                  </p:par>
+                  <p:par>
+                    <p:cTn id="15" fill="hold">
+                      <p:stCondLst>
+                        <p:cond delay="indefinite"/>
+                      </p:stCondLst>
+                      <p:childTnLst>
+                        <p:par>
+                          <p:cTn id="16" fill="hold">
+                            <p:stCondLst>
+                              <p:cond delay="0"/>
+                            </p:stCondLst>
+                            <p:childTnLst>
+                              <p:par>
+                                <p:cTn id="17" presetID="1" presetClass="entr" presetSubtype="0" fill="hold" nodeType="clickEffect">
+                                  <p:stCondLst>
+                                    <p:cond delay="0"/>
+                                  </p:stCondLst>
+                                  <p:childTnLst>
+                                    <p:set>
+                                      <p:cBhvr>
+                                        <p:cTn id="18" dur="1" fill="hold">
+                                          <p:stCondLst>
+                                            <p:cond delay="0"/>
+                                          </p:stCondLst>
+                                        </p:cTn>
+                                        <p:tgtEl>
+                                          <p:spTgt spid="17410">
+                                            <p:txEl>
+                                              <p:pRg st="4" end="4"/>
+                                            </p:txEl>
+                                          </p:spTgt>
+                                        </p:tgtEl>
+                                        <p:attrNameLst>
+                                          <p:attrName>style.visibility</p:attrName>
+                                        </p:attrNameLst>
+                                      </p:cBhvr>
+                                      <p:to>
+                                        <p:strVal val="visible"/>
+                                      </p:to>
+                                    </p:set>
+                                  </p:childTnLst>
+                                </p:cTn>
+                              </p:par>
+                              <p:par>
+                                <p:cTn id="19" presetID="1" presetClass="entr" presetSubtype="0" fill="hold" nodeType="withEffect">
+                                  <p:stCondLst>
+                                    <p:cond delay="0"/>
+                                  </p:stCondLst>
+                                  <p:childTnLst>
+                                    <p:set>
+                                      <p:cBhvr>
+                                        <p:cTn id="20" dur="1" fill="hold">
+                                          <p:stCondLst>
+                                            <p:cond delay="0"/>
+                                          </p:stCondLst>
+                                        </p:cTn>
+                                        <p:tgtEl>
+                                          <p:spTgt spid="17410">
+                                            <p:txEl>
+                                              <p:pRg st="5" end="5"/>
+                                            </p:txEl>
+                                          </p:spTgt>
+                                        </p:tgtEl>
+                                        <p:attrNameLst>
+                                          <p:attrName>style.visibility</p:attrName>
+                                        </p:attrNameLst>
+                                      </p:cBhvr>
+                                      <p:to>
+                                        <p:strVal val="visible"/>
+                                      </p:to>
+                                    </p:set>
+                                  </p:childTnLst>
+                                </p:cTn>
+                              </p:par>
+                              <p:par>
+                                <p:cTn id="21" presetID="1" presetClass="entr" presetSubtype="0" fill="hold" nodeType="withEffect">
+                                  <p:stCondLst>
+                                    <p:cond delay="0"/>
+                                  </p:stCondLst>
+                                  <p:childTnLst>
+                                    <p:set>
+                                      <p:cBhvr>
+                                        <p:cTn id="22" dur="1" fill="hold">
+                                          <p:stCondLst>
+                                            <p:cond delay="0"/>
+                                          </p:stCondLst>
+                                        </p:cTn>
+                                        <p:tgtEl>
+                                          <p:spTgt spid="17410">
+                                            <p:txEl>
+                                              <p:pRg st="6" end="6"/>
+                                            </p:txEl>
+                                          </p:spTgt>
+                                        </p:tgtEl>
+                                        <p:attrNameLst>
+                                          <p:attrName>style.visibility</p:attrName>
+                                        </p:attrNameLst>
+                                      </p:cBhvr>
+                                      <p:to>
+                                        <p:strVal val="visible"/>
+                                      </p:to>
+                                    </p:set>
+                                  </p:childTnLst>
+                                </p:cTn>
+                              </p:par>
+                              <p:par>
+                                <p:cTn id="23" presetID="1" presetClass="entr" presetSubtype="0" fill="hold" nodeType="withEffect">
+                                  <p:stCondLst>
+                                    <p:cond delay="0"/>
+                                  </p:stCondLst>
+                                  <p:childTnLst>
+                                    <p:set>
+                                      <p:cBhvr>
+                                        <p:cTn id="24" dur="1" fill="hold">
+                                          <p:stCondLst>
+                                            <p:cond delay="0"/>
+                                          </p:stCondLst>
+                                        </p:cTn>
+                                        <p:tgtEl>
+                                          <p:spTgt spid="17410">
+                                            <p:txEl>
+                                              <p:pRg st="7" end="7"/>
+                                            </p:txEl>
+                                          </p:spTgt>
+                                        </p:tgtEl>
+                                        <p:attrNameLst>
+                                          <p:attrName>style.visibility</p:attrName>
+                                        </p:attrNameLst>
+                                      </p:cBhvr>
+                                      <p:to>
+                                        <p:strVal val="visible"/>
+                                      </p:to>
+                                    </p:set>
+                                  </p:childTnLst>
+                                </p:cTn>
+                              </p:par>
+                            </p:childTnLst>
+                          </p:cTn>
+                        </p:par>
+                      </p:childTnLst>
+                    </p:cTn>
+                  </p:par>
+                  <p:par>
+                    <p:cTn id="25" fill="hold">
+                      <p:stCondLst>
+                        <p:cond delay="indefinite"/>
+                      </p:stCondLst>
+                      <p:childTnLst>
+                        <p:par>
+                          <p:cTn id="26" fill="hold">
+                            <p:stCondLst>
+                              <p:cond delay="0"/>
+                            </p:stCondLst>
+                            <p:childTnLst>
+                              <p:par>
+                                <p:cTn id="27" presetID="1" presetClass="entr" presetSubtype="0" fill="hold" nodeType="clickEffect">
+                                  <p:stCondLst>
+                                    <p:cond delay="0"/>
+                                  </p:stCondLst>
+                                  <p:childTnLst>
+                                    <p:set>
+                                      <p:cBhvr>
+                                        <p:cTn id="28" dur="1" fill="hold">
+                                          <p:stCondLst>
+                                            <p:cond delay="0"/>
+                                          </p:stCondLst>
+                                        </p:cTn>
+                                        <p:tgtEl>
+                                          <p:spTgt spid="17410">
+                                            <p:txEl>
+                                              <p:pRg st="8" end="8"/>
+                                            </p:txEl>
+                                          </p:spTgt>
+                                        </p:tgtEl>
+                                        <p:attrNameLst>
+                                          <p:attrName>style.visibility</p:attrName>
+                                        </p:attrNameLst>
+                                      </p:cBhvr>
+                                      <p:to>
+                                        <p:strVal val="visible"/>
+                                      </p:to>
+                                    </p:set>
+                                  </p:childTnLst>
+                                </p:cTn>
+                              </p:par>
+                            </p:childTnLst>
+                          </p:cTn>
+                        </p:par>
+                      </p:childTnLst>
+                    </p:cTn>
+                  </p:par>
+                </p:childTnLst>
+              </p:cTn>
+              <p:prevCondLst>
+                <p:cond evt="onPrev" delay="0">
+                  <p:tgtEl>
+                    <p:sldTgt/>
+                  </p:tgtEl>
+                </p:cond>
+              </p:prevCondLst>
+              <p:nextCondLst>
+                <p:cond evt="onNext" delay="0">
+                  <p:tgtEl>
+                    <p:sldTgt/>
+                  </p:tgtEl>
+                </p:cond>
+              </p:nextCondLst>
+            </p:seq>
+          </p:childTnLst>
+        </p:cTn>
+      </p:par>
+    </p:tnLst>
+  </p:timing>
+</p:sld>
+</file>
+
+<file path=ppt/slides/slide5.xml><?xml version="1.0" encoding="utf-8"?>
 <p:sld xmlns:a="http://schemas.openxmlformats.org/drawingml/2006/main" xmlns:r="http://schemas.openxmlformats.org/officeDocument/2006/relationships" xmlns:p="http://schemas.openxmlformats.org/presentationml/2006/main" show="0">
   <p:cSld>
     <p:spTree>
@@ -9532,10 +10566,18 @@
   <p:clrMapOvr>
     <a:masterClrMapping/>
   </p:clrMapOvr>
+  <mc:AlternateContent xmlns:mc="http://schemas.openxmlformats.org/markup-compatibility/2006" xmlns:p14="http://schemas.microsoft.com/office/powerpoint/2010/main">
+    <mc:Choice Requires="p14">
+      <p:transition spd="slow" p14:dur="2000"/>
+    </mc:Choice>
+    <mc:Fallback xmlns="">
+      <p:transition spd="slow"/>
+    </mc:Fallback>
+  </mc:AlternateContent>
 </p:sld>
 </file>
 
-<file path=ppt/slides/slide5.xml><?xml version="1.0" encoding="utf-8"?>
+<file path=ppt/slides/slide6.xml><?xml version="1.0" encoding="utf-8"?>
 <p:sld xmlns:a="http://schemas.openxmlformats.org/drawingml/2006/main" xmlns:r="http://schemas.openxmlformats.org/officeDocument/2006/relationships" xmlns:p="http://schemas.openxmlformats.org/presentationml/2006/main">
   <p:cSld>
     <p:spTree>
@@ -9775,7 +10817,7 @@
 </p:sld>
 </file>
 
-<file path=ppt/slides/slide6.xml><?xml version="1.0" encoding="utf-8"?>
+<file path=ppt/slides/slide7.xml><?xml version="1.0" encoding="utf-8"?>
 <p:sld xmlns:a="http://schemas.openxmlformats.org/drawingml/2006/main" xmlns:r="http://schemas.openxmlformats.org/officeDocument/2006/relationships" xmlns:p="http://schemas.openxmlformats.org/presentationml/2006/main">
   <p:cSld>
     <p:spTree>
@@ -10050,196 +11092,6 @@
 </p:sld>
 </file>
 
-<file path=ppt/slides/slide7.xml><?xml version="1.0" encoding="utf-8"?>
-<p:sld xmlns:a="http://schemas.openxmlformats.org/drawingml/2006/main" xmlns:r="http://schemas.openxmlformats.org/officeDocument/2006/relationships" xmlns:p="http://schemas.openxmlformats.org/presentationml/2006/main">
-  <p:cSld>
-    <p:spTree>
-      <p:nvGrpSpPr>
-        <p:cNvPr id="1" name=""/>
-        <p:cNvGrpSpPr/>
-        <p:nvPr/>
-      </p:nvGrpSpPr>
-      <p:grpSpPr>
-        <a:xfrm>
-          <a:off x="0" y="0"/>
-          <a:ext cx="0" cy="0"/>
-          <a:chOff x="0" y="0"/>
-          <a:chExt cx="0" cy="0"/>
-        </a:xfrm>
-      </p:grpSpPr>
-      <p:sp>
-        <p:nvSpPr>
-          <p:cNvPr id="17410" name="Inhaltsplatzhalter 2"/>
-          <p:cNvSpPr>
-            <a:spLocks noGrp="1"/>
-          </p:cNvSpPr>
-          <p:nvPr>
-            <p:ph idx="1"/>
-          </p:nvPr>
-        </p:nvSpPr>
-        <p:spPr>
-          <a:xfrm>
-            <a:off x="303213" y="1462108"/>
-            <a:ext cx="8589962" cy="4824412"/>
-          </a:xfrm>
-        </p:spPr>
-        <p:txBody>
-          <a:bodyPr/>
-          <a:lstStyle/>
-          <a:p>
-            <a:pPr>
-              <a:buNone/>
-            </a:pPr>
-            <a:r>
-              <a:rPr lang="de-DE" sz="2000" b="1" dirty="0"/>
-              <a:t>Donnerstag, 27.02.2020</a:t>
-            </a:r>
-          </a:p>
-          <a:p>
-            <a:pPr>
-              <a:buNone/>
-            </a:pPr>
-            <a:r>
-              <a:rPr lang="de-DE" sz="2000" b="1" dirty="0"/>
-              <a:t>Freitag, 28.02.2020</a:t>
-            </a:r>
-          </a:p>
-          <a:p>
-            <a:pPr>
-              <a:buNone/>
-            </a:pPr>
-            <a:r>
-              <a:rPr lang="de-DE" sz="2000" b="1" dirty="0">
-                <a:solidFill>
-                  <a:schemeClr val="bg1"/>
-                </a:solidFill>
-              </a:rPr>
-              <a:t>Mittwoch, 20.03.2019</a:t>
-            </a:r>
-          </a:p>
-          <a:p>
-            <a:pPr>
-              <a:buNone/>
-            </a:pPr>
-            <a:endParaRPr lang="de-DE" altLang="de-DE" dirty="0">
-              <a:ea typeface="+mn-ea"/>
-              <a:cs typeface="+mn-cs"/>
-            </a:endParaRPr>
-          </a:p>
-          <a:p>
-            <a:pPr marL="342900" lvl="1" indent="-342900">
-              <a:buFont typeface="Arial" charset="0"/>
-              <a:buChar char="●"/>
-            </a:pPr>
-            <a:r>
-              <a:rPr lang="de-DE" altLang="de-DE" dirty="0">
-                <a:ea typeface="+mn-ea"/>
-                <a:cs typeface="+mn-cs"/>
-              </a:rPr>
-              <a:t>Beginn:		  9:00 Uhr (Freitag: 10:30 Uhr)</a:t>
-            </a:r>
-          </a:p>
-          <a:p>
-            <a:pPr marL="342900" lvl="1" indent="-342900">
-              <a:buFont typeface="Arial" charset="0"/>
-              <a:buChar char="●"/>
-            </a:pPr>
-            <a:r>
-              <a:rPr lang="de-DE" altLang="de-DE" dirty="0">
-                <a:ea typeface="+mn-ea"/>
-                <a:cs typeface="+mn-cs"/>
-              </a:rPr>
-              <a:t>Kaffeepause:          ~ 10:30 Uhr</a:t>
-            </a:r>
-          </a:p>
-          <a:p>
-            <a:pPr marL="342900" lvl="1" indent="-342900">
-              <a:buFont typeface="Arial" charset="0"/>
-              <a:buChar char="●"/>
-            </a:pPr>
-            <a:r>
-              <a:rPr lang="de-DE" altLang="de-DE" dirty="0">
-                <a:ea typeface="+mn-ea"/>
-                <a:cs typeface="+mn-cs"/>
-              </a:rPr>
-              <a:t>Mittagspause: 	12:00 bis 13:00 Uhr</a:t>
-            </a:r>
-          </a:p>
-          <a:p>
-            <a:pPr marL="342900" lvl="1" indent="-342900">
-              <a:buFont typeface="Arial" charset="0"/>
-              <a:buChar char="●"/>
-            </a:pPr>
-            <a:r>
-              <a:rPr lang="de-DE" altLang="de-DE" dirty="0">
-                <a:ea typeface="+mn-ea"/>
-                <a:cs typeface="+mn-cs"/>
-              </a:rPr>
-              <a:t>Ende: 		17:00 Uhr </a:t>
-            </a:r>
-            <a:r>
-              <a:rPr lang="de-DE" altLang="de-DE" dirty="0">
-                <a:solidFill>
-                  <a:schemeClr val="bg1"/>
-                </a:solidFill>
-                <a:ea typeface="+mn-ea"/>
-                <a:cs typeface="+mn-cs"/>
-              </a:rPr>
-              <a:t>(heute: 17:00 Uhr)</a:t>
-            </a:r>
-          </a:p>
-          <a:p>
-            <a:pPr marL="342900" lvl="1" indent="-342900">
-              <a:buFont typeface="Arial" charset="0"/>
-              <a:buChar char="●"/>
-            </a:pPr>
-            <a:endParaRPr lang="de-DE" altLang="de-DE" dirty="0">
-              <a:ea typeface="+mn-ea"/>
-              <a:cs typeface="+mn-cs"/>
-            </a:endParaRPr>
-          </a:p>
-        </p:txBody>
-      </p:sp>
-      <p:sp>
-        <p:nvSpPr>
-          <p:cNvPr id="17411" name="Rectangle 1062"/>
-          <p:cNvSpPr>
-            <a:spLocks noGrp="1" noChangeArrowheads="1"/>
-          </p:cNvSpPr>
-          <p:nvPr>
-            <p:ph type="title"/>
-          </p:nvPr>
-        </p:nvSpPr>
-        <p:spPr>
-          <a:xfrm>
-            <a:off x="285750" y="142875"/>
-            <a:ext cx="5654675" cy="706438"/>
-          </a:xfrm>
-        </p:spPr>
-        <p:txBody>
-          <a:bodyPr/>
-          <a:lstStyle/>
-          <a:p>
-            <a:r>
-              <a:rPr lang="de-DE" dirty="0"/>
-              <a:t>Zeitplan</a:t>
-            </a:r>
-          </a:p>
-        </p:txBody>
-      </p:sp>
-    </p:spTree>
-    <p:extLst>
-      <p:ext uri="{BB962C8B-B14F-4D97-AF65-F5344CB8AC3E}">
-        <p14:creationId xmlns:p14="http://schemas.microsoft.com/office/powerpoint/2010/main" val="2151462665"/>
-      </p:ext>
-    </p:extLst>
-  </p:cSld>
-  <p:clrMapOvr>
-    <a:masterClrMapping/>
-  </p:clrMapOvr>
-</p:sld>
-</file>
-
 <file path=ppt/slides/slide8.xml><?xml version="1.0" encoding="utf-8"?>
 <p:sld xmlns:a="http://schemas.openxmlformats.org/drawingml/2006/main" xmlns:r="http://schemas.openxmlformats.org/officeDocument/2006/relationships" xmlns:p="http://schemas.openxmlformats.org/presentationml/2006/main">
   <p:cSld>
@@ -10281,38 +11133,49 @@
               <a:buNone/>
             </a:pPr>
             <a:r>
+              <a:rPr lang="de-DE" sz="2000" b="1" dirty="0" smtClean="0"/>
+              <a:t>Mittwoch, 26.05.2021</a:t>
+            </a:r>
+          </a:p>
+          <a:p>
+            <a:pPr>
+              <a:buNone/>
+            </a:pPr>
+            <a:r>
+              <a:rPr lang="de-DE" sz="2000" b="1" dirty="0" smtClean="0"/>
+              <a:t>Donnerstag, 27.05.2021</a:t>
+            </a:r>
+            <a:endParaRPr lang="de-DE" sz="2000" b="1" dirty="0"/>
+          </a:p>
+          <a:p>
+            <a:pPr>
+              <a:buNone/>
+            </a:pPr>
+            <a:r>
               <a:rPr lang="de-DE" sz="2000" b="1" dirty="0"/>
-              <a:t>Vorgehen</a:t>
-            </a:r>
-          </a:p>
-          <a:p>
-            <a:pPr marL="342900" lvl="1" indent="-342900">
-              <a:buFont typeface="Arial" charset="0"/>
-              <a:buChar char="●"/>
-            </a:pPr>
-            <a:r>
-              <a:rPr lang="de-DE" altLang="de-DE" dirty="0">
-                <a:ea typeface="+mn-ea"/>
-                <a:cs typeface="+mn-cs"/>
-              </a:rPr>
-              <a:t>Präsentation und Übung im Wechsel</a:t>
-            </a:r>
-          </a:p>
-          <a:p>
-            <a:pPr marL="342900" lvl="1" indent="-342900">
-              <a:buFont typeface="Arial" charset="0"/>
-              <a:buChar char="●"/>
-            </a:pPr>
-            <a:r>
-              <a:rPr lang="de-DE" altLang="de-DE" dirty="0">
-                <a:ea typeface="+mn-ea"/>
-                <a:cs typeface="+mn-cs"/>
-              </a:rPr>
-              <a:t>Besprechung der Musterlösungen</a:t>
-            </a:r>
-          </a:p>
-          <a:p>
-            <a:pPr marL="0" lvl="1" indent="0">
+              <a:t>Freitag, </a:t>
+            </a:r>
+            <a:r>
+              <a:rPr lang="de-DE" sz="2000" b="1" dirty="0" smtClean="0"/>
+              <a:t>28.05.2021</a:t>
+            </a:r>
+            <a:endParaRPr lang="de-DE" sz="2000" b="1" dirty="0"/>
+          </a:p>
+          <a:p>
+            <a:pPr>
+              <a:buNone/>
+            </a:pPr>
+            <a:r>
+              <a:rPr lang="de-DE" sz="2000" b="1" dirty="0">
+                <a:solidFill>
+                  <a:schemeClr val="bg1"/>
+                </a:solidFill>
+              </a:rPr>
+              <a:t>Mittwoch, 20.03.2019</a:t>
+            </a:r>
+          </a:p>
+          <a:p>
+            <a:pPr>
               <a:buNone/>
             </a:pPr>
             <a:endParaRPr lang="de-DE" altLang="de-DE" dirty="0">
@@ -10321,18 +11184,6 @@
             </a:endParaRPr>
           </a:p>
           <a:p>
-            <a:pPr marL="0" lvl="1" indent="0">
-              <a:buNone/>
-            </a:pPr>
-            <a:r>
-              <a:rPr lang="de-DE" altLang="de-DE" b="1" dirty="0">
-                <a:ea typeface="+mn-ea"/>
-                <a:cs typeface="+mn-cs"/>
-              </a:rPr>
-              <a:t>Unterlagen</a:t>
-            </a:r>
-          </a:p>
-          <a:p>
             <a:pPr marL="342900" lvl="1" indent="-342900">
               <a:buFont typeface="Arial" charset="0"/>
               <a:buChar char="●"/>
@@ -10342,40 +11193,15 @@
                 <a:ea typeface="+mn-ea"/>
                 <a:cs typeface="+mn-cs"/>
               </a:rPr>
-              <a:t>Folien</a:t>
-            </a:r>
-          </a:p>
-          <a:p>
-            <a:pPr marL="342900" lvl="1" indent="-342900">
-              <a:buFont typeface="Arial" charset="0"/>
-              <a:buChar char="●"/>
-            </a:pPr>
-            <a:r>
-              <a:rPr lang="de-DE" altLang="de-DE" dirty="0">
+              <a:t>Beginn:		  9:00 </a:t>
+            </a:r>
+            <a:r>
+              <a:rPr lang="de-DE" altLang="de-DE" dirty="0" smtClean="0">
                 <a:ea typeface="+mn-ea"/>
                 <a:cs typeface="+mn-cs"/>
               </a:rPr>
-              <a:t>Übungsblätter</a:t>
-            </a:r>
-          </a:p>
-          <a:p>
-            <a:pPr marL="342900" lvl="1" indent="-342900">
-              <a:buFont typeface="Arial" charset="0"/>
-              <a:buChar char="●"/>
-            </a:pPr>
-            <a:r>
-              <a:rPr lang="de-DE" altLang="de-DE" dirty="0">
-                <a:ea typeface="+mn-ea"/>
-                <a:cs typeface="+mn-cs"/>
-              </a:rPr>
-              <a:t>Musterlösung</a:t>
-            </a:r>
-          </a:p>
-          <a:p>
-            <a:pPr marL="342900" lvl="1" indent="-342900">
-              <a:buFont typeface="Arial" charset="0"/>
-              <a:buChar char="●"/>
-            </a:pPr>
+              <a:t>Uhr</a:t>
+            </a:r>
             <a:endParaRPr lang="de-DE" altLang="de-DE" dirty="0">
               <a:ea typeface="+mn-ea"/>
               <a:cs typeface="+mn-cs"/>
@@ -10387,13 +11213,71 @@
               <a:buChar char="●"/>
             </a:pPr>
             <a:r>
-              <a:rPr lang="de-DE" u="sng" dirty="0"/>
-              <a:t>https://github.com/anderscore-gmbh/wicket-2020.02</a:t>
-            </a:r>
+              <a:rPr lang="de-DE" altLang="de-DE" dirty="0">
+                <a:ea typeface="+mn-ea"/>
+                <a:cs typeface="+mn-cs"/>
+              </a:rPr>
+              <a:t>Kaffeepause:          ~ 10:30 Uhr</a:t>
+            </a:r>
+          </a:p>
+          <a:p>
+            <a:pPr marL="342900" lvl="1" indent="-342900">
+              <a:buFont typeface="Arial" charset="0"/>
+              <a:buChar char="●"/>
+            </a:pPr>
+            <a:r>
+              <a:rPr lang="de-DE" altLang="de-DE" dirty="0">
+                <a:ea typeface="+mn-ea"/>
+                <a:cs typeface="+mn-cs"/>
+              </a:rPr>
+              <a:t>Mittagspause: 	12:00 bis 13:00 Uhr</a:t>
+            </a:r>
+          </a:p>
+          <a:p>
+            <a:pPr marL="342900" lvl="1" indent="-342900">
+              <a:buFont typeface="Arial" charset="0"/>
+              <a:buChar char="●"/>
+            </a:pPr>
+            <a:r>
+              <a:rPr lang="de-DE" altLang="de-DE" dirty="0">
+                <a:ea typeface="+mn-ea"/>
+                <a:cs typeface="+mn-cs"/>
+              </a:rPr>
+              <a:t>Ende: 		</a:t>
+            </a:r>
+            <a:r>
+              <a:rPr lang="de-DE" altLang="de-DE" dirty="0" smtClean="0">
+                <a:ea typeface="+mn-ea"/>
+                <a:cs typeface="+mn-cs"/>
+              </a:rPr>
+              <a:t>16:00 </a:t>
+            </a:r>
+            <a:r>
+              <a:rPr lang="de-DE" altLang="de-DE" dirty="0">
+                <a:ea typeface="+mn-ea"/>
+                <a:cs typeface="+mn-cs"/>
+              </a:rPr>
+              <a:t>Uhr </a:t>
+            </a:r>
+            <a:r>
+              <a:rPr lang="de-DE" altLang="de-DE" dirty="0">
+                <a:solidFill>
+                  <a:schemeClr val="bg1"/>
+                </a:solidFill>
+                <a:ea typeface="+mn-ea"/>
+                <a:cs typeface="+mn-cs"/>
+              </a:rPr>
+              <a:t>(heute: 17:00 Uhr)</a:t>
+            </a:r>
+          </a:p>
+          <a:p>
+            <a:pPr marL="342900" lvl="1" indent="-342900">
+              <a:buFont typeface="Arial" charset="0"/>
+              <a:buChar char="●"/>
+            </a:pPr>
             <a:endParaRPr lang="de-DE" altLang="de-DE" dirty="0">
-              <a:solidFill>
-                <a:srgbClr val="FF0000"/>
-              </a:solidFill>
+              <a:ea typeface="+mn-ea"/>
+              <a:cs typeface="+mn-cs"/>
             </a:endParaRPr>
           </a:p>
         </p:txBody>
@@ -10420,7 +11304,7 @@
           <a:p>
             <a:r>
               <a:rPr lang="de-DE" dirty="0"/>
-              <a:t>Organisation</a:t>
+              <a:t>Zeitplan</a:t>
             </a:r>
           </a:p>
         </p:txBody>
@@ -10428,7 +11312,7 @@
     </p:spTree>
     <p:extLst>
       <p:ext uri="{BB962C8B-B14F-4D97-AF65-F5344CB8AC3E}">
-        <p14:creationId xmlns:p14="http://schemas.microsoft.com/office/powerpoint/2010/main" val="863426444"/>
+        <p14:creationId xmlns:p14="http://schemas.microsoft.com/office/powerpoint/2010/main" val="2151462665"/>
       </p:ext>
     </p:extLst>
   </p:cSld>
@@ -10457,273 +11341,199 @@
       </p:grpSpPr>
       <p:sp>
         <p:nvSpPr>
-          <p:cNvPr id="2" name="Titel 1"/>
+          <p:cNvPr id="17410" name="Inhaltsplatzhalter 2"/>
           <p:cNvSpPr>
             <a:spLocks noGrp="1"/>
+          </p:cNvSpPr>
+          <p:nvPr>
+            <p:ph idx="1"/>
+          </p:nvPr>
+        </p:nvSpPr>
+        <p:spPr>
+          <a:xfrm>
+            <a:off x="303213" y="1462108"/>
+            <a:ext cx="8589962" cy="4824412"/>
+          </a:xfrm>
+        </p:spPr>
+        <p:txBody>
+          <a:bodyPr/>
+          <a:lstStyle/>
+          <a:p>
+            <a:pPr>
+              <a:buNone/>
+            </a:pPr>
+            <a:r>
+              <a:rPr lang="de-DE" sz="2000" b="1" dirty="0"/>
+              <a:t>Vorgehen</a:t>
+            </a:r>
+          </a:p>
+          <a:p>
+            <a:pPr marL="342900" lvl="1" indent="-342900">
+              <a:buFont typeface="Arial" charset="0"/>
+              <a:buChar char="●"/>
+            </a:pPr>
+            <a:r>
+              <a:rPr lang="de-DE" altLang="de-DE" dirty="0">
+                <a:ea typeface="+mn-ea"/>
+                <a:cs typeface="+mn-cs"/>
+              </a:rPr>
+              <a:t>Präsentation und Übung im Wechsel</a:t>
+            </a:r>
+          </a:p>
+          <a:p>
+            <a:pPr marL="342900" lvl="1" indent="-342900">
+              <a:buFont typeface="Arial" charset="0"/>
+              <a:buChar char="●"/>
+            </a:pPr>
+            <a:r>
+              <a:rPr lang="de-DE" altLang="de-DE" dirty="0">
+                <a:ea typeface="+mn-ea"/>
+                <a:cs typeface="+mn-cs"/>
+              </a:rPr>
+              <a:t>Besprechung der Musterlösungen</a:t>
+            </a:r>
+          </a:p>
+          <a:p>
+            <a:pPr marL="0" lvl="1" indent="0">
+              <a:buNone/>
+            </a:pPr>
+            <a:endParaRPr lang="de-DE" altLang="de-DE" dirty="0">
+              <a:ea typeface="+mn-ea"/>
+              <a:cs typeface="+mn-cs"/>
+            </a:endParaRPr>
+          </a:p>
+          <a:p>
+            <a:pPr marL="0" lvl="1" indent="0">
+              <a:buNone/>
+            </a:pPr>
+            <a:r>
+              <a:rPr lang="de-DE" altLang="de-DE" b="1" dirty="0">
+                <a:ea typeface="+mn-ea"/>
+                <a:cs typeface="+mn-cs"/>
+              </a:rPr>
+              <a:t>Unterlagen</a:t>
+            </a:r>
+          </a:p>
+          <a:p>
+            <a:pPr marL="342900" lvl="1" indent="-342900">
+              <a:buFont typeface="Arial" charset="0"/>
+              <a:buChar char="●"/>
+            </a:pPr>
+            <a:r>
+              <a:rPr lang="de-DE" altLang="de-DE" dirty="0">
+                <a:ea typeface="+mn-ea"/>
+                <a:cs typeface="+mn-cs"/>
+              </a:rPr>
+              <a:t>Folien</a:t>
+            </a:r>
+          </a:p>
+          <a:p>
+            <a:pPr marL="342900" lvl="1" indent="-342900">
+              <a:buFont typeface="Arial" charset="0"/>
+              <a:buChar char="●"/>
+            </a:pPr>
+            <a:r>
+              <a:rPr lang="de-DE" altLang="de-DE" dirty="0">
+                <a:ea typeface="+mn-ea"/>
+                <a:cs typeface="+mn-cs"/>
+              </a:rPr>
+              <a:t>Übungsblätter</a:t>
+            </a:r>
+          </a:p>
+          <a:p>
+            <a:pPr marL="342900" lvl="1" indent="-342900">
+              <a:buFont typeface="Arial" charset="0"/>
+              <a:buChar char="●"/>
+            </a:pPr>
+            <a:r>
+              <a:rPr lang="de-DE" altLang="de-DE" dirty="0">
+                <a:ea typeface="+mn-ea"/>
+                <a:cs typeface="+mn-cs"/>
+              </a:rPr>
+              <a:t>Musterlösung</a:t>
+            </a:r>
+          </a:p>
+          <a:p>
+            <a:pPr marL="342900" lvl="1" indent="-342900">
+              <a:buFont typeface="Arial" charset="0"/>
+              <a:buChar char="●"/>
+            </a:pPr>
+            <a:endParaRPr lang="de-DE" altLang="de-DE" dirty="0" smtClean="0">
+              <a:ea typeface="+mn-ea"/>
+              <a:cs typeface="+mn-cs"/>
+            </a:endParaRPr>
+          </a:p>
+          <a:p>
+            <a:pPr marL="342900" lvl="1" indent="-342900">
+              <a:buFont typeface="Arial" charset="0"/>
+              <a:buChar char="●"/>
+            </a:pPr>
+            <a:r>
+              <a:rPr lang="de-DE" altLang="de-DE" sz="6000" dirty="0" smtClean="0">
+                <a:solidFill>
+                  <a:srgbClr val="FF0000"/>
+                </a:solidFill>
+                <a:ea typeface="+mn-ea"/>
+                <a:cs typeface="+mn-cs"/>
+              </a:rPr>
+              <a:t>TODO</a:t>
+            </a:r>
+            <a:endParaRPr lang="de-DE" altLang="de-DE" sz="6000" dirty="0">
+              <a:solidFill>
+                <a:srgbClr val="FF0000"/>
+              </a:solidFill>
+              <a:ea typeface="+mn-ea"/>
+              <a:cs typeface="+mn-cs"/>
+            </a:endParaRPr>
+          </a:p>
+          <a:p>
+            <a:pPr marL="342900" lvl="1" indent="-342900">
+              <a:buFont typeface="Arial" charset="0"/>
+              <a:buChar char="●"/>
+            </a:pPr>
+            <a:r>
+              <a:rPr lang="de-DE" u="sng" dirty="0"/>
+              <a:t>https://github.com/anderscore-gmbh/wicket-2020.02</a:t>
+            </a:r>
+            <a:endParaRPr lang="de-DE" altLang="de-DE" dirty="0">
+              <a:solidFill>
+                <a:srgbClr val="FF0000"/>
+              </a:solidFill>
+            </a:endParaRPr>
+          </a:p>
+        </p:txBody>
+      </p:sp>
+      <p:sp>
+        <p:nvSpPr>
+          <p:cNvPr id="17411" name="Rectangle 1062"/>
+          <p:cNvSpPr>
+            <a:spLocks noGrp="1" noChangeArrowheads="1"/>
           </p:cNvSpPr>
           <p:nvPr>
             <p:ph type="title"/>
           </p:nvPr>
         </p:nvSpPr>
-        <p:spPr/>
+        <p:spPr>
+          <a:xfrm>
+            <a:off x="285750" y="142875"/>
+            <a:ext cx="5654675" cy="706438"/>
+          </a:xfrm>
+        </p:spPr>
         <p:txBody>
           <a:bodyPr/>
           <a:lstStyle/>
           <a:p>
             <a:r>
               <a:rPr lang="de-DE" dirty="0"/>
-              <a:t>Literatur</a:t>
-            </a:r>
-          </a:p>
-        </p:txBody>
-      </p:sp>
-      <p:sp>
-        <p:nvSpPr>
-          <p:cNvPr id="3" name="Inhaltsplatzhalter 2"/>
-          <p:cNvSpPr>
-            <a:spLocks noGrp="1"/>
-          </p:cNvSpPr>
-          <p:nvPr>
-            <p:ph idx="1"/>
-          </p:nvPr>
-        </p:nvSpPr>
-        <p:spPr/>
-        <p:txBody>
-          <a:bodyPr/>
-          <a:lstStyle/>
-          <a:p>
-            <a:endParaRPr lang="de-DE" sz="3600" dirty="0"/>
-          </a:p>
-          <a:p>
-            <a:pPr>
-              <a:buFont typeface="Arial" panose="020B0604020202020204" pitchFamily="34" charset="0"/>
-              <a:buChar char="•"/>
-            </a:pPr>
-            <a:r>
-              <a:rPr lang="de-DE" sz="2600" i="1" dirty="0"/>
-              <a:t>Apache </a:t>
-            </a:r>
-            <a:r>
-              <a:rPr lang="de-DE" sz="2600" i="1" dirty="0" err="1"/>
-              <a:t>Wicket</a:t>
-            </a:r>
-            <a:r>
-              <a:rPr lang="de-DE" sz="2600" i="1" dirty="0"/>
-              <a:t> User Guide - Reference </a:t>
-            </a:r>
-            <a:r>
-              <a:rPr lang="de-DE" sz="2600" i="1" dirty="0" err="1"/>
-              <a:t>Documentation</a:t>
-            </a:r>
-            <a:r>
-              <a:rPr lang="de-DE" sz="2600" i="1" dirty="0"/>
-              <a:t>, Version 8</a:t>
-            </a:r>
-            <a:br>
-              <a:rPr lang="de-DE" i="1" dirty="0"/>
-            </a:br>
-            <a:r>
-              <a:rPr lang="de-DE" sz="2000" dirty="0" err="1"/>
-              <a:t>A.Del</a:t>
-            </a:r>
-            <a:r>
-              <a:rPr lang="de-DE" sz="2000" dirty="0"/>
-              <a:t> </a:t>
-            </a:r>
-            <a:r>
-              <a:rPr lang="de-DE" sz="2000" dirty="0" err="1"/>
-              <a:t>Bene</a:t>
-            </a:r>
-            <a:r>
-              <a:rPr lang="de-DE" sz="2000" dirty="0"/>
-              <a:t>, </a:t>
-            </a:r>
-            <a:r>
-              <a:rPr lang="de-DE" sz="2000" dirty="0" err="1"/>
-              <a:t>M.Grigorov</a:t>
-            </a:r>
-            <a:r>
-              <a:rPr lang="de-DE" sz="2000" dirty="0"/>
-              <a:t>, </a:t>
-            </a:r>
-            <a:r>
-              <a:rPr lang="de-DE" sz="2000" dirty="0" err="1"/>
-              <a:t>C.Hufe</a:t>
-            </a:r>
-            <a:r>
-              <a:rPr lang="de-DE" sz="2000" dirty="0"/>
-              <a:t>, </a:t>
-            </a:r>
-            <a:r>
-              <a:rPr lang="de-DE" sz="2000" dirty="0" err="1"/>
-              <a:t>C.Kroemer</a:t>
-            </a:r>
-            <a:r>
-              <a:rPr lang="de-DE" sz="2000" dirty="0"/>
-              <a:t>, </a:t>
-            </a:r>
-            <a:r>
-              <a:rPr lang="de-DE" sz="2000" dirty="0" err="1"/>
-              <a:t>D.Bartl</a:t>
-            </a:r>
-            <a:r>
-              <a:rPr lang="de-DE" sz="2000" dirty="0"/>
-              <a:t>, </a:t>
-            </a:r>
-            <a:r>
-              <a:rPr lang="de-DE" sz="2000" dirty="0" err="1"/>
-              <a:t>P.Borș</a:t>
-            </a:r>
-            <a:r>
-              <a:rPr lang="de-DE" sz="2000" dirty="0"/>
-              <a:t>, </a:t>
-            </a:r>
-            <a:r>
-              <a:rPr lang="de-DE" sz="2000" dirty="0" err="1"/>
-              <a:t>T.Soloschenko</a:t>
-            </a:r>
-            <a:r>
-              <a:rPr lang="de-DE" sz="2000" dirty="0"/>
-              <a:t>, </a:t>
-            </a:r>
-            <a:r>
-              <a:rPr lang="de-DE" sz="2000" dirty="0" err="1"/>
-              <a:t>I.Vaynberg</a:t>
-            </a:r>
-            <a:r>
-              <a:rPr lang="de-DE" sz="2000" dirty="0"/>
-              <a:t>, </a:t>
-            </a:r>
-            <a:r>
-              <a:rPr lang="de-DE" sz="2000" dirty="0" err="1"/>
-              <a:t>J.Rohde</a:t>
-            </a:r>
-            <a:r>
-              <a:rPr lang="de-DE" sz="2000" dirty="0"/>
-              <a:t>:</a:t>
-            </a:r>
-            <a:br>
-              <a:rPr lang="de-DE" sz="2000" dirty="0"/>
-            </a:br>
-            <a:r>
-              <a:rPr lang="de-DE" sz="2000" dirty="0">
-                <a:hlinkClick r:id="rId2"/>
-              </a:rPr>
-              <a:t>https://ci.apache.org/projects/wicket/guide/8.x/single.html</a:t>
-            </a:r>
-            <a:endParaRPr lang="de-DE" sz="2000" dirty="0"/>
-          </a:p>
-          <a:p>
-            <a:endParaRPr lang="de-DE" sz="3600" i="1" dirty="0"/>
-          </a:p>
-          <a:p>
-            <a:pPr>
-              <a:buFont typeface="Arial" panose="020B0604020202020204" pitchFamily="34" charset="0"/>
-              <a:buChar char="•"/>
-            </a:pPr>
-            <a:r>
-              <a:rPr lang="en-US" sz="2600" i="1" dirty="0"/>
-              <a:t>Wicket in Action</a:t>
-            </a:r>
-            <a:br>
-              <a:rPr lang="en-US" i="1" dirty="0"/>
-            </a:br>
-            <a:r>
-              <a:rPr lang="en-US" sz="2000" dirty="0" err="1"/>
-              <a:t>M.Dashorst</a:t>
-            </a:r>
-            <a:r>
-              <a:rPr lang="en-US" sz="2000" dirty="0"/>
-              <a:t>, E. </a:t>
-            </a:r>
-            <a:r>
-              <a:rPr lang="en-US" sz="2000" dirty="0" err="1"/>
-              <a:t>Hillenius</a:t>
-            </a:r>
-            <a:br>
-              <a:rPr lang="en-US" sz="2000" i="1" dirty="0"/>
-            </a:br>
-            <a:r>
-              <a:rPr lang="en-US" sz="2000" dirty="0"/>
-              <a:t>Manning, 2008.</a:t>
-            </a:r>
-          </a:p>
-          <a:p>
-            <a:endParaRPr lang="en-US" sz="2000" i="1" dirty="0"/>
-          </a:p>
-          <a:p>
-            <a:pPr marL="0" indent="0">
-              <a:buNone/>
-            </a:pPr>
-            <a:r>
-              <a:rPr lang="en-US" sz="2000" i="1" dirty="0" err="1"/>
-              <a:t>Hinweis</a:t>
-            </a:r>
-            <a:r>
-              <a:rPr lang="en-US" sz="2000" i="1" dirty="0"/>
-              <a:t>: </a:t>
-            </a:r>
-            <a:r>
-              <a:rPr lang="en-US" sz="2000" i="1" dirty="0" err="1"/>
-              <a:t>Viele</a:t>
-            </a:r>
-            <a:r>
-              <a:rPr lang="en-US" sz="2000" i="1" dirty="0"/>
-              <a:t> Code-</a:t>
-            </a:r>
-            <a:r>
-              <a:rPr lang="en-US" sz="2000" i="1" dirty="0" err="1"/>
-              <a:t>Beispiele</a:t>
-            </a:r>
-            <a:r>
-              <a:rPr lang="en-US" sz="2000" i="1" dirty="0"/>
-              <a:t> </a:t>
-            </a:r>
-            <a:r>
-              <a:rPr lang="en-US" sz="2000" i="1" dirty="0" err="1"/>
-              <a:t>basieren</a:t>
-            </a:r>
-            <a:r>
-              <a:rPr lang="en-US" sz="2000" i="1" dirty="0"/>
-              <a:t> auf </a:t>
-            </a:r>
-            <a:r>
-              <a:rPr lang="en-US" sz="2000" i="1" dirty="0" err="1"/>
-              <a:t>dem</a:t>
-            </a:r>
-            <a:r>
-              <a:rPr lang="en-US" sz="2000" i="1" dirty="0"/>
-              <a:t> </a:t>
-            </a:r>
-            <a:r>
-              <a:rPr lang="en-US" sz="2000" i="1" dirty="0" err="1"/>
-              <a:t>Buch</a:t>
-            </a:r>
-            <a:r>
-              <a:rPr lang="en-US" sz="2000" i="1" dirty="0"/>
-              <a:t> “Wicket in Action”. </a:t>
-            </a:r>
-            <a:r>
-              <a:rPr lang="en-US" sz="2000" i="1" dirty="0">
-                <a:hlinkClick r:id="rId3"/>
-              </a:rPr>
-              <a:t>http://wicketinaction.com/downloads/</a:t>
-            </a:r>
-            <a:r>
-              <a:rPr lang="en-US" sz="2000" i="1" dirty="0"/>
-              <a:t> </a:t>
-            </a:r>
-            <a:br>
-              <a:rPr lang="de-DE" sz="2000" i="1" dirty="0"/>
-            </a:br>
-            <a:endParaRPr lang="de-DE" sz="2000" i="1" dirty="0"/>
+              <a:t>Organisation</a:t>
+            </a:r>
           </a:p>
         </p:txBody>
       </p:sp>
     </p:spTree>
     <p:extLst>
       <p:ext uri="{BB962C8B-B14F-4D97-AF65-F5344CB8AC3E}">
-        <p14:creationId xmlns:p14="http://schemas.microsoft.com/office/powerpoint/2010/main" val="3772347927"/>
+        <p14:creationId xmlns:p14="http://schemas.microsoft.com/office/powerpoint/2010/main" val="863426444"/>
       </p:ext>
     </p:extLst>
   </p:cSld>

</xml_diff>

<commit_message>
Agenda-Folie zu Beginn eingefügt
</commit_message>
<xml_diff>
--- a/slides/Tag-1_1-Begruessung.pptx
+++ b/slides/Tag-1_1-Begruessung.pptx
@@ -6,27 +6,26 @@
     <p:sldMasterId id="2147483649" r:id="rId2"/>
   </p:sldMasterIdLst>
   <p:notesMasterIdLst>
-    <p:notesMasterId r:id="rId18"/>
+    <p:notesMasterId r:id="rId17"/>
   </p:notesMasterIdLst>
   <p:handoutMasterIdLst>
-    <p:handoutMasterId r:id="rId19"/>
+    <p:handoutMasterId r:id="rId18"/>
   </p:handoutMasterIdLst>
   <p:sldIdLst>
     <p:sldId id="288" r:id="rId3"/>
     <p:sldId id="290" r:id="rId4"/>
     <p:sldId id="324" r:id="rId5"/>
     <p:sldId id="465" r:id="rId6"/>
-    <p:sldId id="323" r:id="rId7"/>
-    <p:sldId id="466" r:id="rId8"/>
-    <p:sldId id="462" r:id="rId9"/>
-    <p:sldId id="449" r:id="rId10"/>
-    <p:sldId id="458" r:id="rId11"/>
-    <p:sldId id="467" r:id="rId12"/>
-    <p:sldId id="468" r:id="rId13"/>
-    <p:sldId id="459" r:id="rId14"/>
-    <p:sldId id="461" r:id="rId15"/>
-    <p:sldId id="464" r:id="rId16"/>
-    <p:sldId id="463" r:id="rId17"/>
+    <p:sldId id="466" r:id="rId7"/>
+    <p:sldId id="462" r:id="rId8"/>
+    <p:sldId id="449" r:id="rId9"/>
+    <p:sldId id="458" r:id="rId10"/>
+    <p:sldId id="467" r:id="rId11"/>
+    <p:sldId id="468" r:id="rId12"/>
+    <p:sldId id="459" r:id="rId13"/>
+    <p:sldId id="461" r:id="rId14"/>
+    <p:sldId id="464" r:id="rId15"/>
+    <p:sldId id="463" r:id="rId16"/>
   </p:sldIdLst>
   <p:sldSz cx="9144000" cy="6858000" type="screen4x3"/>
   <p:notesSz cx="6784975" cy="9921875"/>
@@ -6527,7 +6526,7 @@
               <a:pPr algn="ctr">
                 <a:defRPr/>
               </a:pPr>
-              <a:t>21.05.2021</a:t>
+              <a:t>25.05.2021</a:t>
             </a:fld>
             <a:endParaRPr lang="de-DE" sz="1000" dirty="0">
               <a:solidFill>
@@ -8471,6 +8470,13 @@
   <p:clrMapOvr>
     <a:masterClrMapping/>
   </p:clrMapOvr>
+  <p:timing>
+    <p:tnLst>
+      <p:par>
+        <p:cTn id="1" dur="indefinite" restart="never" nodeType="tmRoot"/>
+      </p:par>
+    </p:tnLst>
+  </p:timing>
 </p:sld>
 </file>
 
@@ -8508,7 +8514,7 @@
           <a:p>
             <a:r>
               <a:rPr lang="de-DE" dirty="0" smtClean="0"/>
-              <a:t>Remote Training</a:t>
+              <a:t>Vereinbarungen</a:t>
             </a:r>
             <a:endParaRPr lang="de-DE" dirty="0"/>
           </a:p>
@@ -8531,83 +8537,102 @@
           <a:p>
             <a:r>
               <a:rPr lang="de-DE" dirty="0" smtClean="0"/>
-              <a:t>Dozent in Räumlichkeiten der GFU</a:t>
-            </a:r>
-          </a:p>
-          <a:p>
+              <a:t>Pausen</a:t>
+            </a:r>
+          </a:p>
+          <a:p>
+            <a:pPr lvl="1"/>
             <a:r>
               <a:rPr lang="de-DE" dirty="0" smtClean="0"/>
-              <a:t>Video-Konferenz über Zoom</a:t>
+              <a:t>Gemeinsam zu </a:t>
+            </a:r>
+            <a:r>
+              <a:rPr lang="de-DE" dirty="0"/>
+              <a:t>vorgegebenen </a:t>
+            </a:r>
+            <a:r>
+              <a:rPr lang="de-DE" dirty="0" smtClean="0"/>
+              <a:t>Zeiten</a:t>
             </a:r>
           </a:p>
           <a:p>
             <a:pPr lvl="1"/>
             <a:r>
+              <a:rPr lang="de-DE" dirty="0"/>
+              <a:t>Individuell </a:t>
+            </a:r>
+            <a:r>
               <a:rPr lang="de-DE" dirty="0" smtClean="0"/>
-              <a:t>Folien</a:t>
+              <a:t>während </a:t>
+            </a:r>
+            <a:r>
+              <a:rPr lang="de-DE" dirty="0"/>
+              <a:t>der Übungen</a:t>
+            </a:r>
+          </a:p>
+          <a:p>
+            <a:r>
+              <a:rPr lang="de-DE" dirty="0"/>
+              <a:t>Erreichbarkeit </a:t>
+            </a:r>
+            <a:r>
+              <a:rPr lang="de-DE" dirty="0" smtClean="0"/>
+              <a:t>Dozent</a:t>
             </a:r>
           </a:p>
           <a:p>
             <a:pPr lvl="1"/>
             <a:r>
+              <a:rPr lang="de-DE" dirty="0"/>
+              <a:t>Zoom (Chat, Mikrophon)</a:t>
+            </a:r>
+          </a:p>
+          <a:p>
+            <a:pPr lvl="1"/>
+            <a:r>
+              <a:rPr lang="de-DE" smtClean="0"/>
+              <a:t>Handy</a:t>
+            </a:r>
+            <a:endParaRPr lang="de-DE" dirty="0" smtClean="0"/>
+          </a:p>
+          <a:p>
+            <a:pPr lvl="1"/>
+            <a:r>
               <a:rPr lang="de-DE" dirty="0" smtClean="0"/>
-              <a:t>Bildschirmfreigabe</a:t>
+              <a:t>Kamera aus: gerade nicht anwesend bzw. ansprechbar</a:t>
+            </a:r>
+          </a:p>
+          <a:p>
+            <a:r>
+              <a:rPr lang="de-DE" dirty="0" smtClean="0"/>
+              <a:t>Regeln</a:t>
             </a:r>
           </a:p>
           <a:p>
             <a:pPr lvl="1"/>
             <a:r>
-              <a:rPr lang="de-DE" dirty="0" smtClean="0"/>
-              <a:t>Chat</a:t>
+              <a:rPr lang="de-DE" dirty="0"/>
+              <a:t>Mikrophon möglichst aus (Hintergrundgeräusche)</a:t>
             </a:r>
           </a:p>
           <a:p>
             <a:pPr lvl="1"/>
             <a:r>
-              <a:rPr lang="de-DE" dirty="0" smtClean="0"/>
-              <a:t>Breakout-</a:t>
-            </a:r>
-            <a:r>
-              <a:rPr lang="de-DE" dirty="0" err="1" smtClean="0"/>
-              <a:t>Rooms</a:t>
-            </a:r>
-            <a:r>
-              <a:rPr lang="de-DE" dirty="0" smtClean="0"/>
-              <a:t> für Übungen</a:t>
+              <a:rPr lang="de-DE" dirty="0"/>
+              <a:t>Bei Fragen: "Hand heben" oder Chat</a:t>
             </a:r>
           </a:p>
           <a:p>
             <a:pPr lvl="1"/>
             <a:r>
-              <a:rPr lang="de-DE" dirty="0" smtClean="0"/>
-              <a:t>Lautsprecher + Mikrophon benötigt, Kamera empfehlenswert</a:t>
-            </a:r>
-          </a:p>
-          <a:p>
-            <a:endParaRPr lang="de-DE" dirty="0"/>
-          </a:p>
-          <a:p>
-            <a:r>
-              <a:rPr lang="de-DE" dirty="0" smtClean="0"/>
-              <a:t>Zugang zu Schulungsrechnern mittels RDP</a:t>
-            </a:r>
-          </a:p>
-          <a:p>
-            <a:pPr lvl="1"/>
-            <a:r>
-              <a:rPr lang="de-DE" dirty="0" smtClean="0"/>
-              <a:t>Praktische Übungen</a:t>
-            </a:r>
-          </a:p>
-          <a:p>
-            <a:pPr lvl="1"/>
-            <a:r>
-              <a:rPr lang="de-DE" dirty="0" smtClean="0"/>
-              <a:t>Aufschaltung über Zoom möglich</a:t>
-            </a:r>
-          </a:p>
-          <a:p>
-            <a:pPr lvl="1"/>
+              <a:rPr lang="de-DE" dirty="0"/>
+              <a:t>Wenn Übung fertig, selbst in Hauptsession zurückkehren</a:t>
+            </a:r>
+          </a:p>
+          <a:p>
+            <a:pPr marL="457200" lvl="1" indent="0">
+              <a:buNone/>
+            </a:pPr>
             <a:endParaRPr lang="de-DE" dirty="0"/>
           </a:p>
         </p:txBody>
@@ -8615,7 +8640,7 @@
     </p:spTree>
     <p:extLst>
       <p:ext uri="{BB962C8B-B14F-4D97-AF65-F5344CB8AC3E}">
-        <p14:creationId xmlns:p14="http://schemas.microsoft.com/office/powerpoint/2010/main" val="3567938042"/>
+        <p14:creationId xmlns:p14="http://schemas.microsoft.com/office/powerpoint/2010/main" val="1342526892"/>
       </p:ext>
     </p:extLst>
   </p:cSld>
@@ -8651,182 +8676,6 @@
       </p:grpSpPr>
       <p:sp>
         <p:nvSpPr>
-          <p:cNvPr id="2" name="Titel 1"/>
-          <p:cNvSpPr>
-            <a:spLocks noGrp="1"/>
-          </p:cNvSpPr>
-          <p:nvPr>
-            <p:ph type="title"/>
-          </p:nvPr>
-        </p:nvSpPr>
-        <p:spPr/>
-        <p:txBody>
-          <a:bodyPr/>
-          <a:lstStyle/>
-          <a:p>
-            <a:r>
-              <a:rPr lang="de-DE" dirty="0" smtClean="0"/>
-              <a:t>Vereinbarungen</a:t>
-            </a:r>
-            <a:endParaRPr lang="de-DE" dirty="0"/>
-          </a:p>
-        </p:txBody>
-      </p:sp>
-      <p:sp>
-        <p:nvSpPr>
-          <p:cNvPr id="3" name="Inhaltsplatzhalter 2"/>
-          <p:cNvSpPr>
-            <a:spLocks noGrp="1"/>
-          </p:cNvSpPr>
-          <p:nvPr>
-            <p:ph idx="1"/>
-          </p:nvPr>
-        </p:nvSpPr>
-        <p:spPr/>
-        <p:txBody>
-          <a:bodyPr/>
-          <a:lstStyle/>
-          <a:p>
-            <a:r>
-              <a:rPr lang="de-DE" dirty="0" smtClean="0"/>
-              <a:t>Pausen</a:t>
-            </a:r>
-          </a:p>
-          <a:p>
-            <a:pPr lvl="1"/>
-            <a:r>
-              <a:rPr lang="de-DE" dirty="0" smtClean="0"/>
-              <a:t>Gemeinsam zu </a:t>
-            </a:r>
-            <a:r>
-              <a:rPr lang="de-DE" dirty="0"/>
-              <a:t>vorgegebenen </a:t>
-            </a:r>
-            <a:r>
-              <a:rPr lang="de-DE" dirty="0" smtClean="0"/>
-              <a:t>Zeiten</a:t>
-            </a:r>
-          </a:p>
-          <a:p>
-            <a:pPr lvl="1"/>
-            <a:r>
-              <a:rPr lang="de-DE" dirty="0"/>
-              <a:t>Individuell </a:t>
-            </a:r>
-            <a:r>
-              <a:rPr lang="de-DE" dirty="0" smtClean="0"/>
-              <a:t>während </a:t>
-            </a:r>
-            <a:r>
-              <a:rPr lang="de-DE" dirty="0"/>
-              <a:t>der Übungen</a:t>
-            </a:r>
-          </a:p>
-          <a:p>
-            <a:r>
-              <a:rPr lang="de-DE" dirty="0"/>
-              <a:t>Erreichbarkeit </a:t>
-            </a:r>
-            <a:r>
-              <a:rPr lang="de-DE" dirty="0" smtClean="0"/>
-              <a:t>Dozent</a:t>
-            </a:r>
-          </a:p>
-          <a:p>
-            <a:pPr lvl="1"/>
-            <a:r>
-              <a:rPr lang="de-DE" dirty="0"/>
-              <a:t>Zoom (Chat, Mikrophon)</a:t>
-            </a:r>
-          </a:p>
-          <a:p>
-            <a:pPr lvl="1"/>
-            <a:r>
-              <a:rPr lang="de-DE" dirty="0" smtClean="0"/>
-              <a:t>Chat</a:t>
-            </a:r>
-          </a:p>
-          <a:p>
-            <a:pPr lvl="1"/>
-            <a:r>
-              <a:rPr lang="de-DE" dirty="0" smtClean="0"/>
-              <a:t>Handy</a:t>
-            </a:r>
-          </a:p>
-          <a:p>
-            <a:pPr lvl="1"/>
-            <a:r>
-              <a:rPr lang="de-DE" dirty="0" smtClean="0"/>
-              <a:t>Kamera aus: gerade nicht anwesend bzw. ansprechbar</a:t>
-            </a:r>
-          </a:p>
-          <a:p>
-            <a:r>
-              <a:rPr lang="de-DE" dirty="0" smtClean="0"/>
-              <a:t>Regeln</a:t>
-            </a:r>
-          </a:p>
-          <a:p>
-            <a:pPr lvl="1"/>
-            <a:r>
-              <a:rPr lang="de-DE" dirty="0"/>
-              <a:t>Mikrophon möglichst aus (Hintergrundgeräusche)</a:t>
-            </a:r>
-          </a:p>
-          <a:p>
-            <a:pPr lvl="1"/>
-            <a:r>
-              <a:rPr lang="de-DE" dirty="0"/>
-              <a:t>Bei Fragen: "Hand heben" oder Chat</a:t>
-            </a:r>
-          </a:p>
-          <a:p>
-            <a:pPr lvl="1"/>
-            <a:r>
-              <a:rPr lang="de-DE" dirty="0"/>
-              <a:t>Wenn Übung fertig, selbst in Hauptsession zurückkehren</a:t>
-            </a:r>
-          </a:p>
-          <a:p>
-            <a:pPr marL="457200" lvl="1" indent="0">
-              <a:buNone/>
-            </a:pPr>
-            <a:endParaRPr lang="de-DE" dirty="0"/>
-          </a:p>
-        </p:txBody>
-      </p:sp>
-    </p:spTree>
-    <p:extLst>
-      <p:ext uri="{BB962C8B-B14F-4D97-AF65-F5344CB8AC3E}">
-        <p14:creationId xmlns:p14="http://schemas.microsoft.com/office/powerpoint/2010/main" val="1342526892"/>
-      </p:ext>
-    </p:extLst>
-  </p:cSld>
-  <p:clrMapOvr>
-    <a:masterClrMapping/>
-  </p:clrMapOvr>
-</p:sld>
-</file>
-
-<file path=ppt/slides/slide12.xml><?xml version="1.0" encoding="utf-8"?>
-<p:sld xmlns:a="http://schemas.openxmlformats.org/drawingml/2006/main" xmlns:r="http://schemas.openxmlformats.org/officeDocument/2006/relationships" xmlns:p="http://schemas.openxmlformats.org/presentationml/2006/main">
-  <p:cSld>
-    <p:spTree>
-      <p:nvGrpSpPr>
-        <p:cNvPr id="1" name=""/>
-        <p:cNvGrpSpPr/>
-        <p:nvPr/>
-      </p:nvGrpSpPr>
-      <p:grpSpPr>
-        <a:xfrm>
-          <a:off x="0" y="0"/>
-          <a:ext cx="0" cy="0"/>
-          <a:chOff x="0" y="0"/>
-          <a:chExt cx="0" cy="0"/>
-        </a:xfrm>
-      </p:grpSpPr>
-      <p:sp>
-        <p:nvSpPr>
           <p:cNvPr id="17410" name="Inhaltsplatzhalter 2"/>
           <p:cNvSpPr>
             <a:spLocks noGrp="1"/>
@@ -9024,7 +8873,7 @@
 </p:sld>
 </file>
 
-<file path=ppt/slides/slide13.xml><?xml version="1.0" encoding="utf-8"?>
+<file path=ppt/slides/slide12.xml><?xml version="1.0" encoding="utf-8"?>
 <p:sld xmlns:a="http://schemas.openxmlformats.org/drawingml/2006/main" xmlns:r="http://schemas.openxmlformats.org/officeDocument/2006/relationships" xmlns:p="http://schemas.openxmlformats.org/presentationml/2006/main">
   <p:cSld>
     <p:spTree>
@@ -9356,7 +9205,7 @@
 </p:sld>
 </file>
 
-<file path=ppt/slides/slide14.xml><?xml version="1.0" encoding="utf-8"?>
+<file path=ppt/slides/slide13.xml><?xml version="1.0" encoding="utf-8"?>
 <p:sld xmlns:a="http://schemas.openxmlformats.org/drawingml/2006/main" xmlns:r="http://schemas.openxmlformats.org/officeDocument/2006/relationships" xmlns:p="http://schemas.openxmlformats.org/presentationml/2006/main">
   <p:cSld>
     <p:spTree>
@@ -9552,10 +9401,17 @@
   <p:clrMapOvr>
     <a:masterClrMapping/>
   </p:clrMapOvr>
+  <p:timing>
+    <p:tnLst>
+      <p:par>
+        <p:cTn id="1" dur="indefinite" restart="never" nodeType="tmRoot"/>
+      </p:par>
+    </p:tnLst>
+  </p:timing>
 </p:sld>
 </file>
 
-<file path=ppt/slides/slide15.xml><?xml version="1.0" encoding="utf-8"?>
+<file path=ppt/slides/slide14.xml><?xml version="1.0" encoding="utf-8"?>
 <p:sld xmlns:a="http://schemas.openxmlformats.org/drawingml/2006/main" xmlns:r="http://schemas.openxmlformats.org/officeDocument/2006/relationships" xmlns:p="http://schemas.openxmlformats.org/presentationml/2006/main" show="0">
   <p:cSld>
     <p:spTree>
@@ -9668,6 +9524,13 @@
       <p:transition spd="slow"/>
     </mc:Fallback>
   </mc:AlternateContent>
+  <p:timing>
+    <p:tnLst>
+      <p:par>
+        <p:cTn id="1" dur="indefinite" restart="never" nodeType="tmRoot"/>
+      </p:par>
+    </p:tnLst>
+  </p:timing>
 </p:sld>
 </file>
 
@@ -9924,6 +9787,13 @@
       <p:transition spd="slow"/>
     </mc:Fallback>
   </mc:AlternateContent>
+  <p:timing>
+    <p:tnLst>
+      <p:par>
+        <p:cTn id="1" dur="indefinite" restart="never" nodeType="tmRoot"/>
+      </p:par>
+    </p:tnLst>
+  </p:timing>
 </p:sld>
 </file>
 
@@ -10214,7 +10084,15 @@
             </a:pPr>
             <a:r>
               <a:rPr lang="de-DE" b="1" dirty="0"/>
-              <a:t>Patrick Möbius (M. Eng. I.S.E.)</a:t>
+              <a:t>Patrick Möbius (</a:t>
+            </a:r>
+            <a:r>
+              <a:rPr lang="de-DE" b="1" dirty="0" err="1" smtClean="0"/>
+              <a:t>M.Eng</a:t>
+            </a:r>
+            <a:r>
+              <a:rPr lang="de-DE" b="1" dirty="0"/>
+              <a:t>. I.S.E.)</a:t>
             </a:r>
           </a:p>
           <a:p>
@@ -10850,323 +10728,6 @@
 </file>
 
 <file path=ppt/slides/slide5.xml><?xml version="1.0" encoding="utf-8"?>
-<p:sld xmlns:a="http://schemas.openxmlformats.org/drawingml/2006/main" xmlns:r="http://schemas.openxmlformats.org/officeDocument/2006/relationships" xmlns:p="http://schemas.openxmlformats.org/presentationml/2006/main" show="0">
-  <p:cSld>
-    <p:spTree>
-      <p:nvGrpSpPr>
-        <p:cNvPr id="1" name=""/>
-        <p:cNvGrpSpPr/>
-        <p:nvPr/>
-      </p:nvGrpSpPr>
-      <p:grpSpPr>
-        <a:xfrm>
-          <a:off x="0" y="0"/>
-          <a:ext cx="0" cy="0"/>
-          <a:chOff x="0" y="0"/>
-          <a:chExt cx="0" cy="0"/>
-        </a:xfrm>
-      </p:grpSpPr>
-      <p:sp>
-        <p:nvSpPr>
-          <p:cNvPr id="17410" name="Inhaltsplatzhalter 2"/>
-          <p:cNvSpPr>
-            <a:spLocks noGrp="1"/>
-          </p:cNvSpPr>
-          <p:nvPr>
-            <p:ph idx="1"/>
-          </p:nvPr>
-        </p:nvSpPr>
-        <p:spPr>
-          <a:xfrm>
-            <a:off x="303213" y="1462108"/>
-            <a:ext cx="8589962" cy="4824412"/>
-          </a:xfrm>
-        </p:spPr>
-        <p:txBody>
-          <a:bodyPr/>
-          <a:lstStyle/>
-          <a:p>
-            <a:pPr>
-              <a:buNone/>
-            </a:pPr>
-            <a:r>
-              <a:rPr lang="de-DE" b="1" dirty="0"/>
-              <a:t>Patrick Möbius (</a:t>
-            </a:r>
-            <a:r>
-              <a:rPr lang="de-DE" b="1" dirty="0" err="1"/>
-              <a:t>M.Sc</a:t>
-            </a:r>
-            <a:r>
-              <a:rPr lang="de-DE" b="1" dirty="0"/>
-              <a:t>. C.S.)</a:t>
-            </a:r>
-          </a:p>
-          <a:p>
-            <a:pPr marL="342900" lvl="1" indent="-342900">
-              <a:buFont typeface="Arial" charset="0"/>
-              <a:buChar char="●"/>
-            </a:pPr>
-            <a:r>
-              <a:rPr lang="de-DE" altLang="de-DE" dirty="0">
-                <a:ea typeface="+mn-ea"/>
-                <a:cs typeface="+mn-cs"/>
-              </a:rPr>
-              <a:t>Software Engineer</a:t>
-            </a:r>
-          </a:p>
-          <a:p>
-            <a:pPr marL="342900" lvl="1" indent="-342900">
-              <a:buFont typeface="Arial" charset="0"/>
-              <a:buChar char="●"/>
-            </a:pPr>
-            <a:r>
-              <a:rPr lang="de-DE" altLang="de-DE" dirty="0">
-                <a:ea typeface="+mn-ea"/>
-                <a:cs typeface="+mn-cs"/>
-              </a:rPr>
-              <a:t>Seit 2011 bei </a:t>
-            </a:r>
-            <a:r>
-              <a:rPr lang="de-DE" altLang="de-DE" dirty="0" err="1">
-                <a:ea typeface="+mn-ea"/>
-                <a:cs typeface="+mn-cs"/>
-              </a:rPr>
-              <a:t>anderScore</a:t>
-            </a:r>
-            <a:endParaRPr lang="de-DE" altLang="de-DE" dirty="0">
-              <a:ea typeface="+mn-ea"/>
-              <a:cs typeface="+mn-cs"/>
-            </a:endParaRPr>
-          </a:p>
-          <a:p>
-            <a:pPr marL="342900" lvl="1" indent="-342900">
-              <a:buFont typeface="Arial" charset="0"/>
-              <a:buChar char="●"/>
-            </a:pPr>
-            <a:r>
-              <a:rPr lang="de-DE" altLang="de-DE" dirty="0">
-                <a:ea typeface="+mn-ea"/>
-                <a:cs typeface="+mn-cs"/>
-              </a:rPr>
-              <a:t>Schwerpunkte</a:t>
-            </a:r>
-          </a:p>
-          <a:p>
-            <a:pPr marL="742950" lvl="2" indent="-342900">
-              <a:buFont typeface="Arial" charset="0"/>
-              <a:buChar char="●"/>
-            </a:pPr>
-            <a:r>
-              <a:rPr lang="de-DE" altLang="de-DE" sz="2000" dirty="0">
-                <a:ea typeface="+mn-ea"/>
-                <a:cs typeface="+mn-cs"/>
-              </a:rPr>
-              <a:t>Android mobile-Apps</a:t>
-            </a:r>
-          </a:p>
-          <a:p>
-            <a:pPr marL="742950" lvl="2" indent="-342900">
-              <a:buFont typeface="Arial" charset="0"/>
-              <a:buChar char="●"/>
-            </a:pPr>
-            <a:r>
-              <a:rPr lang="de-DE" altLang="de-DE" sz="2000" dirty="0" err="1">
-                <a:ea typeface="+mn-ea"/>
-                <a:cs typeface="+mn-cs"/>
-              </a:rPr>
-              <a:t>Frontends</a:t>
-            </a:r>
-            <a:r>
-              <a:rPr lang="de-DE" altLang="de-DE" sz="2000" dirty="0">
-                <a:ea typeface="+mn-ea"/>
-                <a:cs typeface="+mn-cs"/>
-              </a:rPr>
-              <a:t> für dynamische Webapplikationen</a:t>
-            </a:r>
-          </a:p>
-          <a:p>
-            <a:pPr marL="742950" lvl="2" indent="-342900">
-              <a:buFont typeface="Arial" charset="0"/>
-              <a:buChar char="●"/>
-            </a:pPr>
-            <a:r>
-              <a:rPr lang="de-DE" altLang="de-DE" sz="2000" dirty="0">
-                <a:ea typeface="+mn-ea"/>
-                <a:cs typeface="+mn-cs"/>
-              </a:rPr>
-              <a:t>WS-Anbindung für </a:t>
-            </a:r>
-            <a:r>
-              <a:rPr lang="de-DE" altLang="de-DE" sz="2000" dirty="0" err="1">
-                <a:ea typeface="+mn-ea"/>
-                <a:cs typeface="+mn-cs"/>
-              </a:rPr>
-              <a:t>Persistence</a:t>
-            </a:r>
-            <a:r>
-              <a:rPr lang="de-DE" altLang="de-DE" sz="2000" dirty="0">
-                <a:ea typeface="+mn-ea"/>
-                <a:cs typeface="+mn-cs"/>
-              </a:rPr>
-              <a:t> Layer, </a:t>
-            </a:r>
-            <a:br>
-              <a:rPr lang="de-DE" altLang="de-DE" sz="2000" dirty="0">
-                <a:ea typeface="+mn-ea"/>
-                <a:cs typeface="+mn-cs"/>
-              </a:rPr>
-            </a:br>
-            <a:r>
-              <a:rPr lang="de-DE" altLang="de-DE" sz="2000" dirty="0">
-                <a:ea typeface="+mn-ea"/>
-                <a:cs typeface="+mn-cs"/>
-              </a:rPr>
-              <a:t>Einsatz von speziellen Caching-Arten</a:t>
-            </a:r>
-          </a:p>
-          <a:p>
-            <a:pPr marL="742950" lvl="2" indent="-342900">
-              <a:buFont typeface="Arial" charset="0"/>
-              <a:buChar char="●"/>
-            </a:pPr>
-            <a:r>
-              <a:rPr lang="de-DE" altLang="de-DE" sz="2000" dirty="0">
-                <a:ea typeface="+mn-ea"/>
-                <a:cs typeface="+mn-cs"/>
-              </a:rPr>
-              <a:t>BPM-Umgebungen; Prozessdarstellungen</a:t>
-            </a:r>
-          </a:p>
-          <a:p>
-            <a:pPr marL="342900" lvl="1" indent="-342900">
-              <a:buFont typeface="Arial" charset="0"/>
-              <a:buChar char="●"/>
-            </a:pPr>
-            <a:r>
-              <a:rPr lang="de-DE" altLang="de-DE" dirty="0"/>
-              <a:t>Java, </a:t>
-            </a:r>
-            <a:r>
-              <a:rPr lang="de-DE" altLang="de-DE" dirty="0" err="1"/>
-              <a:t>Wicket</a:t>
-            </a:r>
-            <a:r>
-              <a:rPr lang="de-DE" altLang="de-DE" dirty="0"/>
-              <a:t>, GWT/ GXT, JavaScript, …</a:t>
-            </a:r>
-            <a:endParaRPr lang="de-DE" altLang="de-DE" dirty="0">
-              <a:ea typeface="+mn-ea"/>
-              <a:cs typeface="+mn-cs"/>
-            </a:endParaRPr>
-          </a:p>
-        </p:txBody>
-      </p:sp>
-      <p:sp>
-        <p:nvSpPr>
-          <p:cNvPr id="17411" name="Rectangle 1062"/>
-          <p:cNvSpPr>
-            <a:spLocks noGrp="1" noChangeArrowheads="1"/>
-          </p:cNvSpPr>
-          <p:nvPr>
-            <p:ph type="title"/>
-          </p:nvPr>
-        </p:nvSpPr>
-        <p:spPr>
-          <a:xfrm>
-            <a:off x="285750" y="142875"/>
-            <a:ext cx="5654675" cy="706438"/>
-          </a:xfrm>
-        </p:spPr>
-        <p:txBody>
-          <a:bodyPr/>
-          <a:lstStyle/>
-          <a:p>
-            <a:r>
-              <a:rPr lang="de-DE" dirty="0"/>
-              <a:t>Vorstellung</a:t>
-            </a:r>
-          </a:p>
-        </p:txBody>
-      </p:sp>
-      <p:pic>
-        <p:nvPicPr>
-          <p:cNvPr id="7" name="Picture 4" descr="Foto2"/>
-          <p:cNvPicPr>
-            <a:picLocks noChangeAspect="1" noChangeArrowheads="1"/>
-          </p:cNvPicPr>
-          <p:nvPr/>
-        </p:nvPicPr>
-        <p:blipFill>
-          <a:blip r:embed="rId2">
-            <a:extLst>
-              <a:ext uri="{28A0092B-C50C-407E-A947-70E740481C1C}">
-                <a14:useLocalDpi xmlns:a14="http://schemas.microsoft.com/office/drawing/2010/main" val="0"/>
-              </a:ext>
-            </a:extLst>
-          </a:blip>
-          <a:srcRect/>
-          <a:stretch>
-            <a:fillRect/>
-          </a:stretch>
-        </p:blipFill>
-        <p:spPr bwMode="auto">
-          <a:xfrm>
-            <a:off x="6604768" y="1763117"/>
-            <a:ext cx="2071688" cy="3394075"/>
-          </a:xfrm>
-          <a:prstGeom prst="rect">
-            <a:avLst/>
-          </a:prstGeom>
-          <a:noFill/>
-          <a:ln>
-            <a:noFill/>
-          </a:ln>
-          <a:extLst>
-            <a:ext uri="{909E8E84-426E-40DD-AFC4-6F175D3DCCD1}">
-              <a14:hiddenFill xmlns:a14="http://schemas.microsoft.com/office/drawing/2010/main">
-                <a:solidFill>
-                  <a:srgbClr val="FFFFFF"/>
-                </a:solidFill>
-              </a14:hiddenFill>
-            </a:ext>
-            <a:ext uri="{91240B29-F687-4F45-9708-019B960494DF}">
-              <a14:hiddenLine xmlns:a14="http://schemas.microsoft.com/office/drawing/2010/main" w="9525">
-                <a:solidFill>
-                  <a:srgbClr val="000000"/>
-                </a:solidFill>
-                <a:miter lim="800000"/>
-                <a:headEnd/>
-                <a:tailEnd/>
-              </a14:hiddenLine>
-            </a:ext>
-          </a:extLst>
-        </p:spPr>
-      </p:pic>
-    </p:spTree>
-  </p:cSld>
-  <p:clrMapOvr>
-    <a:masterClrMapping/>
-  </p:clrMapOvr>
-  <mc:AlternateContent xmlns:mc="http://schemas.openxmlformats.org/markup-compatibility/2006" xmlns:p14="http://schemas.microsoft.com/office/powerpoint/2010/main">
-    <mc:Choice Requires="p14">
-      <p:transition spd="slow" p14:dur="2000"/>
-    </mc:Choice>
-    <mc:Fallback xmlns="">
-      <p:transition spd="slow"/>
-    </mc:Fallback>
-  </mc:AlternateContent>
-  <p:timing>
-    <p:tnLst>
-      <p:par>
-        <p:cTn id="1" dur="indefinite" restart="never" nodeType="tmRoot"/>
-      </p:par>
-    </p:tnLst>
-  </p:timing>
-</p:sld>
-</file>
-
-<file path=ppt/slides/slide6.xml><?xml version="1.0" encoding="utf-8"?>
 <p:sld xmlns:a="http://schemas.openxmlformats.org/drawingml/2006/main" xmlns:r="http://schemas.openxmlformats.org/officeDocument/2006/relationships" xmlns:p="http://schemas.openxmlformats.org/presentationml/2006/main">
   <p:cSld>
     <p:spTree>
@@ -15253,7 +14814,7 @@
 </p:sld>
 </file>
 
-<file path=ppt/slides/slide7.xml><?xml version="1.0" encoding="utf-8"?>
+<file path=ppt/slides/slide6.xml><?xml version="1.0" encoding="utf-8"?>
 <p:sld xmlns:a="http://schemas.openxmlformats.org/drawingml/2006/main" xmlns:r="http://schemas.openxmlformats.org/officeDocument/2006/relationships" xmlns:p="http://schemas.openxmlformats.org/presentationml/2006/main">
   <p:cSld>
     <p:spTree>
@@ -15500,7 +15061,7 @@
 </p:sld>
 </file>
 
-<file path=ppt/slides/slide8.xml><?xml version="1.0" encoding="utf-8"?>
+<file path=ppt/slides/slide7.xml><?xml version="1.0" encoding="utf-8"?>
 <p:sld xmlns:a="http://schemas.openxmlformats.org/drawingml/2006/main" xmlns:r="http://schemas.openxmlformats.org/officeDocument/2006/relationships" xmlns:p="http://schemas.openxmlformats.org/presentationml/2006/main">
   <p:cSld>
     <p:spTree>
@@ -15782,7 +15343,7 @@
 </p:sld>
 </file>
 
-<file path=ppt/slides/slide9.xml><?xml version="1.0" encoding="utf-8"?>
+<file path=ppt/slides/slide8.xml><?xml version="1.0" encoding="utf-8"?>
 <p:sld xmlns:a="http://schemas.openxmlformats.org/drawingml/2006/main" xmlns:r="http://schemas.openxmlformats.org/officeDocument/2006/relationships" xmlns:p="http://schemas.openxmlformats.org/presentationml/2006/main">
   <p:cSld>
     <p:spTree>
@@ -16003,6 +15564,164 @@
     <p:extLst>
       <p:ext uri="{BB962C8B-B14F-4D97-AF65-F5344CB8AC3E}">
         <p14:creationId xmlns:p14="http://schemas.microsoft.com/office/powerpoint/2010/main" val="2151462665"/>
+      </p:ext>
+    </p:extLst>
+  </p:cSld>
+  <p:clrMapOvr>
+    <a:masterClrMapping/>
+  </p:clrMapOvr>
+  <p:timing>
+    <p:tnLst>
+      <p:par>
+        <p:cTn id="1" dur="indefinite" restart="never" nodeType="tmRoot"/>
+      </p:par>
+    </p:tnLst>
+  </p:timing>
+</p:sld>
+</file>
+
+<file path=ppt/slides/slide9.xml><?xml version="1.0" encoding="utf-8"?>
+<p:sld xmlns:a="http://schemas.openxmlformats.org/drawingml/2006/main" xmlns:r="http://schemas.openxmlformats.org/officeDocument/2006/relationships" xmlns:p="http://schemas.openxmlformats.org/presentationml/2006/main">
+  <p:cSld>
+    <p:spTree>
+      <p:nvGrpSpPr>
+        <p:cNvPr id="1" name=""/>
+        <p:cNvGrpSpPr/>
+        <p:nvPr/>
+      </p:nvGrpSpPr>
+      <p:grpSpPr>
+        <a:xfrm>
+          <a:off x="0" y="0"/>
+          <a:ext cx="0" cy="0"/>
+          <a:chOff x="0" y="0"/>
+          <a:chExt cx="0" cy="0"/>
+        </a:xfrm>
+      </p:grpSpPr>
+      <p:sp>
+        <p:nvSpPr>
+          <p:cNvPr id="2" name="Titel 1"/>
+          <p:cNvSpPr>
+            <a:spLocks noGrp="1"/>
+          </p:cNvSpPr>
+          <p:nvPr>
+            <p:ph type="title"/>
+          </p:nvPr>
+        </p:nvSpPr>
+        <p:spPr/>
+        <p:txBody>
+          <a:bodyPr/>
+          <a:lstStyle/>
+          <a:p>
+            <a:r>
+              <a:rPr lang="de-DE" dirty="0" smtClean="0"/>
+              <a:t>Remote Training</a:t>
+            </a:r>
+            <a:endParaRPr lang="de-DE" dirty="0"/>
+          </a:p>
+        </p:txBody>
+      </p:sp>
+      <p:sp>
+        <p:nvSpPr>
+          <p:cNvPr id="3" name="Inhaltsplatzhalter 2"/>
+          <p:cNvSpPr>
+            <a:spLocks noGrp="1"/>
+          </p:cNvSpPr>
+          <p:nvPr>
+            <p:ph idx="1"/>
+          </p:nvPr>
+        </p:nvSpPr>
+        <p:spPr/>
+        <p:txBody>
+          <a:bodyPr/>
+          <a:lstStyle/>
+          <a:p>
+            <a:r>
+              <a:rPr lang="de-DE" dirty="0" smtClean="0"/>
+              <a:t>Dozent in Räumlichkeiten der GFU</a:t>
+            </a:r>
+          </a:p>
+          <a:p>
+            <a:r>
+              <a:rPr lang="de-DE" dirty="0" smtClean="0"/>
+              <a:t>Video-Konferenz über Zoom</a:t>
+            </a:r>
+          </a:p>
+          <a:p>
+            <a:pPr lvl="1"/>
+            <a:r>
+              <a:rPr lang="de-DE" dirty="0" smtClean="0"/>
+              <a:t>Folien</a:t>
+            </a:r>
+          </a:p>
+          <a:p>
+            <a:pPr lvl="1"/>
+            <a:r>
+              <a:rPr lang="de-DE" dirty="0" smtClean="0"/>
+              <a:t>Bildschirmfreigabe</a:t>
+            </a:r>
+          </a:p>
+          <a:p>
+            <a:pPr lvl="1"/>
+            <a:r>
+              <a:rPr lang="de-DE" dirty="0" smtClean="0"/>
+              <a:t>Chat</a:t>
+            </a:r>
+          </a:p>
+          <a:p>
+            <a:pPr lvl="1"/>
+            <a:r>
+              <a:rPr lang="de-DE" dirty="0" smtClean="0"/>
+              <a:t>Breakout-</a:t>
+            </a:r>
+            <a:r>
+              <a:rPr lang="de-DE" dirty="0" err="1" smtClean="0"/>
+              <a:t>Rooms</a:t>
+            </a:r>
+            <a:r>
+              <a:rPr lang="de-DE" dirty="0" smtClean="0"/>
+              <a:t> für Übungen</a:t>
+            </a:r>
+          </a:p>
+          <a:p>
+            <a:pPr lvl="1"/>
+            <a:r>
+              <a:rPr lang="de-DE" dirty="0" smtClean="0"/>
+              <a:t>Lautsprecher + Mikrophon benötigt, Kamera empfehlenswert</a:t>
+            </a:r>
+          </a:p>
+          <a:p>
+            <a:endParaRPr lang="de-DE" dirty="0"/>
+          </a:p>
+          <a:p>
+            <a:r>
+              <a:rPr lang="de-DE" dirty="0" smtClean="0"/>
+              <a:t>Zugang zu Schulungsrechnern mittels RDP</a:t>
+            </a:r>
+          </a:p>
+          <a:p>
+            <a:pPr lvl="1"/>
+            <a:r>
+              <a:rPr lang="de-DE" dirty="0" smtClean="0"/>
+              <a:t>Praktische Übungen</a:t>
+            </a:r>
+          </a:p>
+          <a:p>
+            <a:pPr lvl="1"/>
+            <a:r>
+              <a:rPr lang="de-DE" dirty="0" smtClean="0"/>
+              <a:t>Aufschaltung über Zoom möglich</a:t>
+            </a:r>
+          </a:p>
+          <a:p>
+            <a:pPr lvl="1"/>
+            <a:endParaRPr lang="de-DE" dirty="0"/>
+          </a:p>
+        </p:txBody>
+      </p:sp>
+    </p:spTree>
+    <p:extLst>
+      <p:ext uri="{BB962C8B-B14F-4D97-AF65-F5344CB8AC3E}">
+        <p14:creationId xmlns:p14="http://schemas.microsoft.com/office/powerpoint/2010/main" val="3567938042"/>
       </p:ext>
     </p:extLst>
   </p:cSld>

</xml_diff>

<commit_message>
Change to version 8.x
</commit_message>
<xml_diff>
--- a/slides/Tag-1_1-Begruessung.pptx
+++ b/slides/Tag-1_1-Begruessung.pptx
@@ -157,12 +157,12 @@
   <p:extLst>
     <p:ext uri="{EFAFB233-063F-42B5-8137-9DF3F51BA10A}">
       <p15:sldGuideLst xmlns:p15="http://schemas.microsoft.com/office/powerpoint/2012/main">
-        <p15:guide id="1" orient="horz" pos="2160">
+        <p15:guide id="1" orient="horz" pos="2160" userDrawn="1">
           <p15:clr>
             <a:srgbClr val="A4A3A4"/>
           </p15:clr>
         </p15:guide>
-        <p15:guide id="2" pos="2880">
+        <p15:guide id="2" pos="2880" userDrawn="1">
           <p15:clr>
             <a:srgbClr val="A4A3A4"/>
           </p15:clr>
@@ -906,7 +906,12 @@
             <p:ph type="sldImg"/>
           </p:nvPr>
         </p:nvSpPr>
-        <p:spPr/>
+        <p:spPr>
+          <a:xfrm>
+            <a:off x="1069975" y="887413"/>
+            <a:ext cx="4645025" cy="3484562"/>
+          </a:xfrm>
+        </p:spPr>
       </p:sp>
       <p:sp>
         <p:nvSpPr>
@@ -1000,7 +1005,7 @@
         </p:nvSpPr>
         <p:spPr>
           <a:xfrm>
-            <a:off x="685800" y="2130425"/>
+            <a:off x="685800" y="2130427"/>
             <a:ext cx="7772400" cy="1470025"/>
           </a:xfrm>
         </p:spPr>
@@ -1114,8 +1119,8 @@
         </p:nvSpPr>
         <p:spPr bwMode="auto">
           <a:xfrm>
-            <a:off x="250825" y="6429375"/>
-            <a:ext cx="3035300" cy="427038"/>
+            <a:off x="250825" y="6429376"/>
+            <a:ext cx="3063659" cy="430887"/>
           </a:xfrm>
           <a:prstGeom prst="rect">
             <a:avLst/>
@@ -1219,8 +1224,8 @@
         </p:nvSpPr>
         <p:spPr bwMode="auto">
           <a:xfrm>
-            <a:off x="4252913" y="6424613"/>
-            <a:ext cx="1163637" cy="246062"/>
+            <a:off x="4252914" y="6424614"/>
+            <a:ext cx="1164101" cy="246221"/>
           </a:xfrm>
           <a:prstGeom prst="rect">
             <a:avLst/>
@@ -1261,7 +1266,7 @@
               </a:rPr>
               <a:t>ppt</a:t>
             </a:r>
-            <a:endParaRPr lang="de-DE" dirty="0">
+            <a:endParaRPr lang="de-DE" sz="2400" dirty="0">
               <a:solidFill>
                 <a:schemeClr val="bg1"/>
               </a:solidFill>
@@ -1378,8 +1383,8 @@
         </p:nvSpPr>
         <p:spPr bwMode="auto">
           <a:xfrm>
-            <a:off x="250825" y="6429375"/>
-            <a:ext cx="3035300" cy="427038"/>
+            <a:off x="250825" y="6429376"/>
+            <a:ext cx="3063659" cy="430887"/>
           </a:xfrm>
           <a:prstGeom prst="rect">
             <a:avLst/>
@@ -1483,8 +1488,8 @@
         </p:nvSpPr>
         <p:spPr bwMode="auto">
           <a:xfrm>
-            <a:off x="4252913" y="6424613"/>
-            <a:ext cx="1163637" cy="246062"/>
+            <a:off x="4252914" y="6424614"/>
+            <a:ext cx="1164101" cy="246221"/>
           </a:xfrm>
           <a:prstGeom prst="rect">
             <a:avLst/>
@@ -1525,7 +1530,7 @@
               </a:rPr>
               <a:t>ppt</a:t>
             </a:r>
-            <a:endParaRPr lang="de-DE" dirty="0">
+            <a:endParaRPr lang="de-DE" sz="2400" dirty="0">
               <a:solidFill>
                 <a:schemeClr val="bg1"/>
               </a:solidFill>
@@ -1546,7 +1551,7 @@
         </p:nvSpPr>
         <p:spPr>
           <a:xfrm>
-            <a:off x="6691313" y="115888"/>
+            <a:off x="6691314" y="115888"/>
             <a:ext cx="2128837" cy="6265862"/>
           </a:xfrm>
         </p:spPr>
@@ -1573,7 +1578,7 @@
         </p:nvSpPr>
         <p:spPr>
           <a:xfrm>
-            <a:off x="303213" y="115888"/>
+            <a:off x="303214" y="115888"/>
             <a:ext cx="6235700" cy="6265862"/>
           </a:xfrm>
         </p:spPr>
@@ -1676,13 +1681,7 @@
               <a:rPr lang="de-DE" sz="600" dirty="0">
                 <a:latin typeface="+mj-lt"/>
               </a:rPr>
-              <a:t>© Copyright </a:t>
-            </a:r>
-            <a:r>
-              <a:rPr lang="de-DE" sz="600" dirty="0" smtClean="0">
-                <a:latin typeface="+mj-lt"/>
-              </a:rPr>
-              <a:t>2021 </a:t>
+              <a:t>© Copyright 2023 </a:t>
             </a:r>
             <a:r>
               <a:rPr lang="de-DE" sz="600" dirty="0" err="1">
@@ -1711,7 +1710,7 @@
         </p:nvSpPr>
         <p:spPr>
           <a:xfrm>
-            <a:off x="685800" y="2130425"/>
+            <a:off x="685800" y="2130427"/>
             <a:ext cx="7772400" cy="1470025"/>
           </a:xfrm>
           <a:prstGeom prst="rect">
@@ -1915,7 +1914,7 @@
         </p:nvSpPr>
         <p:spPr>
           <a:xfrm>
-            <a:off x="457200" y="1600200"/>
+            <a:off x="457200" y="1600202"/>
             <a:ext cx="8229600" cy="4525963"/>
           </a:xfrm>
           <a:prstGeom prst="rect">
@@ -2055,7 +2054,7 @@
         </p:nvSpPr>
         <p:spPr>
           <a:xfrm>
-            <a:off x="722313" y="4406900"/>
+            <a:off x="722313" y="4406902"/>
             <a:ext cx="7772400" cy="1362075"/>
           </a:xfrm>
           <a:prstGeom prst="rect">
@@ -2268,7 +2267,7 @@
         </p:nvSpPr>
         <p:spPr>
           <a:xfrm>
-            <a:off x="457200" y="1600200"/>
+            <a:off x="457200" y="1600202"/>
             <a:ext cx="4038600" cy="4525963"/>
           </a:xfrm>
           <a:prstGeom prst="rect">
@@ -2355,7 +2354,7 @@
         </p:nvSpPr>
         <p:spPr>
           <a:xfrm>
-            <a:off x="4648200" y="1600200"/>
+            <a:off x="4648200" y="1600202"/>
             <a:ext cx="4038600" cy="4525963"/>
           </a:xfrm>
           <a:prstGeom prst="rect">
@@ -2712,7 +2711,7 @@
         </p:nvSpPr>
         <p:spPr>
           <a:xfrm>
-            <a:off x="4645025" y="1535113"/>
+            <a:off x="4645026" y="1535113"/>
             <a:ext cx="4041775" cy="639762"/>
           </a:xfrm>
           <a:prstGeom prst="rect">
@@ -2780,7 +2779,7 @@
         </p:nvSpPr>
         <p:spPr>
           <a:xfrm>
-            <a:off x="4645025" y="2174875"/>
+            <a:off x="4645026" y="2174875"/>
             <a:ext cx="4041775" cy="3951288"/>
           </a:xfrm>
           <a:prstGeom prst="rect">
@@ -3140,7 +3139,7 @@
         </p:nvSpPr>
         <p:spPr>
           <a:xfrm>
-            <a:off x="457200" y="273050"/>
+            <a:off x="457201" y="273050"/>
             <a:ext cx="3008313" cy="1162050"/>
           </a:xfrm>
           <a:prstGeom prst="rect">
@@ -3174,7 +3173,7 @@
         </p:nvSpPr>
         <p:spPr>
           <a:xfrm>
-            <a:off x="3575050" y="273050"/>
+            <a:off x="3575050" y="273052"/>
             <a:ext cx="5111750" cy="5853113"/>
           </a:xfrm>
           <a:prstGeom prst="rect">
@@ -3261,7 +3260,7 @@
         </p:nvSpPr>
         <p:spPr>
           <a:xfrm>
-            <a:off x="457200" y="1435100"/>
+            <a:off x="457201" y="1435102"/>
             <a:ext cx="3008313" cy="4691063"/>
           </a:xfrm>
           <a:prstGeom prst="rect">
@@ -3786,7 +3785,7 @@
         </p:nvSpPr>
         <p:spPr>
           <a:xfrm>
-            <a:off x="457200" y="1600200"/>
+            <a:off x="457200" y="1600202"/>
             <a:ext cx="8229600" cy="4525963"/>
           </a:xfrm>
           <a:prstGeom prst="rect">
@@ -3926,7 +3925,7 @@
         </p:nvSpPr>
         <p:spPr>
           <a:xfrm>
-            <a:off x="6629400" y="274638"/>
+            <a:off x="6629400" y="274640"/>
             <a:ext cx="2057400" cy="5851525"/>
           </a:xfrm>
           <a:prstGeom prst="rect">
@@ -3956,7 +3955,7 @@
         </p:nvSpPr>
         <p:spPr>
           <a:xfrm>
-            <a:off x="457200" y="274638"/>
+            <a:off x="457200" y="274640"/>
             <a:ext cx="6019800" cy="5851525"/>
           </a:xfrm>
           <a:prstGeom prst="rect">
@@ -4094,8 +4093,8 @@
         </p:nvSpPr>
         <p:spPr bwMode="auto">
           <a:xfrm>
-            <a:off x="250825" y="6429375"/>
-            <a:ext cx="3035300" cy="427038"/>
+            <a:off x="250825" y="6429376"/>
+            <a:ext cx="3063659" cy="430887"/>
           </a:xfrm>
           <a:prstGeom prst="rect">
             <a:avLst/>
@@ -4199,8 +4198,8 @@
         </p:nvSpPr>
         <p:spPr bwMode="auto">
           <a:xfrm>
-            <a:off x="4252913" y="6424613"/>
-            <a:ext cx="1163637" cy="246062"/>
+            <a:off x="4252914" y="6424614"/>
+            <a:ext cx="1164101" cy="246221"/>
           </a:xfrm>
           <a:prstGeom prst="rect">
             <a:avLst/>
@@ -4241,7 +4240,7 @@
               </a:rPr>
               <a:t>ppt</a:t>
             </a:r>
-            <a:endParaRPr lang="de-DE" dirty="0">
+            <a:endParaRPr lang="de-DE" sz="2400" dirty="0">
               <a:solidFill>
                 <a:schemeClr val="bg1"/>
               </a:solidFill>
@@ -4262,7 +4261,7 @@
         </p:nvSpPr>
         <p:spPr>
           <a:xfrm>
-            <a:off x="722313" y="4406900"/>
+            <a:off x="722313" y="4406902"/>
             <a:ext cx="7772400" cy="1362075"/>
           </a:xfrm>
         </p:spPr>
@@ -4381,8 +4380,8 @@
         </p:nvSpPr>
         <p:spPr bwMode="auto">
           <a:xfrm>
-            <a:off x="250825" y="6429375"/>
-            <a:ext cx="3035300" cy="427038"/>
+            <a:off x="250825" y="6429376"/>
+            <a:ext cx="3063659" cy="430887"/>
           </a:xfrm>
           <a:prstGeom prst="rect">
             <a:avLst/>
@@ -4486,8 +4485,8 @@
         </p:nvSpPr>
         <p:spPr bwMode="auto">
           <a:xfrm>
-            <a:off x="4252913" y="6424613"/>
-            <a:ext cx="1163637" cy="246062"/>
+            <a:off x="4252914" y="6424614"/>
+            <a:ext cx="1164101" cy="246221"/>
           </a:xfrm>
           <a:prstGeom prst="rect">
             <a:avLst/>
@@ -4528,7 +4527,7 @@
               </a:rPr>
               <a:t>ppt</a:t>
             </a:r>
-            <a:endParaRPr lang="de-DE" dirty="0">
+            <a:endParaRPr lang="de-DE" sz="2400" dirty="0">
               <a:solidFill>
                 <a:schemeClr val="bg1"/>
               </a:solidFill>
@@ -4571,7 +4570,7 @@
         </p:nvSpPr>
         <p:spPr>
           <a:xfrm>
-            <a:off x="303213" y="981075"/>
+            <a:off x="303214" y="981076"/>
             <a:ext cx="4181475" cy="5400675"/>
           </a:xfrm>
         </p:spPr>
@@ -4655,7 +4654,7 @@
         </p:nvSpPr>
         <p:spPr>
           <a:xfrm>
-            <a:off x="4637088" y="981075"/>
+            <a:off x="4637088" y="981076"/>
             <a:ext cx="4183062" cy="5400675"/>
           </a:xfrm>
         </p:spPr>
@@ -4762,8 +4761,8 @@
         </p:nvSpPr>
         <p:spPr bwMode="auto">
           <a:xfrm>
-            <a:off x="250825" y="6429375"/>
-            <a:ext cx="3035300" cy="427038"/>
+            <a:off x="250825" y="6429376"/>
+            <a:ext cx="3063659" cy="430887"/>
           </a:xfrm>
           <a:prstGeom prst="rect">
             <a:avLst/>
@@ -4867,8 +4866,8 @@
         </p:nvSpPr>
         <p:spPr bwMode="auto">
           <a:xfrm>
-            <a:off x="4252913" y="6424613"/>
-            <a:ext cx="1163637" cy="246062"/>
+            <a:off x="4252914" y="6424614"/>
+            <a:ext cx="1164101" cy="246221"/>
           </a:xfrm>
           <a:prstGeom prst="rect">
             <a:avLst/>
@@ -4909,7 +4908,7 @@
               </a:rPr>
               <a:t>ppt</a:t>
             </a:r>
-            <a:endParaRPr lang="de-DE" dirty="0">
+            <a:endParaRPr lang="de-DE" sz="2400" dirty="0">
               <a:solidFill>
                 <a:schemeClr val="bg1"/>
               </a:solidFill>
@@ -5110,7 +5109,7 @@
         </p:nvSpPr>
         <p:spPr>
           <a:xfrm>
-            <a:off x="4645025" y="1535113"/>
+            <a:off x="4645026" y="1535113"/>
             <a:ext cx="4041775" cy="639762"/>
           </a:xfrm>
         </p:spPr>
@@ -5175,7 +5174,7 @@
         </p:nvSpPr>
         <p:spPr>
           <a:xfrm>
-            <a:off x="4645025" y="2174875"/>
+            <a:off x="4645026" y="2174875"/>
             <a:ext cx="4041775" cy="3951288"/>
           </a:xfrm>
         </p:spPr>
@@ -5282,8 +5281,8 @@
         </p:nvSpPr>
         <p:spPr bwMode="auto">
           <a:xfrm>
-            <a:off x="250825" y="6429375"/>
-            <a:ext cx="3035300" cy="427038"/>
+            <a:off x="250825" y="6429376"/>
+            <a:ext cx="3063659" cy="430887"/>
           </a:xfrm>
           <a:prstGeom prst="rect">
             <a:avLst/>
@@ -5387,8 +5386,8 @@
         </p:nvSpPr>
         <p:spPr bwMode="auto">
           <a:xfrm>
-            <a:off x="4252913" y="6424613"/>
-            <a:ext cx="1163637" cy="246062"/>
+            <a:off x="4252914" y="6424614"/>
+            <a:ext cx="1164101" cy="246221"/>
           </a:xfrm>
           <a:prstGeom prst="rect">
             <a:avLst/>
@@ -5429,7 +5428,7 @@
               </a:rPr>
               <a:t>ppt</a:t>
             </a:r>
-            <a:endParaRPr lang="de-DE" dirty="0">
+            <a:endParaRPr lang="de-DE" sz="2400" dirty="0">
               <a:solidFill>
                 <a:schemeClr val="bg1"/>
               </a:solidFill>
@@ -5495,8 +5494,8 @@
         </p:nvSpPr>
         <p:spPr bwMode="auto">
           <a:xfrm>
-            <a:off x="250825" y="6429375"/>
-            <a:ext cx="3035300" cy="427038"/>
+            <a:off x="250825" y="6429376"/>
+            <a:ext cx="3063659" cy="430887"/>
           </a:xfrm>
           <a:prstGeom prst="rect">
             <a:avLst/>
@@ -5600,8 +5599,8 @@
         </p:nvSpPr>
         <p:spPr bwMode="auto">
           <a:xfrm>
-            <a:off x="4252913" y="6424613"/>
-            <a:ext cx="1163637" cy="246062"/>
+            <a:off x="4252914" y="6424614"/>
+            <a:ext cx="1164101" cy="246221"/>
           </a:xfrm>
           <a:prstGeom prst="rect">
             <a:avLst/>
@@ -5642,7 +5641,7 @@
               </a:rPr>
               <a:t>ppt</a:t>
             </a:r>
-            <a:endParaRPr lang="de-DE" dirty="0">
+            <a:endParaRPr lang="de-DE" sz="2400" dirty="0">
               <a:solidFill>
                 <a:schemeClr val="bg1"/>
               </a:solidFill>
@@ -5686,8 +5685,8 @@
         </p:nvSpPr>
         <p:spPr bwMode="auto">
           <a:xfrm>
-            <a:off x="250825" y="6429375"/>
-            <a:ext cx="3035300" cy="427038"/>
+            <a:off x="250825" y="6429376"/>
+            <a:ext cx="3063659" cy="430887"/>
           </a:xfrm>
           <a:prstGeom prst="rect">
             <a:avLst/>
@@ -5791,8 +5790,8 @@
         </p:nvSpPr>
         <p:spPr bwMode="auto">
           <a:xfrm>
-            <a:off x="4252913" y="6424613"/>
-            <a:ext cx="1163637" cy="246062"/>
+            <a:off x="4252914" y="6424614"/>
+            <a:ext cx="1164101" cy="246221"/>
           </a:xfrm>
           <a:prstGeom prst="rect">
             <a:avLst/>
@@ -5833,7 +5832,7 @@
               </a:rPr>
               <a:t>ppt</a:t>
             </a:r>
-            <a:endParaRPr lang="de-DE" dirty="0">
+            <a:endParaRPr lang="de-DE" sz="2400" dirty="0">
               <a:solidFill>
                 <a:schemeClr val="bg1"/>
               </a:solidFill>
@@ -5854,7 +5853,7 @@
         </p:nvSpPr>
         <p:spPr>
           <a:xfrm>
-            <a:off x="457200" y="273050"/>
+            <a:off x="457201" y="273050"/>
             <a:ext cx="3008313" cy="1162050"/>
           </a:xfrm>
         </p:spPr>
@@ -5885,7 +5884,7 @@
         </p:nvSpPr>
         <p:spPr>
           <a:xfrm>
-            <a:off x="3575050" y="273050"/>
+            <a:off x="3575050" y="273052"/>
             <a:ext cx="5111750" cy="5853113"/>
           </a:xfrm>
         </p:spPr>
@@ -5969,7 +5968,7 @@
         </p:nvSpPr>
         <p:spPr>
           <a:xfrm>
-            <a:off x="457200" y="1435100"/>
+            <a:off x="457201" y="1435102"/>
             <a:ext cx="3008313" cy="4691063"/>
           </a:xfrm>
         </p:spPr>
@@ -6057,8 +6056,8 @@
         </p:nvSpPr>
         <p:spPr bwMode="auto">
           <a:xfrm>
-            <a:off x="250825" y="6429375"/>
-            <a:ext cx="3035300" cy="427038"/>
+            <a:off x="250825" y="6429376"/>
+            <a:ext cx="3063659" cy="430887"/>
           </a:xfrm>
           <a:prstGeom prst="rect">
             <a:avLst/>
@@ -6162,8 +6161,8 @@
         </p:nvSpPr>
         <p:spPr bwMode="auto">
           <a:xfrm>
-            <a:off x="4252913" y="6424613"/>
-            <a:ext cx="1163637" cy="246062"/>
+            <a:off x="4252914" y="6424614"/>
+            <a:ext cx="1164101" cy="246221"/>
           </a:xfrm>
           <a:prstGeom prst="rect">
             <a:avLst/>
@@ -6204,7 +6203,7 @@
               </a:rPr>
               <a:t>ppt</a:t>
             </a:r>
-            <a:endParaRPr lang="de-DE" dirty="0">
+            <a:endParaRPr lang="de-DE" sz="2400" dirty="0">
               <a:solidFill>
                 <a:schemeClr val="bg1"/>
               </a:solidFill>
@@ -6438,7 +6437,7 @@
             <a:pPr>
               <a:defRPr/>
             </a:pPr>
-            <a:endParaRPr lang="de-DE" dirty="0">
+            <a:endParaRPr lang="de-DE" sz="2400" dirty="0">
               <a:latin typeface="Arial" pitchFamily="34" charset="0"/>
             </a:endParaRPr>
           </a:p>
@@ -6476,7 +6475,7 @@
             <a:pPr>
               <a:defRPr/>
             </a:pPr>
-            <a:endParaRPr lang="de-DE" dirty="0">
+            <a:endParaRPr lang="de-DE" sz="2400" dirty="0">
               <a:latin typeface="Arial" pitchFamily="34" charset="0"/>
             </a:endParaRPr>
           </a:p>
@@ -6492,8 +6491,8 @@
         </p:nvSpPr>
         <p:spPr bwMode="auto">
           <a:xfrm>
-            <a:off x="4456113" y="6615113"/>
-            <a:ext cx="812800" cy="244475"/>
+            <a:off x="4452144" y="6613921"/>
+            <a:ext cx="820738" cy="246863"/>
           </a:xfrm>
           <a:prstGeom prst="rect">
             <a:avLst/>
@@ -6526,7 +6525,7 @@
               <a:pPr algn="ctr">
                 <a:defRPr/>
               </a:pPr>
-              <a:t>25.05.2021</a:t>
+              <a:t>10.02.2023</a:t>
             </a:fld>
             <a:endParaRPr lang="de-DE" sz="1000" dirty="0">
               <a:solidFill>
@@ -6547,8 +6546,8 @@
         </p:nvSpPr>
         <p:spPr bwMode="auto">
           <a:xfrm>
-            <a:off x="8308975" y="6515100"/>
-            <a:ext cx="439738" cy="244475"/>
+            <a:off x="8304682" y="6513908"/>
+            <a:ext cx="444032" cy="246863"/>
           </a:xfrm>
           <a:prstGeom prst="rect">
             <a:avLst/>
@@ -6604,7 +6603,7 @@
         </p:nvSpPr>
         <p:spPr bwMode="auto">
           <a:xfrm>
-            <a:off x="303213" y="981075"/>
+            <a:off x="303214" y="981076"/>
             <a:ext cx="8516937" cy="5400675"/>
           </a:xfrm>
           <a:prstGeom prst="rect">
@@ -6674,7 +6673,7 @@
         </p:nvSpPr>
         <p:spPr bwMode="auto">
           <a:xfrm>
-            <a:off x="3914775" y="3105150"/>
+            <a:off x="3914775" y="3105152"/>
             <a:ext cx="9144000" cy="461963"/>
           </a:xfrm>
           <a:prstGeom prst="rect">
@@ -6698,7 +6697,7 @@
             <a:pPr>
               <a:defRPr/>
             </a:pPr>
-            <a:endParaRPr lang="de-DE" dirty="0">
+            <a:endParaRPr lang="de-DE" sz="2400" dirty="0">
               <a:latin typeface="Arial" pitchFamily="34" charset="0"/>
             </a:endParaRPr>
           </a:p>
@@ -6714,8 +6713,8 @@
         </p:nvSpPr>
         <p:spPr bwMode="auto">
           <a:xfrm>
-            <a:off x="0" y="0"/>
-            <a:ext cx="252413" cy="260350"/>
+            <a:off x="1" y="-630"/>
+            <a:ext cx="251992" cy="261610"/>
           </a:xfrm>
           <a:prstGeom prst="rect">
             <a:avLst/>
@@ -6754,7 +6753,7 @@
               </a:rPr>
               <a:t> </a:t>
             </a:r>
-            <a:endParaRPr lang="de-DE" dirty="0">
+            <a:endParaRPr lang="de-DE" sz="2400" dirty="0">
               <a:latin typeface="Arial" pitchFamily="34" charset="0"/>
               <a:ea typeface="Times New Roman" pitchFamily="18" charset="0"/>
               <a:cs typeface="Arial" charset="0"/>
@@ -6772,8 +6771,8 @@
         </p:nvSpPr>
         <p:spPr bwMode="auto">
           <a:xfrm>
-            <a:off x="0" y="0"/>
-            <a:ext cx="252413" cy="260350"/>
+            <a:off x="1" y="-630"/>
+            <a:ext cx="251992" cy="261610"/>
           </a:xfrm>
           <a:prstGeom prst="rect">
             <a:avLst/>
@@ -6812,7 +6811,7 @@
               </a:rPr>
               <a:t> </a:t>
             </a:r>
-            <a:endParaRPr lang="de-DE" dirty="0">
+            <a:endParaRPr lang="de-DE" sz="2400" dirty="0">
               <a:latin typeface="Arial" pitchFamily="34" charset="0"/>
               <a:ea typeface="Times New Roman" pitchFamily="18" charset="0"/>
               <a:cs typeface="Arial" charset="0"/>
@@ -6830,8 +6829,8 @@
         </p:nvSpPr>
         <p:spPr bwMode="auto">
           <a:xfrm>
-            <a:off x="0" y="0"/>
-            <a:ext cx="252413" cy="260350"/>
+            <a:off x="1" y="-630"/>
+            <a:ext cx="251992" cy="261610"/>
           </a:xfrm>
           <a:prstGeom prst="rect">
             <a:avLst/>
@@ -6870,7 +6869,7 @@
               </a:rPr>
               <a:t> </a:t>
             </a:r>
-            <a:endParaRPr lang="de-DE" dirty="0">
+            <a:endParaRPr lang="de-DE" sz="2400" dirty="0">
               <a:latin typeface="Arial" pitchFamily="34" charset="0"/>
               <a:ea typeface="Times New Roman" pitchFamily="18" charset="0"/>
               <a:cs typeface="Arial" charset="0"/>
@@ -6895,7 +6894,7 @@
         </p:blipFill>
         <p:spPr bwMode="auto">
           <a:xfrm>
-            <a:off x="0" y="0"/>
+            <a:off x="0" y="2"/>
             <a:ext cx="9144000" cy="955675"/>
           </a:xfrm>
           <a:prstGeom prst="rect">
@@ -6927,7 +6926,7 @@
         </p:blipFill>
         <p:spPr bwMode="auto">
           <a:xfrm>
-            <a:off x="6786578" y="65278"/>
+            <a:off x="6786579" y="65280"/>
             <a:ext cx="2214578" cy="463339"/>
           </a:xfrm>
           <a:prstGeom prst="rect">
@@ -6954,7 +6953,7 @@
         </p:nvSpPr>
         <p:spPr bwMode="auto">
           <a:xfrm>
-            <a:off x="457200" y="115888"/>
+            <a:off x="457201" y="115890"/>
             <a:ext cx="5554663" cy="706437"/>
           </a:xfrm>
           <a:prstGeom prst="rect">
@@ -6984,30 +6983,6 @@
           </a:p>
         </p:txBody>
       </p:sp>
-      <p:pic>
-        <p:nvPicPr>
-          <p:cNvPr id="14" name="Grafik 13" descr="logoGFU.jpg"/>
-          <p:cNvPicPr>
-            <a:picLocks noChangeAspect="1"/>
-          </p:cNvPicPr>
-          <p:nvPr/>
-        </p:nvPicPr>
-        <p:blipFill>
-          <a:blip r:embed="rId16" cstate="print"/>
-          <a:stretch>
-            <a:fillRect/>
-          </a:stretch>
-        </p:blipFill>
-        <p:spPr>
-          <a:xfrm>
-            <a:off x="6805628" y="572040"/>
-            <a:ext cx="1785950" cy="385205"/>
-          </a:xfrm>
-          <a:prstGeom prst="rect">
-            <a:avLst/>
-          </a:prstGeom>
-        </p:spPr>
-      </p:pic>
       <p:sp>
         <p:nvSpPr>
           <p:cNvPr id="15" name="Text Box 24"/>
@@ -7018,8 +6993,8 @@
         </p:nvSpPr>
         <p:spPr bwMode="auto">
           <a:xfrm>
-            <a:off x="250825" y="6429375"/>
-            <a:ext cx="3035300" cy="427038"/>
+            <a:off x="250825" y="6429376"/>
+            <a:ext cx="3063659" cy="430887"/>
           </a:xfrm>
           <a:prstGeom prst="rect">
             <a:avLst/>
@@ -7102,13 +7077,22 @@
               <a:defRPr/>
             </a:pPr>
             <a:r>
-              <a:rPr lang="de-DE" sz="1000" dirty="0" smtClean="0">
+              <a:rPr lang="de-DE" sz="1000" dirty="0">
                 <a:solidFill>
                   <a:schemeClr val="bg1"/>
                 </a:solidFill>
                 <a:latin typeface="Arial" charset="0"/>
               </a:rPr>
-              <a:t>Patrick Möbius</a:t>
+              <a:t>Patrick </a:t>
+            </a:r>
+            <a:r>
+              <a:rPr lang="de-DE" sz="1000" dirty="0" err="1">
+                <a:solidFill>
+                  <a:schemeClr val="bg1"/>
+                </a:solidFill>
+                <a:latin typeface="Arial" charset="0"/>
+              </a:rPr>
+              <a:t>Ungewiß</a:t>
             </a:r>
             <a:endParaRPr lang="de-DE" sz="1000" dirty="0">
               <a:solidFill>
@@ -7129,7 +7113,7 @@
         </p:nvSpPr>
         <p:spPr bwMode="auto">
           <a:xfrm>
-            <a:off x="4252913" y="6424613"/>
+            <a:off x="4252913" y="6424615"/>
             <a:ext cx="1728358" cy="246221"/>
           </a:xfrm>
           <a:prstGeom prst="rect">
@@ -7162,7 +7146,7 @@
               </a:rPr>
               <a:t>Tag-1_1-Begruessung.pptx</a:t>
             </a:r>
-            <a:endParaRPr lang="de-DE" dirty="0">
+            <a:endParaRPr lang="de-DE" sz="2400" dirty="0">
               <a:solidFill>
                 <a:schemeClr val="bg1"/>
               </a:solidFill>
@@ -7676,7 +7660,7 @@
         </p:nvSpPr>
         <p:spPr bwMode="auto">
           <a:xfrm>
-            <a:off x="395288" y="5373688"/>
+            <a:off x="395288" y="5373690"/>
             <a:ext cx="3600450" cy="287337"/>
           </a:xfrm>
           <a:prstGeom prst="rect">
@@ -7771,7 +7755,7 @@
         <p:spPr bwMode="auto">
           <a:xfrm>
             <a:off x="8018463" y="4508500"/>
-            <a:ext cx="1090612" cy="184150"/>
+            <a:ext cx="1099981" cy="184666"/>
           </a:xfrm>
           <a:prstGeom prst="rect">
             <a:avLst/>
@@ -7832,7 +7816,7 @@
         </p:nvSpPr>
         <p:spPr bwMode="auto">
           <a:xfrm rot="20291916" flipV="1">
-            <a:off x="5889625" y="4484688"/>
+            <a:off x="5889626" y="4484688"/>
             <a:ext cx="73025" cy="69850"/>
           </a:xfrm>
           <a:prstGeom prst="rect">
@@ -7856,7 +7840,7 @@
             <a:pPr>
               <a:defRPr/>
             </a:pPr>
-            <a:endParaRPr lang="de-DE" dirty="0">
+            <a:endParaRPr lang="de-DE" sz="2400" dirty="0">
               <a:latin typeface="Arial" pitchFamily="34" charset="0"/>
             </a:endParaRPr>
           </a:p>
@@ -7872,7 +7856,7 @@
         </p:nvSpPr>
         <p:spPr bwMode="auto">
           <a:xfrm rot="-922424">
-            <a:off x="5884863" y="4489450"/>
+            <a:off x="5884864" y="4489450"/>
             <a:ext cx="73025" cy="71438"/>
           </a:xfrm>
           <a:prstGeom prst="rect">
@@ -7896,7 +7880,7 @@
             <a:pPr>
               <a:defRPr/>
             </a:pPr>
-            <a:endParaRPr lang="de-DE" dirty="0">
+            <a:endParaRPr lang="de-DE" sz="2400" dirty="0">
               <a:latin typeface="Arial" pitchFamily="34" charset="0"/>
             </a:endParaRPr>
           </a:p>
@@ -7919,7 +7903,7 @@
         </p:blipFill>
         <p:spPr bwMode="auto">
           <a:xfrm>
-            <a:off x="5364163" y="620713"/>
+            <a:off x="5364164" y="620714"/>
             <a:ext cx="3381375" cy="714375"/>
           </a:xfrm>
           <a:prstGeom prst="rect">
@@ -8348,7 +8332,7 @@
         </p:nvSpPr>
         <p:spPr bwMode="auto">
           <a:xfrm>
-            <a:off x="468313" y="2562225"/>
+            <a:off x="468315" y="2562227"/>
             <a:ext cx="5255815" cy="938213"/>
           </a:xfrm>
           <a:noFill/>
@@ -8418,70 +8402,34 @@
           <a:p>
             <a:pPr algn="l" eaLnBrk="1" hangingPunct="1"/>
             <a:r>
-              <a:rPr lang="de-DE" sz="1600" dirty="0" smtClean="0"/>
-              <a:t>26.05. </a:t>
-            </a:r>
-            <a:r>
               <a:rPr lang="de-DE" sz="1600" dirty="0"/>
-              <a:t>– </a:t>
-            </a:r>
-            <a:r>
-              <a:rPr lang="de-DE" sz="1600" dirty="0" smtClean="0"/>
-              <a:t>28.05.2021, </a:t>
-            </a:r>
-            <a:endParaRPr lang="de-DE" sz="1600" dirty="0"/>
+              <a:t>13.02. – 15.02.2023, </a:t>
+            </a:r>
           </a:p>
           <a:p>
             <a:pPr algn="l" eaLnBrk="1" hangingPunct="1"/>
             <a:r>
-              <a:rPr lang="de-DE" sz="1600" dirty="0" smtClean="0"/>
-              <a:t>Patrick Möbius</a:t>
+              <a:rPr lang="de-DE" sz="1600" dirty="0"/>
+              <a:t>Patrick </a:t>
+            </a:r>
+            <a:r>
+              <a:rPr lang="de-DE" sz="1600" dirty="0" err="1"/>
+              <a:t>Ungewiß</a:t>
             </a:r>
             <a:endParaRPr lang="de-DE" sz="1600" dirty="0"/>
           </a:p>
         </p:txBody>
       </p:sp>
-      <p:pic>
-        <p:nvPicPr>
-          <p:cNvPr id="4" name="Grafik 3" descr="logoGFU.jpg"/>
-          <p:cNvPicPr>
-            <a:picLocks noChangeAspect="1"/>
-          </p:cNvPicPr>
-          <p:nvPr/>
-        </p:nvPicPr>
-        <p:blipFill>
-          <a:blip r:embed="rId3" cstate="print"/>
-          <a:stretch>
-            <a:fillRect/>
-          </a:stretch>
-        </p:blipFill>
-        <p:spPr>
-          <a:xfrm>
-            <a:off x="435473" y="640199"/>
-            <a:ext cx="3324732" cy="717099"/>
-          </a:xfrm>
-          <a:prstGeom prst="rect">
-            <a:avLst/>
-          </a:prstGeom>
-        </p:spPr>
-      </p:pic>
     </p:spTree>
   </p:cSld>
   <p:clrMapOvr>
     <a:masterClrMapping/>
   </p:clrMapOvr>
-  <p:timing>
-    <p:tnLst>
-      <p:par>
-        <p:cTn id="1" dur="indefinite" restart="never" nodeType="tmRoot"/>
-      </p:par>
-    </p:tnLst>
-  </p:timing>
 </p:sld>
 </file>
 
 <file path=ppt/slides/slide10.xml><?xml version="1.0" encoding="utf-8"?>
-<p:sld xmlns:a="http://schemas.openxmlformats.org/drawingml/2006/main" xmlns:r="http://schemas.openxmlformats.org/officeDocument/2006/relationships" xmlns:p="http://schemas.openxmlformats.org/presentationml/2006/main">
+<p:sld xmlns:a="http://schemas.openxmlformats.org/drawingml/2006/main" xmlns:r="http://schemas.openxmlformats.org/officeDocument/2006/relationships" xmlns:p="http://schemas.openxmlformats.org/presentationml/2006/main" show="0">
   <p:cSld>
     <p:spTree>
       <p:nvGrpSpPr>
@@ -8513,10 +8461,9 @@
           <a:lstStyle/>
           <a:p>
             <a:r>
-              <a:rPr lang="de-DE" dirty="0" smtClean="0"/>
+              <a:rPr lang="de-DE" dirty="0"/>
               <a:t>Vereinbarungen</a:t>
             </a:r>
-            <a:endParaRPr lang="de-DE" dirty="0"/>
           </a:p>
         </p:txBody>
       </p:sp>
@@ -8536,48 +8483,28 @@
           <a:lstStyle/>
           <a:p>
             <a:r>
-              <a:rPr lang="de-DE" dirty="0" smtClean="0"/>
+              <a:rPr lang="de-DE" dirty="0"/>
               <a:t>Pausen</a:t>
             </a:r>
           </a:p>
           <a:p>
             <a:pPr lvl="1"/>
             <a:r>
-              <a:rPr lang="de-DE" dirty="0" smtClean="0"/>
-              <a:t>Gemeinsam zu </a:t>
-            </a:r>
-            <a:r>
               <a:rPr lang="de-DE" dirty="0"/>
-              <a:t>vorgegebenen </a:t>
-            </a:r>
-            <a:r>
-              <a:rPr lang="de-DE" dirty="0" smtClean="0"/>
-              <a:t>Zeiten</a:t>
+              <a:t>Gemeinsam zu vorgegebenen Zeiten</a:t>
             </a:r>
           </a:p>
           <a:p>
             <a:pPr lvl="1"/>
             <a:r>
               <a:rPr lang="de-DE" dirty="0"/>
-              <a:t>Individuell </a:t>
-            </a:r>
-            <a:r>
-              <a:rPr lang="de-DE" dirty="0" smtClean="0"/>
-              <a:t>während </a:t>
-            </a:r>
+              <a:t>Individuell während der Übungen</a:t>
+            </a:r>
+          </a:p>
+          <a:p>
             <a:r>
               <a:rPr lang="de-DE" dirty="0"/>
-              <a:t>der Übungen</a:t>
-            </a:r>
-          </a:p>
-          <a:p>
-            <a:r>
-              <a:rPr lang="de-DE" dirty="0"/>
-              <a:t>Erreichbarkeit </a:t>
-            </a:r>
-            <a:r>
-              <a:rPr lang="de-DE" dirty="0" smtClean="0"/>
-              <a:t>Dozent</a:t>
+              <a:t>Erreichbarkeit Dozent</a:t>
             </a:r>
           </a:p>
           <a:p>
@@ -8590,21 +8517,21 @@
           <a:p>
             <a:pPr lvl="1"/>
             <a:r>
-              <a:rPr lang="de-DE" smtClean="0"/>
+              <a:rPr lang="de-DE"/>
               <a:t>Handy</a:t>
             </a:r>
-            <a:endParaRPr lang="de-DE" dirty="0" smtClean="0"/>
+            <a:endParaRPr lang="de-DE" dirty="0"/>
           </a:p>
           <a:p>
             <a:pPr lvl="1"/>
             <a:r>
-              <a:rPr lang="de-DE" dirty="0" smtClean="0"/>
+              <a:rPr lang="de-DE" dirty="0"/>
               <a:t>Kamera aus: gerade nicht anwesend bzw. ansprechbar</a:t>
             </a:r>
           </a:p>
           <a:p>
             <a:r>
-              <a:rPr lang="de-DE" dirty="0" smtClean="0"/>
+              <a:rPr lang="de-DE" dirty="0"/>
               <a:t>Regeln</a:t>
             </a:r>
           </a:p>
@@ -8647,13 +8574,6 @@
   <p:clrMapOvr>
     <a:masterClrMapping/>
   </p:clrMapOvr>
-  <p:timing>
-    <p:tnLst>
-      <p:par>
-        <p:cTn id="1" dur="indefinite" restart="never" nodeType="tmRoot"/>
-      </p:par>
-    </p:tnLst>
-  </p:timing>
 </p:sld>
 </file>
 
@@ -8793,7 +8713,7 @@
               <a:buFont typeface="Arial" charset="0"/>
               <a:buChar char="●"/>
             </a:pPr>
-            <a:endParaRPr lang="de-DE" altLang="de-DE" dirty="0" smtClean="0">
+            <a:endParaRPr lang="de-DE" altLang="de-DE" dirty="0">
               <a:ea typeface="+mn-ea"/>
               <a:cs typeface="+mn-cs"/>
             </a:endParaRPr>
@@ -8809,17 +8729,9 @@
                 <a:cs typeface="+mn-cs"/>
                 <a:hlinkClick r:id="rId2"/>
               </a:rPr>
-              <a:t>https://</a:t>
-            </a:r>
-            <a:r>
-              <a:rPr lang="de-DE" altLang="de-DE" dirty="0" smtClean="0">
-                <a:ea typeface="+mn-ea"/>
-                <a:cs typeface="+mn-cs"/>
-                <a:hlinkClick r:id="rId2"/>
-              </a:rPr>
-              <a:t>github.com/anderscore-gmbh/wicket-2021.05</a:t>
-            </a:r>
-            <a:endParaRPr lang="de-DE" altLang="de-DE" dirty="0" smtClean="0">
+              <a:t>https://github.com/anderscore-gmbh/wicket-2021.05</a:t>
+            </a:r>
+            <a:endParaRPr lang="de-DE" altLang="de-DE" dirty="0">
               <a:ea typeface="+mn-ea"/>
               <a:cs typeface="+mn-cs"/>
             </a:endParaRPr>
@@ -8838,7 +8750,7 @@
         </p:nvSpPr>
         <p:spPr>
           <a:xfrm>
-            <a:off x="285750" y="142875"/>
+            <a:off x="285752" y="142875"/>
             <a:ext cx="5654675" cy="706438"/>
           </a:xfrm>
         </p:spPr>
@@ -8863,13 +8775,6 @@
   <p:clrMapOvr>
     <a:masterClrMapping/>
   </p:clrMapOvr>
-  <p:timing>
-    <p:tnLst>
-      <p:par>
-        <p:cTn id="1" dur="indefinite" restart="never" nodeType="tmRoot"/>
-      </p:par>
-    </p:tnLst>
-  </p:timing>
 </p:sld>
 </file>
 
@@ -8952,15 +8857,7 @@
             </a:r>
             <a:r>
               <a:rPr lang="de-DE" sz="2600" i="1" dirty="0"/>
-              <a:t>, Version </a:t>
-            </a:r>
-            <a:r>
-              <a:rPr lang="de-DE" sz="2600" i="1" dirty="0" smtClean="0"/>
-              <a:t>9</a:t>
-            </a:r>
-            <a:r>
-              <a:rPr lang="de-DE" i="1" dirty="0"/>
-              <a:t/>
+              <a:t>, Version 9</a:t>
             </a:r>
             <a:br>
               <a:rPr lang="de-DE" i="1" dirty="0"/>
@@ -9052,15 +8949,18 @@
               <a:rPr lang="de-DE" sz="2000" dirty="0">
                 <a:hlinkClick r:id="rId2"/>
               </a:rPr>
-              <a:t>https://</a:t>
-            </a:r>
-            <a:r>
-              <a:rPr lang="de-DE" sz="2000" dirty="0" smtClean="0">
-                <a:hlinkClick r:id="rId2"/>
+              <a:t>https://nightlies.apache.org/wicket/guide/8.x/single.html</a:t>
+            </a:r>
+            <a:br>
+              <a:rPr lang="de-DE" sz="2000" dirty="0"/>
+            </a:br>
+            <a:r>
+              <a:rPr lang="de-DE" sz="2000" dirty="0">
+                <a:hlinkClick r:id="rId3"/>
               </a:rPr>
-              <a:t>ci.apache.org/projects/wicket/guide/9.x/single.html</a:t>
-            </a:r>
-            <a:endParaRPr lang="de-DE" sz="2000" dirty="0" smtClean="0"/>
+              <a:t>https://ci.apache.org/projects/wicket/guide/9.x/single.html</a:t>
+            </a:r>
+            <a:endParaRPr lang="de-DE" sz="2000" dirty="0"/>
           </a:p>
           <a:p>
             <a:pPr>
@@ -9078,10 +8978,6 @@
               <a:rPr lang="en-US" sz="2600" i="1" dirty="0"/>
               <a:t>Wicket in Action</a:t>
             </a:r>
-            <a:r>
-              <a:rPr lang="en-US" i="1" dirty="0"/>
-              <a:t/>
-            </a:r>
             <a:br>
               <a:rPr lang="en-US" i="1" dirty="0"/>
             </a:br>
@@ -9097,10 +8993,6 @@
               <a:rPr lang="en-US" sz="2000" dirty="0" err="1"/>
               <a:t>Hillenius</a:t>
             </a:r>
-            <a:r>
-              <a:rPr lang="en-US" sz="2000" i="1" dirty="0"/>
-              <a:t/>
-            </a:r>
             <a:br>
               <a:rPr lang="en-US" sz="2000" i="1" dirty="0"/>
             </a:br>
@@ -9166,17 +9058,13 @@
             </a:r>
             <a:r>
               <a:rPr lang="en-US" sz="2000" i="1" dirty="0">
-                <a:hlinkClick r:id="rId3"/>
+                <a:hlinkClick r:id="rId4"/>
               </a:rPr>
               <a:t>http://wicketinaction.com/downloads/</a:t>
             </a:r>
             <a:r>
               <a:rPr lang="en-US" sz="2000" i="1" dirty="0"/>
               <a:t> </a:t>
-            </a:r>
-            <a:r>
-              <a:rPr lang="de-DE" sz="2000" i="1" dirty="0"/>
-              <a:t/>
             </a:r>
             <a:br>
               <a:rPr lang="de-DE" sz="2000" i="1" dirty="0"/>
@@ -9195,13 +9083,6 @@
   <p:clrMapOvr>
     <a:masterClrMapping/>
   </p:clrMapOvr>
-  <p:timing>
-    <p:tnLst>
-      <p:par>
-        <p:cTn id="1" dur="indefinite" restart="never" nodeType="tmRoot"/>
-      </p:par>
-    </p:tnLst>
-  </p:timing>
 </p:sld>
 </file>
 
@@ -9346,7 +9227,7 @@
         </p:nvSpPr>
         <p:spPr>
           <a:xfrm>
-            <a:off x="285750" y="142875"/>
+            <a:off x="285752" y="142875"/>
             <a:ext cx="5654675" cy="706438"/>
           </a:xfrm>
         </p:spPr>
@@ -9401,13 +9282,6 @@
   <p:clrMapOvr>
     <a:masterClrMapping/>
   </p:clrMapOvr>
-  <p:timing>
-    <p:tnLst>
-      <p:par>
-        <p:cTn id="1" dur="indefinite" restart="never" nodeType="tmRoot"/>
-      </p:par>
-    </p:tnLst>
-  </p:timing>
 </p:sld>
 </file>
 
@@ -9516,21 +9390,6 @@
   <p:clrMapOvr>
     <a:masterClrMapping/>
   </p:clrMapOvr>
-  <mc:AlternateContent xmlns:mc="http://schemas.openxmlformats.org/markup-compatibility/2006" xmlns:p14="http://schemas.microsoft.com/office/powerpoint/2010/main">
-    <mc:Choice Requires="p14">
-      <p:transition spd="slow" p14:dur="2000"/>
-    </mc:Choice>
-    <mc:Fallback xmlns="">
-      <p:transition spd="slow"/>
-    </mc:Fallback>
-  </mc:AlternateContent>
-  <p:timing>
-    <p:tnLst>
-      <p:par>
-        <p:cTn id="1" dur="indefinite" restart="never" nodeType="tmRoot"/>
-      </p:par>
-    </p:tnLst>
-  </p:timing>
 </p:sld>
 </file>
 
@@ -9563,7 +9422,7 @@
         </p:nvSpPr>
         <p:spPr>
           <a:xfrm>
-            <a:off x="285750" y="142875"/>
+            <a:off x="285752" y="142875"/>
             <a:ext cx="5654675" cy="706438"/>
           </a:xfrm>
         </p:spPr>
@@ -9590,7 +9449,7 @@
         </p:nvSpPr>
         <p:spPr>
           <a:xfrm>
-            <a:off x="303213" y="1385911"/>
+            <a:off x="303215" y="1385913"/>
             <a:ext cx="8516937" cy="5400675"/>
           </a:xfrm>
         </p:spPr>
@@ -9599,7 +9458,6 @@
           <a:lstStyle/>
           <a:p>
             <a:pPr marL="1163638" indent="-1163638">
-              <a:buFont typeface="Arial" charset="0"/>
               <a:buNone/>
             </a:pPr>
             <a:r>
@@ -9759,7 +9617,7 @@
         </p:blipFill>
         <p:spPr bwMode="auto">
           <a:xfrm>
-            <a:off x="5214942" y="1501807"/>
+            <a:off x="5214944" y="1501807"/>
             <a:ext cx="3360737" cy="4032250"/>
           </a:xfrm>
           <a:prstGeom prst="rect">
@@ -9779,21 +9637,6 @@
   <p:clrMapOvr>
     <a:masterClrMapping/>
   </p:clrMapOvr>
-  <mc:AlternateContent xmlns:mc="http://schemas.openxmlformats.org/markup-compatibility/2006" xmlns:p14="http://schemas.microsoft.com/office/powerpoint/2010/main">
-    <mc:Choice Requires="p14">
-      <p:transition spd="slow" p14:dur="2000"/>
-    </mc:Choice>
-    <mc:Fallback xmlns="">
-      <p:transition spd="slow"/>
-    </mc:Fallback>
-  </mc:AlternateContent>
-  <p:timing>
-    <p:tnLst>
-      <p:par>
-        <p:cTn id="1" dur="indefinite" restart="never" nodeType="tmRoot"/>
-      </p:par>
-    </p:tnLst>
-  </p:timing>
 </p:sld>
 </file>
 
@@ -9980,7 +9823,7 @@
         </p:nvSpPr>
         <p:spPr>
           <a:xfrm>
-            <a:off x="285750" y="142875"/>
+            <a:off x="285752" y="142875"/>
             <a:ext cx="5654675" cy="706438"/>
           </a:xfrm>
         </p:spPr>
@@ -10024,21 +9867,6 @@
   <p:clrMapOvr>
     <a:masterClrMapping/>
   </p:clrMapOvr>
-  <mc:AlternateContent xmlns:mc="http://schemas.openxmlformats.org/markup-compatibility/2006" xmlns:p14="http://schemas.microsoft.com/office/powerpoint/2010/main">
-    <mc:Choice Requires="p14">
-      <p:transition spd="slow" p14:dur="2000"/>
-    </mc:Choice>
-    <mc:Fallback xmlns="">
-      <p:transition spd="slow"/>
-    </mc:Fallback>
-  </mc:AlternateContent>
-  <p:timing>
-    <p:tnLst>
-      <p:par>
-        <p:cTn id="1" dur="indefinite" restart="never" nodeType="tmRoot"/>
-      </p:par>
-    </p:tnLst>
-  </p:timing>
 </p:sld>
 </file>
 
@@ -10084,15 +9912,15 @@
             </a:pPr>
             <a:r>
               <a:rPr lang="de-DE" b="1" dirty="0"/>
-              <a:t>Patrick Möbius (</a:t>
-            </a:r>
-            <a:r>
-              <a:rPr lang="de-DE" b="1" dirty="0" err="1" smtClean="0"/>
-              <a:t>M.Eng</a:t>
+              <a:t>Patrick </a:t>
+            </a:r>
+            <a:r>
+              <a:rPr lang="de-DE" b="1" dirty="0" err="1"/>
+              <a:t>Ungewiß</a:t>
             </a:r>
             <a:r>
               <a:rPr lang="de-DE" b="1" dirty="0"/>
-              <a:t>. I.S.E.)</a:t>
+              <a:t> (M. Eng. I.S.E.)</a:t>
             </a:r>
           </a:p>
           <a:p>
@@ -10254,13 +10082,8 @@
             </a:r>
             <a:r>
               <a:rPr lang="de-DE" altLang="de-DE" dirty="0"/>
-              <a:t>, Angular, GWT/ GXT, JavaScript, </a:t>
-            </a:r>
-            <a:r>
-              <a:rPr lang="de-DE" altLang="de-DE" dirty="0" smtClean="0"/>
-              <a:t>…</a:t>
-            </a:r>
-            <a:endParaRPr lang="de-DE" altLang="de-DE" dirty="0"/>
+              <a:t>, Angular, GWT/ GXT, JavaScript, …</a:t>
+            </a:r>
           </a:p>
         </p:txBody>
       </p:sp>
@@ -10276,7 +10099,7 @@
         </p:nvSpPr>
         <p:spPr>
           <a:xfrm>
-            <a:off x="285750" y="142875"/>
+            <a:off x="285752" y="142875"/>
             <a:ext cx="5654675" cy="706438"/>
           </a:xfrm>
         </p:spPr>
@@ -10285,10 +10108,9 @@
           <a:lstStyle/>
           <a:p>
             <a:r>
-              <a:rPr lang="de-DE" dirty="0" smtClean="0"/>
+              <a:rPr lang="de-DE" dirty="0"/>
               <a:t>Vorstellung</a:t>
             </a:r>
-            <a:endParaRPr lang="de-DE" dirty="0"/>
           </a:p>
         </p:txBody>
       </p:sp>
@@ -10315,7 +10137,7 @@
         </p:blipFill>
         <p:spPr bwMode="auto">
           <a:xfrm>
-            <a:off x="6370178" y="1462108"/>
+            <a:off x="6370180" y="1462110"/>
             <a:ext cx="2522997" cy="3274963"/>
           </a:xfrm>
           <a:prstGeom prst="rect">
@@ -10754,7 +10576,7 @@
         </p:nvSpPr>
         <p:spPr bwMode="auto">
           <a:xfrm rot="-820623">
-            <a:off x="7629525" y="4868863"/>
+            <a:off x="7629527" y="4868865"/>
             <a:ext cx="1268413" cy="427037"/>
           </a:xfrm>
           <a:prstGeom prst="rect">
@@ -10903,7 +10725,7 @@
         </p:nvSpPr>
         <p:spPr bwMode="auto">
           <a:xfrm rot="-376468">
-            <a:off x="4627563" y="1976438"/>
+            <a:off x="4627565" y="1976438"/>
             <a:ext cx="1868487" cy="476250"/>
           </a:xfrm>
           <a:prstGeom prst="rect">
@@ -11052,7 +10874,7 @@
         </p:nvSpPr>
         <p:spPr bwMode="auto">
           <a:xfrm rot="-669469">
-            <a:off x="5592763" y="2697163"/>
+            <a:off x="5592765" y="2697163"/>
             <a:ext cx="1069975" cy="444500"/>
           </a:xfrm>
           <a:prstGeom prst="rect">
@@ -11350,7 +11172,7 @@
         </p:nvSpPr>
         <p:spPr bwMode="auto">
           <a:xfrm rot="638866">
-            <a:off x="4062413" y="4198938"/>
+            <a:off x="4062415" y="4198940"/>
             <a:ext cx="1570037" cy="428625"/>
           </a:xfrm>
           <a:prstGeom prst="rect">
@@ -11499,7 +11321,7 @@
         </p:nvSpPr>
         <p:spPr bwMode="auto">
           <a:xfrm rot="-529204">
-            <a:off x="3927475" y="5214938"/>
+            <a:off x="3927475" y="5214940"/>
             <a:ext cx="1428750" cy="211137"/>
           </a:xfrm>
           <a:prstGeom prst="rect">
@@ -11648,7 +11470,7 @@
         </p:nvSpPr>
         <p:spPr bwMode="auto">
           <a:xfrm rot="-840298">
-            <a:off x="6416675" y="3133725"/>
+            <a:off x="6416675" y="3133727"/>
             <a:ext cx="1257300" cy="454025"/>
           </a:xfrm>
           <a:prstGeom prst="rect">
@@ -11946,7 +11768,7 @@
         </p:nvSpPr>
         <p:spPr bwMode="auto">
           <a:xfrm rot="879827">
-            <a:off x="7083425" y="2414588"/>
+            <a:off x="7083425" y="2414590"/>
             <a:ext cx="1822450" cy="420687"/>
           </a:xfrm>
           <a:prstGeom prst="rect">
@@ -12095,7 +11917,7 @@
         </p:nvSpPr>
         <p:spPr bwMode="auto">
           <a:xfrm rot="795994">
-            <a:off x="5741988" y="5133975"/>
+            <a:off x="5741990" y="5133977"/>
             <a:ext cx="1589087" cy="422275"/>
           </a:xfrm>
           <a:prstGeom prst="rect">
@@ -12393,7 +12215,7 @@
         </p:nvSpPr>
         <p:spPr bwMode="auto">
           <a:xfrm>
-            <a:off x="6202363" y="4249738"/>
+            <a:off x="6202363" y="4249740"/>
             <a:ext cx="1465262" cy="503237"/>
           </a:xfrm>
           <a:prstGeom prst="rect">
@@ -12534,9 +12356,7 @@
       </p:sp>
       <p:sp>
         <p:nvSpPr>
-          <p:cNvPr id="16" name="Titel 1">
-            <a:extLst/>
-          </p:cNvPr>
+          <p:cNvPr id="16" name="Titel 1"/>
           <p:cNvSpPr txBox="1">
             <a:spLocks noChangeArrowheads="1"/>
           </p:cNvSpPr>
@@ -12544,7 +12364,7 @@
         </p:nvSpPr>
         <p:spPr bwMode="auto">
           <a:xfrm>
-            <a:off x="179388" y="130175"/>
+            <a:off x="179390" y="130175"/>
             <a:ext cx="7405687" cy="706438"/>
           </a:xfrm>
           <a:prstGeom prst="rect">
@@ -12566,7 +12386,7 @@
               <a:defRPr/>
             </a:pPr>
             <a:r>
-              <a:rPr lang="de-DE" altLang="de-DE" sz="3000" kern="0" dirty="0" smtClean="0">
+              <a:rPr lang="de-DE" altLang="de-DE" sz="3000" kern="0" dirty="0">
                 <a:solidFill>
                   <a:srgbClr val="0D4F3C"/>
                 </a:solidFill>
@@ -12576,14 +12396,6 @@
               </a:rPr>
               <a:t>Unternehmen</a:t>
             </a:r>
-            <a:endParaRPr lang="de-DE" altLang="de-DE" sz="3000" kern="0" dirty="0">
-              <a:solidFill>
-                <a:srgbClr val="0D4F3C"/>
-              </a:solidFill>
-              <a:latin typeface="+mj-lt"/>
-              <a:ea typeface="+mj-ea"/>
-              <a:cs typeface="+mj-cs"/>
-            </a:endParaRPr>
           </a:p>
         </p:txBody>
       </p:sp>
@@ -12599,7 +12411,7 @@
         </p:nvSpPr>
         <p:spPr>
           <a:xfrm>
-            <a:off x="34925" y="1123950"/>
+            <a:off x="34927" y="1123952"/>
             <a:ext cx="6697663" cy="5400675"/>
           </a:xfrm>
         </p:spPr>
@@ -12608,22 +12420,21 @@
           <a:lstStyle/>
           <a:p>
             <a:pPr marL="447675" indent="-285750">
-              <a:buFont typeface="Monotype Sorts" pitchFamily="2" charset="2"/>
               <a:buNone/>
             </a:pPr>
             <a:r>
-              <a:rPr lang="en-US" altLang="de-DE" sz="1600" smtClean="0"/>
+              <a:rPr lang="en-US" altLang="de-DE" sz="1600"/>
               <a:t>Individuelle Anwendungsentwicklung - Java enterprise, web, mobile</a:t>
             </a:r>
           </a:p>
           <a:p>
             <a:pPr marL="447675" lvl="1"/>
             <a:r>
-              <a:rPr lang="en-US" altLang="de-DE" sz="1600" smtClean="0"/>
+              <a:rPr lang="en-US" altLang="de-DE" sz="1600"/>
               <a:t>seit 2005 </a:t>
             </a:r>
             <a:r>
-              <a:rPr lang="de-DE" altLang="de-DE" sz="1600" smtClean="0">
+              <a:rPr lang="de-DE" altLang="de-DE" sz="1600">
                 <a:solidFill>
                   <a:srgbClr val="008C5A"/>
                 </a:solidFill>
@@ -12632,11 +12443,11 @@
               <a:t>♦</a:t>
             </a:r>
             <a:r>
-              <a:rPr lang="en-US" altLang="de-DE" sz="1600" smtClean="0"/>
+              <a:rPr lang="en-US" altLang="de-DE" sz="1600"/>
               <a:t> in Köln </a:t>
             </a:r>
             <a:r>
-              <a:rPr lang="de-DE" altLang="de-DE" sz="1600" smtClean="0">
+              <a:rPr lang="de-DE" altLang="de-DE" sz="1600">
                 <a:solidFill>
                   <a:srgbClr val="008C5A"/>
                 </a:solidFill>
@@ -12645,11 +12456,11 @@
               <a:t>♦</a:t>
             </a:r>
             <a:r>
-              <a:rPr lang="en-US" altLang="de-DE" sz="1600" smtClean="0"/>
+              <a:rPr lang="en-US" altLang="de-DE" sz="1600"/>
               <a:t> für alle Branchen </a:t>
             </a:r>
             <a:r>
-              <a:rPr lang="de-DE" altLang="de-DE" sz="1600" smtClean="0">
+              <a:rPr lang="de-DE" altLang="de-DE" sz="1600">
                 <a:solidFill>
                   <a:srgbClr val="008C5A"/>
                 </a:solidFill>
@@ -12658,14 +12469,14 @@
               <a:t>♦</a:t>
             </a:r>
             <a:r>
-              <a:rPr lang="en-US" altLang="de-DE" sz="1600" smtClean="0"/>
+              <a:rPr lang="en-US" altLang="de-DE" sz="1600"/>
               <a:t> </a:t>
             </a:r>
           </a:p>
           <a:p>
             <a:pPr marL="447675" lvl="1"/>
             <a:r>
-              <a:rPr lang="en-US" altLang="de-DE" sz="1600" smtClean="0"/>
+              <a:rPr lang="en-US" altLang="de-DE" sz="1600"/>
               <a:t>nach Aufwand &amp; im Festpreis</a:t>
             </a:r>
           </a:p>
@@ -12675,7 +12486,7 @@
               <a:buChar char="ü"/>
             </a:pPr>
             <a:r>
-              <a:rPr lang="en-US" altLang="de-DE" sz="1600" smtClean="0"/>
+              <a:rPr lang="en-US" altLang="de-DE" sz="1600"/>
               <a:t>Digitalisierung/ Prozesse/ Integration </a:t>
             </a:r>
           </a:p>
@@ -12685,7 +12496,7 @@
               <a:buChar char="ü"/>
             </a:pPr>
             <a:r>
-              <a:rPr lang="en-US" altLang="de-DE" sz="1600" smtClean="0"/>
+              <a:rPr lang="en-US" altLang="de-DE" sz="1600"/>
               <a:t>Migration</a:t>
             </a:r>
           </a:p>
@@ -12695,7 +12506,7 @@
               <a:buChar char="ü"/>
             </a:pPr>
             <a:r>
-              <a:rPr lang="en-US" altLang="de-DE" sz="1600" smtClean="0"/>
+              <a:rPr lang="en-US" altLang="de-DE" sz="1600"/>
               <a:t>Neuentwicklung</a:t>
             </a:r>
           </a:p>
@@ -12705,7 +12516,7 @@
               <a:buChar char="ü"/>
             </a:pPr>
             <a:r>
-              <a:rPr lang="en-US" altLang="de-DE" sz="1600" smtClean="0"/>
+              <a:rPr lang="en-US" altLang="de-DE" sz="1600"/>
               <a:t>Notfall/ kritische Situation</a:t>
             </a:r>
           </a:p>
@@ -12715,56 +12526,55 @@
               <a:buChar char="Ú"/>
             </a:pPr>
             <a:r>
-              <a:rPr lang="en-US" altLang="de-DE" sz="1600" smtClean="0"/>
+              <a:rPr lang="en-US" altLang="de-DE" sz="1600"/>
               <a:t>pragmatisch, zielgerichtet, zuverlässig</a:t>
             </a:r>
             <a:br>
-              <a:rPr lang="en-US" altLang="de-DE" sz="1600" smtClean="0"/>
+              <a:rPr lang="en-US" altLang="de-DE" sz="1600"/>
             </a:br>
-            <a:endParaRPr lang="en-US" altLang="de-DE" sz="1600" smtClean="0"/>
+            <a:endParaRPr lang="en-US" altLang="de-DE" sz="1600"/>
           </a:p>
           <a:p>
             <a:pPr marL="447675" indent="-285750">
-              <a:buFont typeface="Monotype Sorts" pitchFamily="2" charset="2"/>
               <a:buNone/>
             </a:pPr>
             <a:r>
-              <a:rPr lang="en-US" altLang="de-DE" sz="1600" smtClean="0"/>
+              <a:rPr lang="en-US" altLang="de-DE" sz="1600"/>
               <a:t>Kompletter SW Life Cycle</a:t>
             </a:r>
           </a:p>
           <a:p>
             <a:pPr marL="447675" lvl="1"/>
             <a:r>
-              <a:rPr lang="en-US" altLang="de-DE" sz="1600" smtClean="0"/>
+              <a:rPr lang="en-US" altLang="de-DE" sz="1600"/>
               <a:t>Projektmanagement/ agile Methodik</a:t>
             </a:r>
           </a:p>
           <a:p>
             <a:pPr marL="447675" lvl="1"/>
             <a:r>
-              <a:rPr lang="en-US" altLang="de-DE" sz="1600" smtClean="0"/>
+              <a:rPr lang="en-US" altLang="de-DE" sz="1600"/>
               <a:t>Anforderungsanalyse</a:t>
             </a:r>
           </a:p>
           <a:p>
             <a:pPr marL="447675" lvl="1"/>
             <a:r>
-              <a:rPr lang="en-US" altLang="de-DE" sz="1600" smtClean="0"/>
+              <a:rPr lang="en-US" altLang="de-DE" sz="1600"/>
               <a:t>Architektur &amp; SW-Design</a:t>
             </a:r>
           </a:p>
           <a:p>
             <a:pPr marL="447675" lvl="1"/>
             <a:r>
-              <a:rPr lang="en-US" altLang="de-DE" sz="1600" smtClean="0"/>
+              <a:rPr lang="en-US" altLang="de-DE" sz="1600"/>
               <a:t>Implementierung &amp; Testautomation</a:t>
             </a:r>
           </a:p>
           <a:p>
             <a:pPr marL="447675" lvl="1"/>
             <a:r>
-              <a:rPr lang="en-US" altLang="de-DE" sz="1600" smtClean="0"/>
+              <a:rPr lang="en-US" altLang="de-DE" sz="1600"/>
               <a:t>Studien &amp; Seminare</a:t>
             </a:r>
           </a:p>
@@ -12772,9 +12582,7 @@
       </p:sp>
       <p:sp>
         <p:nvSpPr>
-          <p:cNvPr id="18" name="Inhaltsplatzhalter 2">
-            <a:extLst/>
-          </p:cNvPr>
+          <p:cNvPr id="18" name="Inhaltsplatzhalter 2"/>
           <p:cNvSpPr txBox="1">
             <a:spLocks noChangeArrowheads="1"/>
           </p:cNvSpPr>
@@ -12782,7 +12590,7 @@
         </p:nvSpPr>
         <p:spPr bwMode="auto">
           <a:xfrm rot="157779">
-            <a:off x="6959600" y="1684338"/>
+            <a:off x="6959602" y="1684340"/>
             <a:ext cx="1852613" cy="504825"/>
           </a:xfrm>
           <a:prstGeom prst="rect">
@@ -12792,7 +12600,6 @@
           <a:ln>
             <a:noFill/>
           </a:ln>
-          <a:extLst/>
         </p:spPr>
         <p:txBody>
           <a:bodyPr lIns="92075" tIns="46038" rIns="92075" bIns="46038"/>
@@ -12810,22 +12617,18 @@
             <a:r>
               <a:rPr lang="en-US" altLang="de-DE" sz="1400" kern="0">
                 <a:latin typeface="+mn-lt"/>
-                <a:cs typeface="+mn-cs"/>
               </a:rPr>
               <a:t>online banking</a:t>
             </a:r>
             <a:endParaRPr lang="en-US" altLang="de-DE" sz="1400" kern="0" dirty="0">
               <a:latin typeface="+mn-lt"/>
-              <a:cs typeface="+mn-cs"/>
             </a:endParaRPr>
           </a:p>
         </p:txBody>
       </p:sp>
       <p:sp>
         <p:nvSpPr>
-          <p:cNvPr id="19" name="Inhaltsplatzhalter 2">
-            <a:extLst/>
-          </p:cNvPr>
+          <p:cNvPr id="19" name="Inhaltsplatzhalter 2"/>
           <p:cNvSpPr txBox="1">
             <a:spLocks noChangeArrowheads="1"/>
           </p:cNvSpPr>
@@ -12833,7 +12636,7 @@
         </p:nvSpPr>
         <p:spPr bwMode="auto">
           <a:xfrm rot="21122013">
-            <a:off x="3870325" y="5133975"/>
+            <a:off x="3870327" y="5133977"/>
             <a:ext cx="1763713" cy="377825"/>
           </a:xfrm>
           <a:prstGeom prst="rect">
@@ -12843,7 +12646,6 @@
           <a:ln>
             <a:noFill/>
           </a:ln>
-          <a:extLst/>
         </p:spPr>
         <p:txBody>
           <a:bodyPr lIns="92075" tIns="46038" rIns="92075" bIns="46038"/>
@@ -12861,22 +12663,18 @@
             <a:r>
               <a:rPr lang="en-US" altLang="de-DE" sz="1400" kern="0">
                 <a:latin typeface="+mn-lt"/>
-                <a:cs typeface="+mn-cs"/>
               </a:rPr>
               <a:t>security Härtung</a:t>
             </a:r>
             <a:endParaRPr lang="en-US" altLang="de-DE" sz="1400" kern="0" dirty="0">
               <a:latin typeface="+mn-lt"/>
-              <a:cs typeface="+mn-cs"/>
             </a:endParaRPr>
           </a:p>
         </p:txBody>
       </p:sp>
       <p:sp>
         <p:nvSpPr>
-          <p:cNvPr id="20" name="Inhaltsplatzhalter 2">
-            <a:extLst/>
-          </p:cNvPr>
+          <p:cNvPr id="20" name="Inhaltsplatzhalter 2"/>
           <p:cNvSpPr txBox="1">
             <a:spLocks noChangeArrowheads="1"/>
           </p:cNvSpPr>
@@ -12894,7 +12692,6 @@
           <a:ln>
             <a:noFill/>
           </a:ln>
-          <a:extLst/>
         </p:spPr>
         <p:txBody>
           <a:bodyPr lIns="92075" tIns="46038" rIns="92075" bIns="46038"/>
@@ -12912,22 +12709,18 @@
             <a:r>
               <a:rPr lang="en-US" altLang="de-DE" sz="1400" kern="0">
                 <a:latin typeface="+mn-lt"/>
-                <a:cs typeface="+mn-cs"/>
               </a:rPr>
               <a:t>Einführung neues Versicherungsprodukt</a:t>
             </a:r>
             <a:endParaRPr lang="en-US" altLang="de-DE" sz="1400" kern="0" dirty="0">
               <a:latin typeface="+mn-lt"/>
-              <a:cs typeface="+mn-cs"/>
             </a:endParaRPr>
           </a:p>
         </p:txBody>
       </p:sp>
       <p:sp>
         <p:nvSpPr>
-          <p:cNvPr id="21" name="Inhaltsplatzhalter 2">
-            <a:extLst/>
-          </p:cNvPr>
+          <p:cNvPr id="21" name="Inhaltsplatzhalter 2"/>
           <p:cNvSpPr txBox="1">
             <a:spLocks noChangeArrowheads="1"/>
           </p:cNvSpPr>
@@ -12935,7 +12728,7 @@
         </p:nvSpPr>
         <p:spPr bwMode="auto">
           <a:xfrm rot="20779455">
-            <a:off x="7577138" y="4826000"/>
+            <a:off x="7577140" y="4826002"/>
             <a:ext cx="1400175" cy="504825"/>
           </a:xfrm>
           <a:prstGeom prst="rect">
@@ -12945,7 +12738,6 @@
           <a:ln>
             <a:noFill/>
           </a:ln>
-          <a:extLst/>
         </p:spPr>
         <p:txBody>
           <a:bodyPr lIns="92075" tIns="46038" rIns="92075" bIns="46038"/>
@@ -12963,22 +12755,18 @@
             <a:r>
               <a:rPr lang="en-US" altLang="de-DE" sz="1400" kern="0">
                 <a:latin typeface="+mn-lt"/>
-                <a:cs typeface="+mn-cs"/>
               </a:rPr>
               <a:t>Börsenhandel Wertpapiere</a:t>
             </a:r>
             <a:endParaRPr lang="en-US" altLang="de-DE" sz="1400" kern="0" dirty="0">
               <a:latin typeface="+mn-lt"/>
-              <a:cs typeface="+mn-cs"/>
             </a:endParaRPr>
           </a:p>
         </p:txBody>
       </p:sp>
       <p:sp>
         <p:nvSpPr>
-          <p:cNvPr id="22" name="Inhaltsplatzhalter 2">
-            <a:extLst/>
-          </p:cNvPr>
+          <p:cNvPr id="22" name="Inhaltsplatzhalter 2"/>
           <p:cNvSpPr txBox="1">
             <a:spLocks noChangeArrowheads="1"/>
           </p:cNvSpPr>
@@ -12986,7 +12774,7 @@
         </p:nvSpPr>
         <p:spPr bwMode="auto">
           <a:xfrm>
-            <a:off x="6130925" y="4221163"/>
+            <a:off x="6130925" y="4221165"/>
             <a:ext cx="2089150" cy="504825"/>
           </a:xfrm>
           <a:prstGeom prst="rect">
@@ -12996,7 +12784,6 @@
           <a:ln>
             <a:noFill/>
           </a:ln>
-          <a:extLst/>
         </p:spPr>
         <p:txBody>
           <a:bodyPr lIns="92075" tIns="46038" rIns="92075" bIns="46038"/>
@@ -13014,22 +12801,18 @@
             <a:r>
               <a:rPr lang="en-US" altLang="de-DE" sz="1400" kern="0">
                 <a:latin typeface="+mn-lt"/>
-                <a:cs typeface="+mn-cs"/>
               </a:rPr>
               <a:t>Nutzerservices Energieversorger</a:t>
             </a:r>
             <a:endParaRPr lang="en-US" altLang="de-DE" sz="1400" kern="0" dirty="0">
               <a:latin typeface="+mn-lt"/>
-              <a:cs typeface="+mn-cs"/>
             </a:endParaRPr>
           </a:p>
         </p:txBody>
       </p:sp>
       <p:sp>
         <p:nvSpPr>
-          <p:cNvPr id="23" name="Inhaltsplatzhalter 2">
-            <a:extLst/>
-          </p:cNvPr>
+          <p:cNvPr id="23" name="Inhaltsplatzhalter 2"/>
           <p:cNvSpPr txBox="1">
             <a:spLocks noChangeArrowheads="1"/>
           </p:cNvSpPr>
@@ -13037,7 +12820,7 @@
         </p:nvSpPr>
         <p:spPr bwMode="auto">
           <a:xfrm rot="836597">
-            <a:off x="7059613" y="2420938"/>
+            <a:off x="7059615" y="2420940"/>
             <a:ext cx="2447925" cy="504825"/>
           </a:xfrm>
           <a:prstGeom prst="rect">
@@ -13047,7 +12830,6 @@
           <a:ln>
             <a:noFill/>
           </a:ln>
-          <a:extLst/>
         </p:spPr>
         <p:txBody>
           <a:bodyPr lIns="92075" tIns="46038" rIns="92075" bIns="46038"/>
@@ -13065,35 +12847,29 @@
             <a:r>
               <a:rPr lang="en-US" altLang="de-DE" sz="1400" kern="0">
                 <a:latin typeface="+mn-lt"/>
-                <a:cs typeface="+mn-cs"/>
               </a:rPr>
               <a:t>Naturschutz: Kartie-</a:t>
             </a:r>
             <a:br>
               <a:rPr lang="en-US" altLang="de-DE" sz="1400" kern="0">
                 <a:latin typeface="+mn-lt"/>
-                <a:cs typeface="+mn-cs"/>
               </a:rPr>
             </a:br>
             <a:r>
               <a:rPr lang="en-US" altLang="de-DE" sz="1400" kern="0">
                 <a:latin typeface="+mn-lt"/>
-                <a:cs typeface="+mn-cs"/>
               </a:rPr>
               <a:t>rung bedrohter Arten</a:t>
             </a:r>
             <a:endParaRPr lang="en-US" altLang="de-DE" sz="1400" kern="0" dirty="0">
               <a:latin typeface="+mn-lt"/>
-              <a:cs typeface="+mn-cs"/>
             </a:endParaRPr>
           </a:p>
         </p:txBody>
       </p:sp>
       <p:sp>
         <p:nvSpPr>
-          <p:cNvPr id="24" name="Inhaltsplatzhalter 2">
-            <a:extLst/>
-          </p:cNvPr>
+          <p:cNvPr id="24" name="Inhaltsplatzhalter 2"/>
           <p:cNvSpPr txBox="1">
             <a:spLocks noChangeArrowheads="1"/>
           </p:cNvSpPr>
@@ -13101,7 +12877,7 @@
         </p:nvSpPr>
         <p:spPr bwMode="auto">
           <a:xfrm rot="670649">
-            <a:off x="4030663" y="4125913"/>
+            <a:off x="4030665" y="4125915"/>
             <a:ext cx="1654175" cy="503237"/>
           </a:xfrm>
           <a:prstGeom prst="rect">
@@ -13111,7 +12887,6 @@
           <a:ln>
             <a:noFill/>
           </a:ln>
-          <a:extLst/>
         </p:spPr>
         <p:txBody>
           <a:bodyPr lIns="92075" tIns="46038" rIns="92075" bIns="46038"/>
@@ -13129,35 +12904,29 @@
             <a:r>
               <a:rPr lang="en-US" altLang="de-DE" sz="1400" kern="0">
                 <a:latin typeface="+mn-lt"/>
-                <a:cs typeface="+mn-cs"/>
               </a:rPr>
               <a:t>Adressverwaltung</a:t>
             </a:r>
             <a:br>
               <a:rPr lang="en-US" altLang="de-DE" sz="1400" kern="0">
                 <a:latin typeface="+mn-lt"/>
-                <a:cs typeface="+mn-cs"/>
               </a:rPr>
             </a:br>
             <a:r>
               <a:rPr lang="en-US" altLang="de-DE" sz="1400" kern="0">
                 <a:latin typeface="+mn-lt"/>
-                <a:cs typeface="+mn-cs"/>
               </a:rPr>
               <a:t> Logistik</a:t>
             </a:r>
             <a:endParaRPr lang="en-US" altLang="de-DE" sz="1400" kern="0" dirty="0">
               <a:latin typeface="+mn-lt"/>
-              <a:cs typeface="+mn-cs"/>
             </a:endParaRPr>
           </a:p>
         </p:txBody>
       </p:sp>
       <p:sp>
         <p:nvSpPr>
-          <p:cNvPr id="25" name="Inhaltsplatzhalter 2">
-            <a:extLst/>
-          </p:cNvPr>
+          <p:cNvPr id="25" name="Inhaltsplatzhalter 2"/>
           <p:cNvSpPr txBox="1">
             <a:spLocks noChangeArrowheads="1"/>
           </p:cNvSpPr>
@@ -13165,7 +12934,7 @@
         </p:nvSpPr>
         <p:spPr bwMode="auto">
           <a:xfrm rot="21095875">
-            <a:off x="5530850" y="2579688"/>
+            <a:off x="5530852" y="2579690"/>
             <a:ext cx="1477963" cy="504825"/>
           </a:xfrm>
           <a:prstGeom prst="rect">
@@ -13175,7 +12944,6 @@
           <a:ln>
             <a:noFill/>
           </a:ln>
-          <a:extLst/>
         </p:spPr>
         <p:txBody>
           <a:bodyPr lIns="92075" tIns="46038" rIns="92075" bIns="46038"/>
@@ -13193,35 +12961,29 @@
             <a:r>
               <a:rPr lang="en-US" altLang="de-DE" sz="1400" kern="0">
                 <a:latin typeface="+mn-lt"/>
-                <a:cs typeface="+mn-cs"/>
               </a:rPr>
               <a:t>µservices </a:t>
             </a:r>
             <a:br>
               <a:rPr lang="en-US" altLang="de-DE" sz="1400" kern="0">
                 <a:latin typeface="+mn-lt"/>
-                <a:cs typeface="+mn-cs"/>
               </a:rPr>
             </a:br>
             <a:r>
               <a:rPr lang="en-US" altLang="de-DE" sz="1400" kern="0">
                 <a:latin typeface="+mn-lt"/>
-                <a:cs typeface="+mn-cs"/>
               </a:rPr>
               <a:t>Automotive</a:t>
             </a:r>
             <a:endParaRPr lang="en-US" altLang="de-DE" sz="1400" kern="0" dirty="0">
               <a:latin typeface="+mn-lt"/>
-              <a:cs typeface="+mn-cs"/>
             </a:endParaRPr>
           </a:p>
         </p:txBody>
       </p:sp>
       <p:sp>
         <p:nvSpPr>
-          <p:cNvPr id="26" name="Inhaltsplatzhalter 2">
-            <a:extLst/>
-          </p:cNvPr>
+          <p:cNvPr id="26" name="Inhaltsplatzhalter 2"/>
           <p:cNvSpPr txBox="1">
             <a:spLocks noChangeArrowheads="1"/>
           </p:cNvSpPr>
@@ -13229,7 +12991,7 @@
         </p:nvSpPr>
         <p:spPr bwMode="auto">
           <a:xfrm>
-            <a:off x="4619625" y="3357563"/>
+            <a:off x="4619627" y="3357565"/>
             <a:ext cx="2016125" cy="504825"/>
           </a:xfrm>
           <a:prstGeom prst="rect">
@@ -13239,7 +13001,6 @@
           <a:ln>
             <a:noFill/>
           </a:ln>
-          <a:extLst/>
         </p:spPr>
         <p:txBody>
           <a:bodyPr lIns="92075" tIns="46038" rIns="92075" bIns="46038"/>
@@ -13257,22 +13018,18 @@
             <a:r>
               <a:rPr lang="en-US" altLang="de-DE" sz="1400" kern="0">
                 <a:latin typeface="+mn-lt"/>
-                <a:cs typeface="+mn-cs"/>
               </a:rPr>
               <a:t>Migration Energieversorger</a:t>
             </a:r>
             <a:endParaRPr lang="en-US" altLang="de-DE" sz="1400" kern="0" dirty="0">
               <a:latin typeface="+mn-lt"/>
-              <a:cs typeface="+mn-cs"/>
             </a:endParaRPr>
           </a:p>
         </p:txBody>
       </p:sp>
       <p:sp>
         <p:nvSpPr>
-          <p:cNvPr id="27" name="Inhaltsplatzhalter 2">
-            <a:extLst/>
-          </p:cNvPr>
+          <p:cNvPr id="27" name="Inhaltsplatzhalter 2"/>
           <p:cNvSpPr txBox="1">
             <a:spLocks noChangeArrowheads="1"/>
           </p:cNvSpPr>
@@ -13280,7 +13037,7 @@
         </p:nvSpPr>
         <p:spPr bwMode="auto">
           <a:xfrm rot="21190261">
-            <a:off x="7259638" y="3527425"/>
+            <a:off x="7259640" y="3527427"/>
             <a:ext cx="1717675" cy="504825"/>
           </a:xfrm>
           <a:prstGeom prst="rect">
@@ -13290,7 +13047,6 @@
           <a:ln>
             <a:noFill/>
           </a:ln>
-          <a:extLst/>
         </p:spPr>
         <p:txBody>
           <a:bodyPr lIns="92075" tIns="46038" rIns="92075" bIns="46038"/>
@@ -13308,22 +13064,18 @@
             <a:r>
               <a:rPr lang="en-US" altLang="de-DE" sz="1400" kern="0">
                 <a:latin typeface="+mn-lt"/>
-                <a:cs typeface="+mn-cs"/>
               </a:rPr>
               <a:t>Schnittstellen Gesundheitswesen</a:t>
             </a:r>
             <a:endParaRPr lang="en-US" altLang="de-DE" sz="1400" kern="0" dirty="0">
               <a:latin typeface="+mn-lt"/>
-              <a:cs typeface="+mn-cs"/>
             </a:endParaRPr>
           </a:p>
         </p:txBody>
       </p:sp>
       <p:sp>
         <p:nvSpPr>
-          <p:cNvPr id="28" name="Inhaltsplatzhalter 2">
-            <a:extLst/>
-          </p:cNvPr>
+          <p:cNvPr id="28" name="Inhaltsplatzhalter 2"/>
           <p:cNvSpPr txBox="1">
             <a:spLocks noChangeArrowheads="1"/>
           </p:cNvSpPr>
@@ -13331,7 +13083,7 @@
         </p:nvSpPr>
         <p:spPr bwMode="auto">
           <a:xfrm rot="700261">
-            <a:off x="5686425" y="5040313"/>
+            <a:off x="5686425" y="5040315"/>
             <a:ext cx="1651000" cy="504825"/>
           </a:xfrm>
           <a:prstGeom prst="rect">
@@ -13341,7 +13093,6 @@
           <a:ln>
             <a:noFill/>
           </a:ln>
-          <a:extLst/>
         </p:spPr>
         <p:txBody>
           <a:bodyPr lIns="92075" tIns="46038" rIns="92075" bIns="46038"/>
@@ -13359,22 +13110,18 @@
             <a:r>
               <a:rPr lang="en-US" altLang="de-DE" sz="1400" kern="0">
                 <a:latin typeface="+mn-lt"/>
-                <a:cs typeface="+mn-cs"/>
               </a:rPr>
               <a:t>EAM &amp; refactoring leasing</a:t>
             </a:r>
             <a:endParaRPr lang="en-US" altLang="de-DE" sz="1400" kern="0" dirty="0">
               <a:latin typeface="+mn-lt"/>
-              <a:cs typeface="+mn-cs"/>
             </a:endParaRPr>
           </a:p>
         </p:txBody>
       </p:sp>
       <p:sp>
         <p:nvSpPr>
-          <p:cNvPr id="29" name="Inhaltsplatzhalter 2">
-            <a:extLst/>
-          </p:cNvPr>
+          <p:cNvPr id="29" name="Inhaltsplatzhalter 2"/>
           <p:cNvSpPr txBox="1">
             <a:spLocks noChangeArrowheads="1"/>
           </p:cNvSpPr>
@@ -13392,7 +13139,6 @@
           <a:ln>
             <a:noFill/>
           </a:ln>
-          <a:extLst/>
         </p:spPr>
         <p:txBody>
           <a:bodyPr lIns="92075" tIns="46038" rIns="92075" bIns="46038"/>
@@ -13410,22 +13156,18 @@
             <a:r>
               <a:rPr lang="en-US" altLang="de-DE" sz="1400" kern="0">
                 <a:latin typeface="+mn-lt"/>
-                <a:cs typeface="+mn-cs"/>
               </a:rPr>
               <a:t>Stabilisierung Retail</a:t>
             </a:r>
             <a:endParaRPr lang="en-US" altLang="de-DE" sz="1400" kern="0" dirty="0">
               <a:latin typeface="+mn-lt"/>
-              <a:cs typeface="+mn-cs"/>
             </a:endParaRPr>
           </a:p>
         </p:txBody>
       </p:sp>
       <p:sp>
         <p:nvSpPr>
-          <p:cNvPr id="30" name="Inhaltsplatzhalter 2">
-            <a:extLst/>
-          </p:cNvPr>
+          <p:cNvPr id="30" name="Inhaltsplatzhalter 2"/>
           <p:cNvSpPr txBox="1">
             <a:spLocks noChangeArrowheads="1"/>
           </p:cNvSpPr>
@@ -13433,7 +13175,7 @@
         </p:nvSpPr>
         <p:spPr bwMode="auto">
           <a:xfrm>
-            <a:off x="5181600" y="6021388"/>
+            <a:off x="5181602" y="6021390"/>
             <a:ext cx="4143375" cy="503237"/>
           </a:xfrm>
           <a:prstGeom prst="rect">
@@ -13443,7 +13185,6 @@
           <a:ln>
             <a:noFill/>
           </a:ln>
-          <a:extLst/>
         </p:spPr>
         <p:txBody>
           <a:bodyPr lIns="92075" tIns="46038" rIns="92075" bIns="46038"/>
@@ -13464,7 +13205,6 @@
                   <a:srgbClr val="037D2C"/>
                 </a:solidFill>
                 <a:latin typeface="+mn-lt"/>
-                <a:cs typeface="+mn-cs"/>
               </a:rPr>
               <a:t>... und für Sie? Sprechen Sie uns an!</a:t>
             </a:r>
@@ -13473,7 +13213,6 @@
                 <a:srgbClr val="037D2C"/>
               </a:solidFill>
               <a:latin typeface="+mn-lt"/>
-              <a:cs typeface="+mn-cs"/>
             </a:endParaRPr>
           </a:p>
         </p:txBody>
@@ -13685,26 +13424,39 @@
                                   </p:childTnLst>
                                 </p:cTn>
                               </p:par>
-                            </p:childTnLst>
-                          </p:cTn>
-                        </p:par>
-                      </p:childTnLst>
-                    </p:cTn>
-                  </p:par>
-                  <p:par>
-                    <p:cTn id="13" fill="hold" nodeType="clickPar">
-                      <p:stCondLst>
-                        <p:cond delay="indefinite"/>
-                      </p:stCondLst>
-                      <p:childTnLst>
-                        <p:par>
-                          <p:cTn id="14" fill="hold" nodeType="withGroup">
-                            <p:stCondLst>
-                              <p:cond delay="0"/>
-                            </p:stCondLst>
-                            <p:childTnLst>
                               <p:par>
-                                <p:cTn id="15" presetID="1" presetClass="entr" presetSubtype="0" fill="hold" grpId="0" nodeType="clickEffect">
+                                <p:cTn id="13" presetID="1" presetClass="entr" presetSubtype="0" fill="hold" grpId="0" nodeType="withEffect">
+                                  <p:stCondLst>
+                                    <p:cond delay="0"/>
+                                  </p:stCondLst>
+                                  <p:childTnLst>
+                                    <p:set>
+                                      <p:cBhvr>
+                                        <p:cTn id="14" dur="1" fill="hold">
+                                          <p:stCondLst>
+                                            <p:cond delay="0"/>
+                                          </p:stCondLst>
+                                        </p:cTn>
+                                        <p:tgtEl>
+                                          <p:spTgt spid="17">
+                                            <p:txEl>
+                                              <p:pRg st="3" end="3"/>
+                                            </p:txEl>
+                                          </p:spTgt>
+                                        </p:tgtEl>
+                                        <p:attrNameLst>
+                                          <p:attrName>style.visibility</p:attrName>
+                                        </p:attrNameLst>
+                                      </p:cBhvr>
+                                      <p:to>
+                                        <p:strVal val="visible"/>
+                                      </p:to>
+                                    </p:set>
+                                  </p:childTnLst>
+                                </p:cTn>
+                              </p:par>
+                              <p:par>
+                                <p:cTn id="15" presetID="1" presetClass="entr" presetSubtype="0" fill="hold" grpId="0" nodeType="withEffect">
                                   <p:stCondLst>
                                     <p:cond delay="0"/>
                                   </p:stCondLst>
@@ -13719,7 +13471,7 @@
                                         <p:tgtEl>
                                           <p:spTgt spid="17">
                                             <p:txEl>
-                                              <p:pRg st="3" end="3"/>
+                                              <p:pRg st="4" end="4"/>
                                             </p:txEl>
                                           </p:spTgt>
                                         </p:tgtEl>
@@ -13750,7 +13502,7 @@
                                         <p:tgtEl>
                                           <p:spTgt spid="17">
                                             <p:txEl>
-                                              <p:pRg st="4" end="4"/>
+                                              <p:pRg st="5" end="5"/>
                                             </p:txEl>
                                           </p:spTgt>
                                         </p:tgtEl>
@@ -13781,7 +13533,7 @@
                                         <p:tgtEl>
                                           <p:spTgt spid="17">
                                             <p:txEl>
-                                              <p:pRg st="5" end="5"/>
+                                              <p:pRg st="6" end="6"/>
                                             </p:txEl>
                                           </p:spTgt>
                                         </p:tgtEl>
@@ -13812,37 +13564,6 @@
                                         <p:tgtEl>
                                           <p:spTgt spid="17">
                                             <p:txEl>
-                                              <p:pRg st="6" end="6"/>
-                                            </p:txEl>
-                                          </p:spTgt>
-                                        </p:tgtEl>
-                                        <p:attrNameLst>
-                                          <p:attrName>style.visibility</p:attrName>
-                                        </p:attrNameLst>
-                                      </p:cBhvr>
-                                      <p:to>
-                                        <p:strVal val="visible"/>
-                                      </p:to>
-                                    </p:set>
-                                  </p:childTnLst>
-                                </p:cTn>
-                              </p:par>
-                              <p:par>
-                                <p:cTn id="23" presetID="1" presetClass="entr" presetSubtype="0" fill="hold" grpId="0" nodeType="withEffect">
-                                  <p:stCondLst>
-                                    <p:cond delay="0"/>
-                                  </p:stCondLst>
-                                  <p:childTnLst>
-                                    <p:set>
-                                      <p:cBhvr>
-                                        <p:cTn id="24" dur="1" fill="hold">
-                                          <p:stCondLst>
-                                            <p:cond delay="0"/>
-                                          </p:stCondLst>
-                                        </p:cTn>
-                                        <p:tgtEl>
-                                          <p:spTgt spid="17">
-                                            <p:txEl>
                                               <p:pRg st="7" end="7"/>
                                             </p:txEl>
                                           </p:spTgt>
@@ -13865,19 +13586,46 @@
                     </p:cTn>
                   </p:par>
                   <p:par>
-                    <p:cTn id="25" fill="hold" nodeType="clickPar">
+                    <p:cTn id="23" fill="hold" nodeType="clickPar">
                       <p:stCondLst>
                         <p:cond delay="indefinite"/>
                       </p:stCondLst>
                       <p:childTnLst>
                         <p:par>
-                          <p:cTn id="26" fill="hold" nodeType="withGroup">
+                          <p:cTn id="24" fill="hold" nodeType="withGroup">
                             <p:stCondLst>
                               <p:cond delay="0"/>
                             </p:stCondLst>
                             <p:childTnLst>
                               <p:par>
-                                <p:cTn id="27" presetID="1" presetClass="entr" presetSubtype="0" fill="hold" grpId="0" nodeType="clickEffect">
+                                <p:cTn id="25" presetID="1" presetClass="entr" presetSubtype="0" fill="hold" grpId="0" nodeType="clickEffect">
+                                  <p:stCondLst>
+                                    <p:cond delay="0"/>
+                                  </p:stCondLst>
+                                  <p:childTnLst>
+                                    <p:set>
+                                      <p:cBhvr>
+                                        <p:cTn id="26" dur="1" fill="hold">
+                                          <p:stCondLst>
+                                            <p:cond delay="0"/>
+                                          </p:stCondLst>
+                                        </p:cTn>
+                                        <p:tgtEl>
+                                          <p:spTgt spid="4"/>
+                                        </p:tgtEl>
+                                        <p:attrNameLst>
+                                          <p:attrName>style.visibility</p:attrName>
+                                        </p:attrNameLst>
+                                      </p:cBhvr>
+                                      <p:to>
+                                        <p:strVal val="visible"/>
+                                      </p:to>
+                                    </p:set>
+                                  </p:childTnLst>
+                                </p:cTn>
+                              </p:par>
+                              <p:par>
+                                <p:cTn id="27" presetID="1" presetClass="entr" presetSubtype="0" fill="hold" grpId="0" nodeType="withEffect">
                                   <p:stCondLst>
                                     <p:cond delay="0"/>
                                   </p:stCondLst>
@@ -13890,7 +13638,7 @@
                                           </p:stCondLst>
                                         </p:cTn>
                                         <p:tgtEl>
-                                          <p:spTgt spid="4"/>
+                                          <p:spTgt spid="5"/>
                                         </p:tgtEl>
                                         <p:attrNameLst>
                                           <p:attrName>style.visibility</p:attrName>
@@ -13917,7 +13665,7 @@
                                           </p:stCondLst>
                                         </p:cTn>
                                         <p:tgtEl>
-                                          <p:spTgt spid="5"/>
+                                          <p:spTgt spid="6"/>
                                         </p:tgtEl>
                                         <p:attrNameLst>
                                           <p:attrName>style.visibility</p:attrName>
@@ -13944,7 +13692,7 @@
                                           </p:stCondLst>
                                         </p:cTn>
                                         <p:tgtEl>
-                                          <p:spTgt spid="6"/>
+                                          <p:spTgt spid="7"/>
                                         </p:tgtEl>
                                         <p:attrNameLst>
                                           <p:attrName>style.visibility</p:attrName>
@@ -13971,7 +13719,7 @@
                                           </p:stCondLst>
                                         </p:cTn>
                                         <p:tgtEl>
-                                          <p:spTgt spid="7"/>
+                                          <p:spTgt spid="8"/>
                                         </p:tgtEl>
                                         <p:attrNameLst>
                                           <p:attrName>style.visibility</p:attrName>
@@ -13998,7 +13746,7 @@
                                           </p:stCondLst>
                                         </p:cTn>
                                         <p:tgtEl>
-                                          <p:spTgt spid="8"/>
+                                          <p:spTgt spid="9"/>
                                         </p:tgtEl>
                                         <p:attrNameLst>
                                           <p:attrName>style.visibility</p:attrName>
@@ -14025,7 +13773,7 @@
                                           </p:stCondLst>
                                         </p:cTn>
                                         <p:tgtEl>
-                                          <p:spTgt spid="9"/>
+                                          <p:spTgt spid="10"/>
                                         </p:tgtEl>
                                         <p:attrNameLst>
                                           <p:attrName>style.visibility</p:attrName>
@@ -14052,7 +13800,7 @@
                                           </p:stCondLst>
                                         </p:cTn>
                                         <p:tgtEl>
-                                          <p:spTgt spid="10"/>
+                                          <p:spTgt spid="11"/>
                                         </p:tgtEl>
                                         <p:attrNameLst>
                                           <p:attrName>style.visibility</p:attrName>
@@ -14079,7 +13827,7 @@
                                           </p:stCondLst>
                                         </p:cTn>
                                         <p:tgtEl>
-                                          <p:spTgt spid="11"/>
+                                          <p:spTgt spid="12"/>
                                         </p:tgtEl>
                                         <p:attrNameLst>
                                           <p:attrName>style.visibility</p:attrName>
@@ -14106,7 +13854,7 @@
                                           </p:stCondLst>
                                         </p:cTn>
                                         <p:tgtEl>
-                                          <p:spTgt spid="12"/>
+                                          <p:spTgt spid="13"/>
                                         </p:tgtEl>
                                         <p:attrNameLst>
                                           <p:attrName>style.visibility</p:attrName>
@@ -14133,7 +13881,7 @@
                                           </p:stCondLst>
                                         </p:cTn>
                                         <p:tgtEl>
-                                          <p:spTgt spid="13"/>
+                                          <p:spTgt spid="14"/>
                                         </p:tgtEl>
                                         <p:attrNameLst>
                                           <p:attrName>style.visibility</p:attrName>
@@ -14160,7 +13908,7 @@
                                           </p:stCondLst>
                                         </p:cTn>
                                         <p:tgtEl>
-                                          <p:spTgt spid="14"/>
+                                          <p:spTgt spid="15"/>
                                         </p:tgtEl>
                                         <p:attrNameLst>
                                           <p:attrName>style.visibility</p:attrName>
@@ -14187,7 +13935,7 @@
                                           </p:stCondLst>
                                         </p:cTn>
                                         <p:tgtEl>
-                                          <p:spTgt spid="15"/>
+                                          <p:spTgt spid="18"/>
                                         </p:tgtEl>
                                         <p:attrNameLst>
                                           <p:attrName>style.visibility</p:attrName>
@@ -14214,7 +13962,7 @@
                                           </p:stCondLst>
                                         </p:cTn>
                                         <p:tgtEl>
-                                          <p:spTgt spid="18"/>
+                                          <p:spTgt spid="19"/>
                                         </p:tgtEl>
                                         <p:attrNameLst>
                                           <p:attrName>style.visibility</p:attrName>
@@ -14241,7 +13989,7 @@
                                           </p:stCondLst>
                                         </p:cTn>
                                         <p:tgtEl>
-                                          <p:spTgt spid="19"/>
+                                          <p:spTgt spid="20"/>
                                         </p:tgtEl>
                                         <p:attrNameLst>
                                           <p:attrName>style.visibility</p:attrName>
@@ -14268,7 +14016,7 @@
                                           </p:stCondLst>
                                         </p:cTn>
                                         <p:tgtEl>
-                                          <p:spTgt spid="20"/>
+                                          <p:spTgt spid="21"/>
                                         </p:tgtEl>
                                         <p:attrNameLst>
                                           <p:attrName>style.visibility</p:attrName>
@@ -14295,7 +14043,7 @@
                                           </p:stCondLst>
                                         </p:cTn>
                                         <p:tgtEl>
-                                          <p:spTgt spid="21"/>
+                                          <p:spTgt spid="22"/>
                                         </p:tgtEl>
                                         <p:attrNameLst>
                                           <p:attrName>style.visibility</p:attrName>
@@ -14322,7 +14070,7 @@
                                           </p:stCondLst>
                                         </p:cTn>
                                         <p:tgtEl>
-                                          <p:spTgt spid="22"/>
+                                          <p:spTgt spid="23"/>
                                         </p:tgtEl>
                                         <p:attrNameLst>
                                           <p:attrName>style.visibility</p:attrName>
@@ -14349,7 +14097,7 @@
                                           </p:stCondLst>
                                         </p:cTn>
                                         <p:tgtEl>
-                                          <p:spTgt spid="23"/>
+                                          <p:spTgt spid="24"/>
                                         </p:tgtEl>
                                         <p:attrNameLst>
                                           <p:attrName>style.visibility</p:attrName>
@@ -14376,7 +14124,7 @@
                                           </p:stCondLst>
                                         </p:cTn>
                                         <p:tgtEl>
-                                          <p:spTgt spid="24"/>
+                                          <p:spTgt spid="25"/>
                                         </p:tgtEl>
                                         <p:attrNameLst>
                                           <p:attrName>style.visibility</p:attrName>
@@ -14403,7 +14151,7 @@
                                           </p:stCondLst>
                                         </p:cTn>
                                         <p:tgtEl>
-                                          <p:spTgt spid="25"/>
+                                          <p:spTgt spid="26"/>
                                         </p:tgtEl>
                                         <p:attrNameLst>
                                           <p:attrName>style.visibility</p:attrName>
@@ -14430,7 +14178,7 @@
                                           </p:stCondLst>
                                         </p:cTn>
                                         <p:tgtEl>
-                                          <p:spTgt spid="26"/>
+                                          <p:spTgt spid="27"/>
                                         </p:tgtEl>
                                         <p:attrNameLst>
                                           <p:attrName>style.visibility</p:attrName>
@@ -14457,7 +14205,7 @@
                                           </p:stCondLst>
                                         </p:cTn>
                                         <p:tgtEl>
-                                          <p:spTgt spid="27"/>
+                                          <p:spTgt spid="28"/>
                                         </p:tgtEl>
                                         <p:attrNameLst>
                                           <p:attrName>style.visibility</p:attrName>
@@ -14484,33 +14232,6 @@
                                           </p:stCondLst>
                                         </p:cTn>
                                         <p:tgtEl>
-                                          <p:spTgt spid="28"/>
-                                        </p:tgtEl>
-                                        <p:attrNameLst>
-                                          <p:attrName>style.visibility</p:attrName>
-                                        </p:attrNameLst>
-                                      </p:cBhvr>
-                                      <p:to>
-                                        <p:strVal val="visible"/>
-                                      </p:to>
-                                    </p:set>
-                                  </p:childTnLst>
-                                </p:cTn>
-                              </p:par>
-                              <p:par>
-                                <p:cTn id="73" presetID="1" presetClass="entr" presetSubtype="0" fill="hold" grpId="0" nodeType="withEffect">
-                                  <p:stCondLst>
-                                    <p:cond delay="0"/>
-                                  </p:stCondLst>
-                                  <p:childTnLst>
-                                    <p:set>
-                                      <p:cBhvr>
-                                        <p:cTn id="74" dur="1" fill="hold">
-                                          <p:stCondLst>
-                                            <p:cond delay="0"/>
-                                          </p:stCondLst>
-                                        </p:cTn>
-                                        <p:tgtEl>
                                           <p:spTgt spid="29"/>
                                         </p:tgtEl>
                                         <p:attrNameLst>
@@ -14531,19 +14252,50 @@
                     </p:cTn>
                   </p:par>
                   <p:par>
-                    <p:cTn id="75" fill="hold" nodeType="clickPar">
+                    <p:cTn id="73" fill="hold" nodeType="clickPar">
                       <p:stCondLst>
                         <p:cond delay="indefinite"/>
                       </p:stCondLst>
                       <p:childTnLst>
                         <p:par>
-                          <p:cTn id="76" fill="hold" nodeType="withGroup">
+                          <p:cTn id="74" fill="hold" nodeType="withGroup">
                             <p:stCondLst>
                               <p:cond delay="0"/>
                             </p:stCondLst>
                             <p:childTnLst>
                               <p:par>
-                                <p:cTn id="77" presetID="1" presetClass="entr" presetSubtype="0" fill="hold" grpId="0" nodeType="clickEffect">
+                                <p:cTn id="75" presetID="1" presetClass="entr" presetSubtype="0" fill="hold" grpId="0" nodeType="clickEffect">
+                                  <p:stCondLst>
+                                    <p:cond delay="0"/>
+                                  </p:stCondLst>
+                                  <p:childTnLst>
+                                    <p:set>
+                                      <p:cBhvr>
+                                        <p:cTn id="76" dur="1" fill="hold">
+                                          <p:stCondLst>
+                                            <p:cond delay="0"/>
+                                          </p:stCondLst>
+                                        </p:cTn>
+                                        <p:tgtEl>
+                                          <p:spTgt spid="17">
+                                            <p:txEl>
+                                              <p:pRg st="8" end="8"/>
+                                            </p:txEl>
+                                          </p:spTgt>
+                                        </p:tgtEl>
+                                        <p:attrNameLst>
+                                          <p:attrName>style.visibility</p:attrName>
+                                        </p:attrNameLst>
+                                      </p:cBhvr>
+                                      <p:to>
+                                        <p:strVal val="visible"/>
+                                      </p:to>
+                                    </p:set>
+                                  </p:childTnLst>
+                                </p:cTn>
+                              </p:par>
+                              <p:par>
+                                <p:cTn id="77" presetID="1" presetClass="entr" presetSubtype="0" fill="hold" grpId="0" nodeType="withEffect">
                                   <p:stCondLst>
                                     <p:cond delay="0"/>
                                   </p:stCondLst>
@@ -14558,7 +14310,7 @@
                                         <p:tgtEl>
                                           <p:spTgt spid="17">
                                             <p:txEl>
-                                              <p:pRg st="8" end="8"/>
+                                              <p:pRg st="9" end="9"/>
                                             </p:txEl>
                                           </p:spTgt>
                                         </p:tgtEl>
@@ -14589,7 +14341,7 @@
                                         <p:tgtEl>
                                           <p:spTgt spid="17">
                                             <p:txEl>
-                                              <p:pRg st="9" end="9"/>
+                                              <p:pRg st="10" end="10"/>
                                             </p:txEl>
                                           </p:spTgt>
                                         </p:tgtEl>
@@ -14620,7 +14372,7 @@
                                         <p:tgtEl>
                                           <p:spTgt spid="17">
                                             <p:txEl>
-                                              <p:pRg st="10" end="10"/>
+                                              <p:pRg st="11" end="11"/>
                                             </p:txEl>
                                           </p:spTgt>
                                         </p:tgtEl>
@@ -14651,7 +14403,7 @@
                                         <p:tgtEl>
                                           <p:spTgt spid="17">
                                             <p:txEl>
-                                              <p:pRg st="11" end="11"/>
+                                              <p:pRg st="12" end="12"/>
                                             </p:txEl>
                                           </p:spTgt>
                                         </p:tgtEl>
@@ -14682,7 +14434,7 @@
                                         <p:tgtEl>
                                           <p:spTgt spid="17">
                                             <p:txEl>
-                                              <p:pRg st="12" end="12"/>
+                                              <p:pRg st="13" end="13"/>
                                             </p:txEl>
                                           </p:spTgt>
                                         </p:tgtEl>
@@ -14706,37 +14458,6 @@
                                     <p:set>
                                       <p:cBhvr>
                                         <p:cTn id="88" dur="1" fill="hold">
-                                          <p:stCondLst>
-                                            <p:cond delay="0"/>
-                                          </p:stCondLst>
-                                        </p:cTn>
-                                        <p:tgtEl>
-                                          <p:spTgt spid="17">
-                                            <p:txEl>
-                                              <p:pRg st="13" end="13"/>
-                                            </p:txEl>
-                                          </p:spTgt>
-                                        </p:tgtEl>
-                                        <p:attrNameLst>
-                                          <p:attrName>style.visibility</p:attrName>
-                                        </p:attrNameLst>
-                                      </p:cBhvr>
-                                      <p:to>
-                                        <p:strVal val="visible"/>
-                                      </p:to>
-                                    </p:set>
-                                  </p:childTnLst>
-                                </p:cTn>
-                              </p:par>
-                              <p:par>
-                                <p:cTn id="89" presetID="1" presetClass="entr" presetSubtype="0" fill="hold" grpId="0" nodeType="withEffect">
-                                  <p:stCondLst>
-                                    <p:cond delay="0"/>
-                                  </p:stCondLst>
-                                  <p:childTnLst>
-                                    <p:set>
-                                      <p:cBhvr>
-                                        <p:cTn id="90" dur="1" fill="hold">
                                           <p:stCondLst>
                                             <p:cond delay="0"/>
                                           </p:stCondLst>
@@ -15051,13 +14772,6 @@
   <p:clrMapOvr>
     <a:masterClrMapping/>
   </p:clrMapOvr>
-  <p:timing>
-    <p:tnLst>
-      <p:par>
-        <p:cTn id="1" dur="indefinite" restart="never" nodeType="tmRoot"/>
-      </p:par>
-    </p:tnLst>
-  </p:timing>
 </p:sld>
 </file>
 
@@ -15278,7 +14992,7 @@
         </p:nvSpPr>
         <p:spPr>
           <a:xfrm>
-            <a:off x="285750" y="142875"/>
+            <a:off x="285752" y="142875"/>
             <a:ext cx="5654675" cy="706438"/>
           </a:xfrm>
         </p:spPr>
@@ -15333,13 +15047,6 @@
   <p:clrMapOvr>
     <a:masterClrMapping/>
   </p:clrMapOvr>
-  <p:timing>
-    <p:tnLst>
-      <p:par>
-        <p:cTn id="1" dur="indefinite" restart="never" nodeType="tmRoot"/>
-      </p:par>
-    </p:tnLst>
-  </p:timing>
 </p:sld>
 </file>
 
@@ -15384,8 +15091,8 @@
               <a:buNone/>
             </a:pPr>
             <a:r>
-              <a:rPr lang="de-DE" sz="2000" b="1" dirty="0" smtClean="0"/>
-              <a:t>Mittwoch, 26.05.2021</a:t>
+              <a:rPr lang="de-DE" sz="2000" b="1" dirty="0"/>
+              <a:t>Montag, 13.02.2023</a:t>
             </a:r>
           </a:p>
           <a:p>
@@ -15393,10 +15100,9 @@
               <a:buNone/>
             </a:pPr>
             <a:r>
-              <a:rPr lang="de-DE" sz="2000" b="1" dirty="0" smtClean="0"/>
-              <a:t>Donnerstag, 27.05.2021</a:t>
-            </a:r>
-            <a:endParaRPr lang="de-DE" sz="2000" b="1" dirty="0"/>
+              <a:rPr lang="de-DE" sz="2000" b="1" dirty="0"/>
+              <a:t>Dienstag, 14.02.2023</a:t>
+            </a:r>
           </a:p>
           <a:p>
             <a:pPr>
@@ -15404,13 +15110,8 @@
             </a:pPr>
             <a:r>
               <a:rPr lang="de-DE" sz="2000" b="1" dirty="0"/>
-              <a:t>Freitag, </a:t>
-            </a:r>
-            <a:r>
-              <a:rPr lang="de-DE" sz="2000" b="1" dirty="0" smtClean="0"/>
-              <a:t>28.05.2021</a:t>
-            </a:r>
-            <a:endParaRPr lang="de-DE" sz="2000" b="1" dirty="0"/>
+              <a:t>Mittwoch, 15.02.2023</a:t>
+            </a:r>
           </a:p>
           <a:p>
             <a:pPr>
@@ -15444,19 +15145,8 @@
                 <a:ea typeface="+mn-ea"/>
                 <a:cs typeface="+mn-cs"/>
               </a:rPr>
-              <a:t>Beginn:		  9:00 </a:t>
-            </a:r>
-            <a:r>
-              <a:rPr lang="de-DE" altLang="de-DE" dirty="0" smtClean="0">
-                <a:ea typeface="+mn-ea"/>
-                <a:cs typeface="+mn-cs"/>
-              </a:rPr>
-              <a:t>Uhr</a:t>
-            </a:r>
-            <a:endParaRPr lang="de-DE" altLang="de-DE" dirty="0">
-              <a:ea typeface="+mn-ea"/>
-              <a:cs typeface="+mn-cs"/>
-            </a:endParaRPr>
+              <a:t>Beginn:		  9:00 Uhr</a:t>
+            </a:r>
           </a:p>
           <a:p>
             <a:pPr marL="342900" lvl="1" indent="-342900">
@@ -15494,21 +15184,7 @@
                 <a:ea typeface="+mn-ea"/>
                 <a:cs typeface="+mn-cs"/>
               </a:rPr>
-              <a:t>Ende: 		</a:t>
-            </a:r>
-            <a:r>
-              <a:rPr lang="de-DE" altLang="de-DE" dirty="0" smtClean="0">
-                <a:ea typeface="+mn-ea"/>
-                <a:cs typeface="+mn-cs"/>
-              </a:rPr>
-              <a:t>16:00 </a:t>
-            </a:r>
-            <a:r>
-              <a:rPr lang="de-DE" altLang="de-DE" dirty="0">
-                <a:ea typeface="+mn-ea"/>
-                <a:cs typeface="+mn-cs"/>
-              </a:rPr>
-              <a:t>Uhr </a:t>
+              <a:t>Ende: 		16:00 Uhr </a:t>
             </a:r>
             <a:r>
               <a:rPr lang="de-DE" altLang="de-DE" dirty="0">
@@ -15545,7 +15221,7 @@
         </p:nvSpPr>
         <p:spPr>
           <a:xfrm>
-            <a:off x="285750" y="142875"/>
+            <a:off x="285752" y="142875"/>
             <a:ext cx="5654675" cy="706438"/>
           </a:xfrm>
         </p:spPr>
@@ -15570,18 +15246,11 @@
   <p:clrMapOvr>
     <a:masterClrMapping/>
   </p:clrMapOvr>
-  <p:timing>
-    <p:tnLst>
-      <p:par>
-        <p:cTn id="1" dur="indefinite" restart="never" nodeType="tmRoot"/>
-      </p:par>
-    </p:tnLst>
-  </p:timing>
 </p:sld>
 </file>
 
 <file path=ppt/slides/slide9.xml><?xml version="1.0" encoding="utf-8"?>
-<p:sld xmlns:a="http://schemas.openxmlformats.org/drawingml/2006/main" xmlns:r="http://schemas.openxmlformats.org/officeDocument/2006/relationships" xmlns:p="http://schemas.openxmlformats.org/presentationml/2006/main">
+<p:sld xmlns:a="http://schemas.openxmlformats.org/drawingml/2006/main" xmlns:r="http://schemas.openxmlformats.org/officeDocument/2006/relationships" xmlns:p="http://schemas.openxmlformats.org/presentationml/2006/main" show="0">
   <p:cSld>
     <p:spTree>
       <p:nvGrpSpPr>
@@ -15613,10 +15282,9 @@
           <a:lstStyle/>
           <a:p>
             <a:r>
-              <a:rPr lang="de-DE" dirty="0" smtClean="0"/>
+              <a:rPr lang="de-DE" dirty="0"/>
               <a:t>Remote Training</a:t>
             </a:r>
-            <a:endParaRPr lang="de-DE" dirty="0"/>
           </a:p>
         </p:txBody>
       </p:sp>
@@ -15636,56 +15304,56 @@
           <a:lstStyle/>
           <a:p>
             <a:r>
-              <a:rPr lang="de-DE" dirty="0" smtClean="0"/>
+              <a:rPr lang="de-DE" dirty="0"/>
               <a:t>Dozent in Räumlichkeiten der GFU</a:t>
             </a:r>
           </a:p>
           <a:p>
             <a:r>
-              <a:rPr lang="de-DE" dirty="0" smtClean="0"/>
+              <a:rPr lang="de-DE" dirty="0"/>
               <a:t>Video-Konferenz über Zoom</a:t>
             </a:r>
           </a:p>
           <a:p>
             <a:pPr lvl="1"/>
             <a:r>
-              <a:rPr lang="de-DE" dirty="0" smtClean="0"/>
+              <a:rPr lang="de-DE" dirty="0"/>
               <a:t>Folien</a:t>
             </a:r>
           </a:p>
           <a:p>
             <a:pPr lvl="1"/>
             <a:r>
-              <a:rPr lang="de-DE" dirty="0" smtClean="0"/>
+              <a:rPr lang="de-DE" dirty="0"/>
               <a:t>Bildschirmfreigabe</a:t>
             </a:r>
           </a:p>
           <a:p>
             <a:pPr lvl="1"/>
             <a:r>
-              <a:rPr lang="de-DE" dirty="0" smtClean="0"/>
+              <a:rPr lang="de-DE" dirty="0"/>
               <a:t>Chat</a:t>
             </a:r>
           </a:p>
           <a:p>
             <a:pPr lvl="1"/>
             <a:r>
-              <a:rPr lang="de-DE" dirty="0" smtClean="0"/>
+              <a:rPr lang="de-DE" dirty="0"/>
               <a:t>Breakout-</a:t>
             </a:r>
             <a:r>
-              <a:rPr lang="de-DE" dirty="0" err="1" smtClean="0"/>
+              <a:rPr lang="de-DE" dirty="0" err="1"/>
               <a:t>Rooms</a:t>
             </a:r>
             <a:r>
-              <a:rPr lang="de-DE" dirty="0" smtClean="0"/>
+              <a:rPr lang="de-DE" dirty="0"/>
               <a:t> für Übungen</a:t>
             </a:r>
           </a:p>
           <a:p>
             <a:pPr lvl="1"/>
             <a:r>
-              <a:rPr lang="de-DE" dirty="0" smtClean="0"/>
+              <a:rPr lang="de-DE" dirty="0"/>
               <a:t>Lautsprecher + Mikrophon benötigt, Kamera empfehlenswert</a:t>
             </a:r>
           </a:p>
@@ -15694,21 +15362,21 @@
           </a:p>
           <a:p>
             <a:r>
-              <a:rPr lang="de-DE" dirty="0" smtClean="0"/>
+              <a:rPr lang="de-DE" dirty="0"/>
               <a:t>Zugang zu Schulungsrechnern mittels RDP</a:t>
             </a:r>
           </a:p>
           <a:p>
             <a:pPr lvl="1"/>
             <a:r>
-              <a:rPr lang="de-DE" dirty="0" smtClean="0"/>
+              <a:rPr lang="de-DE" dirty="0"/>
               <a:t>Praktische Übungen</a:t>
             </a:r>
           </a:p>
           <a:p>
             <a:pPr lvl="1"/>
             <a:r>
-              <a:rPr lang="de-DE" dirty="0" smtClean="0"/>
+              <a:rPr lang="de-DE" dirty="0"/>
               <a:t>Aufschaltung über Zoom möglich</a:t>
             </a:r>
           </a:p>
@@ -15728,13 +15396,6 @@
   <p:clrMapOvr>
     <a:masterClrMapping/>
   </p:clrMapOvr>
-  <p:timing>
-    <p:tnLst>
-      <p:par>
-        <p:cTn id="1" dur="indefinite" restart="never" nodeType="tmRoot"/>
-      </p:par>
-    </p:tnLst>
-  </p:timing>
 </p:sld>
 </file>
 

</xml_diff>